<commit_message>
altercao apresentacao e sobre nos
</commit_message>
<xml_diff>
--- a/docs/13 Apresentação IFSP - 03.03.18.pptx
+++ b/docs/13 Apresentação IFSP - 03.03.18.pptx
@@ -34,32 +34,39 @@
   <office:scripts/>
   <office:font-face-decls>
     <style:font-face style:name="Arial" svg:font-family="Arial"/>
-    <style:font-face style:name="Arial Unicode MS" svg:font-family="'Arial Unicode MS'" style:font-pitch="variable"/>
+    <style:font-face style:name="Arial Unicode MS" svg:font-family="'Arial Unicode MS'" style:font-family-generic="system" style:font-pitch="variable"/>
     <style:font-face style:name="Arial Unicode MS1" svg:font-family="'Arial Unicode MS'" style:font-family-generic="swiss" style:font-pitch="variable"/>
-    <style:font-face style:name="Arial Unicode MS2" svg:font-family="'Arial Unicode MS'" style:font-family-generic="system" style:font-pitch="variable"/>
+    <style:font-face style:name="Arial Unicode MS2" svg:font-family="'Arial Unicode MS'" style:font-pitch="variable"/>
     <style:font-face style:name="Arial1" svg:font-family="Arial" style:font-pitch="variable"/>
-    <style:font-face style:name="Arial2" svg:font-family="Arial" style:font-family-generic="swiss" style:font-pitch="variable"/>
-    <style:font-face style:name="Arial3" svg:font-family="Arial" style:font-family-generic="swiss"/>
+    <style:font-face style:name="Arial2" svg:font-family="Arial" style:font-family-generic="swiss"/>
+    <style:font-face style:name="Arial3" svg:font-family="Arial" style:font-family-generic="swiss" style:font-pitch="variable"/>
     <style:font-face style:name="Calibri" svg:font-family="Calibri" style:font-family-generic="swiss" style:font-pitch="variable"/>
-    <style:font-face style:name="Century Schoolbook" svg:font-family="'Century Schoolbook'" style:font-family-generic="roman" style:font-pitch="variable"/>
+    <style:font-face style:name="Century Schoolbook" svg:font-family="'Century Schoolbook'"/>
     <style:font-face style:name="Century Schoolbook1" svg:font-family="'Century Schoolbook'" style:font-pitch="variable"/>
-    <style:font-face style:name="Century Schoolbook2" svg:font-family="'Century Schoolbook'"/>
-    <style:font-face style:name="Century Schoolbook3" svg:font-family="'Century Schoolbook'" style:font-family-generic="swiss"/>
+    <style:font-face style:name="Century Schoolbook2" svg:font-family="'Century Schoolbook'" style:font-family-generic="roman" style:font-pitch="variable"/>
     <style:font-face style:name="Liberation Sans" svg:font-family="'Liberation Sans'" style:font-family-generic="roman" style:font-pitch="variable"/>
-    <style:font-face style:name="Liberation Sans1" svg:font-family="'Liberation Sans'" style:font-family-generic="swiss" style:font-pitch="variable"/>
-    <style:font-face style:name="Liberation Sans2" svg:font-family="'Liberation Sans'" style:font-pitch="variable"/>
+    <style:font-face style:name="Liberation Sans1" svg:font-family="'Liberation Sans'" style:font-pitch="variable"/>
+    <style:font-face style:name="Liberation Sans2" svg:font-family="'Liberation Sans'" style:font-family-generic="swiss" style:font-pitch="variable"/>
     <style:font-face style:name="Liberation Serif" svg:font-family="'Liberation Serif'" style:font-pitch="variable"/>
-    <style:font-face style:name="Liberation Serif1" svg:font-family="'Liberation Serif'" style:font-family-generic="roman" style:font-pitch="variable"/>
+    <style:font-face style:name="Liberation Serif1" svg:font-family="'Liberation Serif'" style:font-family-generic="roman" style:font-pitch="variable" style:font-charset="x-symbol"/>
     <style:font-face style:name="Liberation Serif2" svg:font-family="'Liberation Serif'" style:font-family-generic="swiss" style:font-pitch="variable"/>
-    <style:font-face style:name="Microsoft YaHei" svg:font-family="'Microsoft YaHei'" style:font-pitch="variable"/>
-    <style:font-face style:name="Microsoft YaHei1" svg:font-family="'Microsoft YaHei'" style:font-family-generic="system" style:font-pitch="variable"/>
+    <style:font-face style:name="Liberation Serif3" svg:font-family="'Liberation Serif'" style:font-family-generic="roman" style:font-pitch="variable"/>
+    <style:font-face style:name="Liberation Serif4" svg:font-family="'Liberation Serif'" style:font-pitch="variable" style:font-charset="x-symbol"/>
+    <style:font-face style:name="Microsoft YaHei" svg:font-family="'Microsoft YaHei'" style:font-family-generic="system" style:font-pitch="variable"/>
+    <style:font-face style:name="Microsoft YaHei1" svg:font-family="'Microsoft YaHei'" style:font-pitch="variable"/>
     <style:font-face style:name="Noto Sans" svg:font-family="'Noto Sans'" style:font-family-generic="roman" style:font-pitch="variable"/>
     <style:font-face style:name="OpenSymbol" svg:font-family="OpenSymbol, 'Arial Unicode MS'" style:font-charset="x-symbol"/>
+    <style:font-face style:name="OpenSymbol1" svg:font-family="OpenSymbol, 'Arial Unicode MS'" style:font-pitch="variable" style:font-charset="x-symbol"/>
     <style:font-face style:name="Segoe UI" svg:font-family="'Segoe UI'" style:font-family-generic="system" style:font-pitch="variable"/>
+    <style:font-face style:name="Segoe UI1" svg:font-family="'Segoe UI'" style:font-family-generic="swiss" style:font-pitch="variable"/>
+    <style:font-face style:name="Segoe UI2" svg:font-family="'Segoe UI'" style:font-pitch="variable" style:font-charset="x-symbol"/>
+    <style:font-face style:name="Segoe UI3" svg:font-family="'Segoe UI'" style:font-family-generic="system" style:font-pitch="variable" style:font-charset="x-symbol"/>
     <style:font-face style:name="Tahoma" svg:font-family="Tahoma" style:font-family-generic="swiss" style:font-pitch="variable"/>
     <style:font-face style:name="Tahoma1" svg:font-family="Tahoma" style:font-family-generic="system" style:font-pitch="variable"/>
-    <style:font-face style:name="Trebuchet MS" svg:font-family="'Trebuchet MS'"/>
-    <style:font-face style:name="Trebuchet MS1" svg:font-family="'Trebuchet MS'" style:font-pitch="variable"/>
+    <style:font-face style:name="Tahoma2" svg:font-family="Tahoma" style:font-family-generic="system" style:font-pitch="variable" style:font-charset="x-symbol"/>
+    <style:font-face style:name="Tahoma3" svg:font-family="Tahoma" style:font-pitch="variable" style:font-charset="x-symbol"/>
+    <style:font-face style:name="Trebuchet MS" svg:font-family="'Trebuchet MS'" style:font-pitch="variable"/>
+    <style:font-face style:name="Trebuchet MS1" svg:font-family="'Trebuchet MS'"/>
   </office:font-face-decls>
   <office:automatic-styles>
     <style:style style:name="dp1" style:family="drawing-page">
@@ -73,9 +80,6 @@
     </style:style>
     <style:style style:name="dp4" style:family="drawing-page">
       <style:drawing-page-properties presentation:display-header="true" presentation:display-footer="true" presentation:display-page-number="false" presentation:display-date-time="true"/>
-    </style:style>
-    <style:style style:name="dp5" style:family="drawing-page">
-      <style:drawing-page-properties presentation:background-visible="true" presentation:background-objects-visible="true" presentation:display-footer="true" presentation:display-page-number="false" presentation:display-date-time="true"/>
     </style:style>
     <style:style style:name="gr1" style:family="graphic" style:parent-style-name="standard">
       <style:graphic-properties draw:stroke="none" svg:stroke-width="0cm" draw:fill="none" draw:textarea-vertical-align="bottom" draw:auto-grow-height="false" draw:fit-to-size="false" style:shrink-to-fit="false" fo:min-height="0cm" fo:min-width="0cm" fo:padding-top="0.127cm" fo:padding-bottom="0.127cm" fo:padding-left="0.254cm" fo:padding-right="0.254cm" fo:wrap-option="wrap"/>
@@ -102,11 +106,11 @@
     <style:style style:name="gr6" style:family="graphic" style:parent-style-name="Objeto_20_sem_20_preenchimento_20_nem_20_linha">
       <style:graphic-properties draw:stroke="none" svg:stroke-width="0cm" draw:fill="none" draw:textarea-horizontal-align="center" draw:textarea-vertical-align="top" draw:auto-grow-height="false" fo:padding-top="0.125cm" fo:padding-bottom="0.125cm" fo:padding-left="0.25cm" fo:padding-right="0.25cm" fo:wrap-option="wrap" draw:color-mode="standard" draw:luminance="0%" draw:contrast="0%" draw:gamma="100%" draw:red="0%" draw:green="0%" draw:blue="0%" fo:clip="rect(0cm, 0cm, 0cm, 0cm)" draw:image-opacity="100%" style:mirror="none"/>
     </style:style>
-    <style:style style:name="gr7" style:family="graphic" style:parent-style-name="standard" style:list-style-name="L6">
+    <style:style style:name="gr7" style:family="graphic" style:parent-style-name="standard" style:list-style-name="L4">
       <style:graphic-properties draw:stroke="none" svg:stroke-width="0cm" draw:fill="none" draw:textarea-vertical-align="bottom" draw:auto-grow-height="false" draw:fit-to-size="false" style:shrink-to-fit="true" fo:min-height="1.226cm" fo:min-width="20.235cm" fo:padding-top="0.127cm" fo:padding-bottom="0.127cm" fo:padding-left="0.254cm" fo:padding-right="0.254cm" fo:wrap-option="wrap"/>
       <style:paragraph-properties style:writing-mode="lr-tb"/>
     </style:style>
-    <style:style style:name="gr8" style:family="graphic" style:parent-style-name="standard" style:list-style-name="L1">
+    <style:style style:name="gr8" style:family="graphic" style:parent-style-name="standard" style:list-style-name="L5">
       <style:graphic-properties draw:stroke="none" svg:stroke-width="0cm" draw:fill="none" draw:textarea-vertical-align="top" draw:auto-grow-height="true" draw:fit-to-size="false" style:shrink-to-fit="false" fo:min-height="0cm" fo:min-width="0cm" fo:padding-top="0.127cm" fo:padding-bottom="0.127cm" fo:padding-left="0.254cm" fo:padding-right="0.254cm" fo:wrap-option="wrap">
         <style:columns fo:column-count="1" fo:column-gap="0cm">
           <style:column style:rel-width="65535*" fo:start-indent="0cm" fo:end-indent="0cm"/>
@@ -114,11 +118,11 @@
       </style:graphic-properties>
       <style:paragraph-properties style:writing-mode="lr-tb"/>
     </style:style>
-    <style:style style:name="gr9" style:family="graphic" style:parent-style-name="standard" style:list-style-name="L6">
+    <style:style style:name="gr9" style:family="graphic" style:parent-style-name="standard" style:list-style-name="L4">
       <style:graphic-properties draw:stroke="none" svg:stroke-width="0cm" draw:fill="none" draw:textarea-vertical-align="bottom" draw:auto-grow-height="false" draw:fit-to-size="false" style:shrink-to-fit="true" fo:min-height="1.226cm" fo:min-width="20.235cm" fo:padding-top="0.127cm" fo:padding-bottom="0.127cm" fo:padding-left="0.254cm" fo:padding-right="0.254cm" fo:wrap-option="wrap"/>
       <style:paragraph-properties style:writing-mode="lr-tb"/>
     </style:style>
-    <style:style style:name="gr10" style:family="graphic" style:parent-style-name="standard" style:list-style-name="L1">
+    <style:style style:name="gr10" style:family="graphic" style:parent-style-name="standard" style:list-style-name="L5">
       <style:graphic-properties draw:stroke="none" svg:stroke-width="0cm" draw:fill="none" draw:textarea-vertical-align="top" draw:auto-grow-height="true" draw:fit-to-size="false" style:shrink-to-fit="false" fo:min-height="0cm" fo:min-width="0cm" fo:padding-top="0.127cm" fo:padding-bottom="0.127cm" fo:padding-left="0.254cm" fo:padding-right="0.254cm" fo:wrap-option="wrap">
         <style:columns fo:column-count="1" fo:column-gap="0cm">
           <style:column style:rel-width="65535*" fo:start-indent="0cm" fo:end-indent="0cm"/>
@@ -126,11 +130,11 @@
       </style:graphic-properties>
       <style:paragraph-properties style:writing-mode="lr-tb"/>
     </style:style>
-    <style:style style:name="gr11" style:family="graphic" style:parent-style-name="standard" style:list-style-name="L6">
+    <style:style style:name="gr11" style:family="graphic" style:parent-style-name="standard" style:list-style-name="L4">
       <style:graphic-properties draw:stroke="none" svg:stroke-width="0cm" draw:fill="none" draw:textarea-vertical-align="bottom" draw:auto-grow-height="false" draw:fit-to-size="false" style:shrink-to-fit="true" fo:min-height="1.226cm" fo:min-width="20.235cm" fo:padding-top="0.127cm" fo:padding-bottom="0.127cm" fo:padding-left="0.254cm" fo:padding-right="0.254cm" fo:wrap-option="wrap"/>
       <style:paragraph-properties style:writing-mode="lr-tb"/>
     </style:style>
-    <style:style style:name="gr12" style:family="graphic" style:parent-style-name="standard" style:list-style-name="L1">
+    <style:style style:name="gr12" style:family="graphic" style:parent-style-name="standard" style:list-style-name="L5">
       <style:graphic-properties draw:stroke="none" svg:stroke-width="0cm" draw:fill="none" draw:textarea-vertical-align="top" draw:auto-grow-height="true" draw:fit-to-size="false" style:shrink-to-fit="false" fo:min-height="0cm" fo:min-width="0cm" fo:padding-top="0.127cm" fo:padding-bottom="0.127cm" fo:padding-left="0.254cm" fo:padding-right="0.254cm" fo:wrap-option="wrap">
         <style:columns fo:column-count="1" fo:column-gap="0cm">
           <style:column style:rel-width="65535*" fo:start-indent="0cm" fo:end-indent="0cm"/>
@@ -138,14 +142,14 @@
       </style:graphic-properties>
       <style:paragraph-properties style:writing-mode="lr-tb"/>
     </style:style>
-    <style:style style:name="gr13" style:family="graphic" style:parent-style-name="standard" style:list-style-name="L6">
+    <style:style style:name="gr13" style:family="graphic" style:parent-style-name="standard" style:list-style-name="L4">
       <style:graphic-properties draw:stroke="none" svg:stroke-width="0cm" draw:fill="none" draw:textarea-vertical-align="bottom" draw:auto-grow-height="false" draw:fit-to-size="false" style:shrink-to-fit="true" fo:min-height="1.907cm" fo:min-width="20.235cm" fo:padding-top="0.127cm" fo:padding-bottom="0.127cm" fo:padding-left="0.254cm" fo:padding-right="0.254cm" fo:wrap-option="wrap"/>
       <style:paragraph-properties style:writing-mode="lr-tb"/>
     </style:style>
     <style:style style:name="gr14" style:family="graphic" style:parent-style-name="Objeto_20_sem_20_preenchimento_20_nem_20_linha">
-      <style:graphic-properties draw:textarea-horizontal-align="center" draw:textarea-vertical-align="middle" draw:color-mode="standard" draw:luminance="0%" draw:contrast="0%" draw:gamma="100%" draw:red="0%" draw:green="0%" draw:blue="0%" fo:clip="rect(0cm, 0cm, 0cm, 0cm)" draw:image-opacity="100%" style:mirror="none"/>
-    </style:style>
-    <style:style style:name="pr1" style:family="presentation" style:parent-style-name="Slide_20_de_20_título-notes" style:list-style-name="L8">
+      <style:graphic-properties draw:stroke="none" draw:fill="none" draw:textarea-horizontal-align="center" draw:textarea-vertical-align="middle" draw:color-mode="standard" draw:luminance="0%" draw:contrast="0%" draw:gamma="100%" draw:red="0%" draw:green="0%" draw:blue="0%" fo:clip="rect(0cm, 0cm, 0cm, 0cm)" draw:image-opacity="100%" style:mirror="none"/>
+    </style:style>
+    <style:style style:name="pr1" style:family="presentation" style:parent-style-name="Slide_20_de_20_título-notes" style:list-style-name="L6">
       <style:graphic-properties draw:stroke="none" svg:stroke-width="0cm" draw:fill="none" draw:fill-color="#ffffff" draw:textarea-vertical-align="top" draw:auto-grow-height="false" draw:fit-to-size="false" style:shrink-to-fit="false" fo:min-height="11.43cm" fo:padding-top="0.127cm" fo:padding-bottom="0.127cm" fo:padding-left="0.254cm" fo:padding-right="0.254cm" fo:wrap-option="wrap">
         <style:columns fo:column-count="1" fo:column-gap="0cm">
           <style:column style:rel-width="65535*" fo:start-indent="0cm" fo:end-indent="0cm"/>
@@ -191,24 +195,25 @@
     </style:style>
     <style:style style:name="P1" style:family="paragraph">
       <style:paragraph-properties fo:margin-top="0cm" fo:margin-bottom="0cm" fo:line-height="100%" fo:text-align="center" style:punctuation-wrap="simple" style:writing-mode="lr-tb"/>
+      <style:text-properties fo:font-size="32pt"/>
     </style:style>
     <style:style style:name="P2" style:family="paragraph">
       <loext:graphic-properties draw:fill="none"/>
-      <style:paragraph-properties fo:text-align="center" style:font-independent-line-spacing="true"/>
+      <style:paragraph-properties fo:text-align="center" style:writing-mode="lr-tb" style:font-independent-line-spacing="true"/>
       <style:text-properties fo:font-size="32pt"/>
     </style:style>
     <style:style style:name="P3" style:family="paragraph">
       <loext:graphic-properties draw:fill="none" draw:fill-color="#ffffff"/>
-      <style:paragraph-properties fo:margin-top="0cm" fo:margin-bottom="0cm" fo:line-height="100%" fo:text-align="start" style:font-independent-line-spacing="true"/>
+      <style:paragraph-properties fo:margin-top="0cm" fo:margin-bottom="0cm" fo:line-height="100%" fo:text-align="start" style:writing-mode="lr-tb" style:font-independent-line-spacing="true"/>
       <style:text-properties fo:font-variant="normal" fo:text-transform="none" style:text-line-through-style="none" style:text-line-through-type="none" style:text-position="0% 100%" fo:font-size="18pt" fo:letter-spacing="normal" fo:font-style="normal" style:text-underline-style="none" fo:font-weight="normal" fo:background-color="transparent" style:font-style-asian="normal" style:font-weight-asian="normal" style:font-style-complex="normal" style:font-weight-complex="normal"/>
     </style:style>
     <style:style style:name="P4" style:family="paragraph">
-      <style:paragraph-properties fo:margin-top="0cm" fo:margin-bottom="0cm" fo:line-height="100%" fo:text-align="end"/>
-      <style:text-properties fo:font-size="14pt" style:font-size-asian="14pt" style:font-size-complex="14pt"/>
+      <style:paragraph-properties fo:margin-top="0cm" fo:margin-bottom="0cm" fo:line-height="100%" fo:text-align="end" style:writing-mode="lr-tb"/>
+      <style:text-properties fo:font-size="12pt" style:font-size-asian="14pt" style:font-size-complex="14pt"/>
     </style:style>
     <style:style style:name="P5" style:family="paragraph">
       <loext:graphic-properties draw:fill="none" draw:fill-color="#ffffff"/>
-      <style:paragraph-properties fo:text-align="start" style:font-independent-line-spacing="true"/>
+      <style:paragraph-properties fo:text-align="start" style:writing-mode="lr-tb" style:font-independent-line-spacing="true"/>
       <style:text-properties fo:font-size="12pt" style:font-size-asian="14pt" style:font-size-complex="14pt"/>
     </style:style>
     <style:style style:name="P6" style:family="paragraph">
@@ -241,86 +246,87 @@
     </style:style>
     <style:style style:name="P10" style:family="paragraph">
       <loext:graphic-properties draw:fill="none"/>
-      <style:paragraph-properties fo:text-align="start" style:font-independent-line-spacing="true"/>
+      <style:paragraph-properties fo:text-align="start" style:writing-mode="lr-tb" style:font-independent-line-spacing="true"/>
       <style:text-properties fo:font-size="20pt"/>
     </style:style>
     <style:style style:name="P11" style:family="paragraph">
+      <style:paragraph-properties fo:margin-top="0cm" fo:margin-bottom="0cm" fo:line-height="100%" fo:text-align="center" style:punctuation-wrap="simple" style:writing-mode="lr-tb"/>
+      <style:text-properties fo:font-size="25pt"/>
+    </style:style>
+    <style:style style:name="P12" style:family="paragraph">
       <loext:graphic-properties draw:fill="none"/>
-      <style:paragraph-properties fo:text-align="start" style:font-independent-line-spacing="true"/>
+      <style:paragraph-properties fo:text-align="start" style:writing-mode="lr-tb" style:font-independent-line-spacing="true"/>
       <style:text-properties fo:font-size="25pt"/>
     </style:style>
-    <style:style style:name="P12" style:family="paragraph">
+    <style:style style:name="P13" style:family="paragraph">
       <loext:graphic-properties draw:fill-color="#ffffff"/>
-    </style:style>
-    <style:style style:name="P13" style:family="paragraph">
+      <style:paragraph-properties style:writing-mode="lr-tb"/>
+    </style:style>
+    <style:style style:name="P14" style:family="paragraph">
       <style:paragraph-properties fo:margin-left="0.741cm" fo:margin-right="0cm" fo:margin-top="0.212cm" fo:margin-bottom="0cm" fo:line-height="100%" fo:text-align="center" fo:text-indent="0cm" style:punctuation-wrap="simple" style:writing-mode="lr-tb">
         <style:tab-stops>
           <style:tab-stop style:position="0cm"/>
         </style:tab-stops>
       </style:paragraph-properties>
     </style:style>
-    <style:style style:name="P14" style:family="paragraph">
+    <style:style style:name="P15" style:family="paragraph">
       <loext:graphic-properties draw:fill="none"/>
-      <style:paragraph-properties fo:text-align="center" style:font-independent-line-spacing="true"/>
+      <style:paragraph-properties fo:text-align="center" style:writing-mode="lr-tb" style:font-independent-line-spacing="true"/>
       <style:text-properties fo:font-size="20pt"/>
     </style:style>
-    <style:style style:name="P15" style:family="paragraph">
+    <style:style style:name="P16" style:family="paragraph">
       <style:paragraph-properties fo:margin-top="0cm" fo:margin-bottom="0cm" fo:line-height="100%" fo:text-align="start" style:punctuation-wrap="simple" style:writing-mode="lr-tb"/>
       <style:text-properties fo:font-size="18pt"/>
     </style:style>
-    <style:style style:name="P16" style:family="paragraph">
+    <style:style style:name="P17" style:family="paragraph">
       <loext:graphic-properties draw:fill="none"/>
-      <style:paragraph-properties fo:text-align="start" style:font-independent-line-spacing="true"/>
+      <style:paragraph-properties fo:text-align="start" style:writing-mode="lr-tb" style:font-independent-line-spacing="true"/>
       <style:text-properties fo:font-size="18pt"/>
     </style:style>
-    <style:style style:name="P17" style:family="paragraph">
+    <style:style style:name="P18" style:family="paragraph">
       <loext:graphic-properties draw:fill="solid" draw:fill-color="#ffffff"/>
       <style:paragraph-properties fo:text-align="center" style:font-independent-line-spacing="true"/>
       <style:text-properties fo:font-size="18pt"/>
     </style:style>
-    <style:style style:name="P18" style:family="paragraph">
+    <style:style style:name="P19" style:family="paragraph">
       <loext:graphic-properties draw:fill="none"/>
       <style:paragraph-properties fo:text-align="start"/>
       <style:text-properties fo:font-size="18pt"/>
     </style:style>
-    <style:style style:name="P19" style:family="paragraph">
-      <style:paragraph-properties fo:margin-left="0cm" fo:margin-right="0cm" fo:margin-top="0cm" fo:margin-bottom="1.251cm" fo:line-height="150%" fo:text-align="justify" fo:text-indent="1.499cm"/>
-      <style:text-properties fo:color="#343a40" loext:opacity="100%" style:font-name="Arial" fo:font-size="12pt" style:font-name-asian="Arial" style:font-name-complex="Arial"/>
-    </style:style>
     <style:style style:name="P20" style:family="paragraph">
+      <style:paragraph-properties fo:margin-left="0cm" fo:margin-right="0cm" fo:margin-top="0cm" fo:margin-bottom="1.251cm" fo:line-height="150%" fo:text-align="justify" fo:text-indent="1.499cm" style:writing-mode="lr-tb"/>
+      <style:text-properties fo:font-size="18pt"/>
+    </style:style>
+    <style:style style:name="P21" style:family="paragraph">
       <style:paragraph-properties fo:margin-top="0cm" fo:margin-bottom="0cm" fo:line-height="100%" fo:text-align="justify" style:punctuation-wrap="simple" style:writing-mode="lr-tb"/>
       <style:text-properties fo:font-size="18pt"/>
     </style:style>
-    <style:style style:name="P21" style:family="paragraph">
+    <style:style style:name="P22" style:family="paragraph">
       <loext:graphic-properties draw:fill="none"/>
-      <style:paragraph-properties fo:text-align="justify" style:font-independent-line-spacing="true"/>
+      <style:paragraph-properties fo:text-align="justify" style:writing-mode="lr-tb" style:font-independent-line-spacing="true"/>
       <style:text-properties fo:font-size="18pt"/>
     </style:style>
-    <style:style style:name="P22" style:family="paragraph">
+    <style:style style:name="P23" style:family="paragraph">
       <loext:graphic-properties draw:fill="none"/>
       <style:paragraph-properties fo:margin-top="0cm" fo:margin-bottom="0cm" fo:line-height="100%" fo:text-align="center" style:punctuation-wrap="simple" style:writing-mode="lr-tb" style:font-independent-line-spacing="true"/>
       <style:text-properties fo:font-size="25pt"/>
     </style:style>
-    <style:style style:name="P23" style:family="paragraph">
-      <style:paragraph-properties fo:margin-left="0cm" fo:margin-right="0cm" fo:margin-top="0cm" fo:margin-bottom="1.251cm" fo:line-height="150%" fo:text-align="justify" fo:text-indent="0cm"/>
-      <style:text-properties fo:color="#343a40" loext:opacity="100%" style:font-name="Arial" fo:font-size="12pt" style:font-name-asian="Arial" style:font-name-complex="Arial"/>
-    </style:style>
     <style:style style:name="P24" style:family="paragraph">
+      <style:paragraph-properties fo:margin-left="0cm" fo:margin-right="0cm" fo:margin-top="0cm" fo:margin-bottom="1.251cm" fo:line-height="150%" fo:text-align="justify" fo:text-indent="0cm" style:punctuation-wrap="simple" style:writing-mode="lr-tb"/>
+      <style:text-properties fo:font-size="18pt"/>
+    </style:style>
+    <style:style style:name="P25" style:family="paragraph">
       <loext:graphic-properties draw:fill="none"/>
       <style:paragraph-properties fo:margin-top="0cm" fo:margin-bottom="0cm" fo:line-height="100%" fo:text-align="start" style:punctuation-wrap="simple" style:writing-mode="lr-tb" style:font-independent-line-spacing="true"/>
       <style:text-properties fo:font-size="18pt"/>
     </style:style>
-    <style:style style:name="P25" style:family="paragraph">
-      <style:paragraph-properties fo:margin-top="0cm" fo:margin-bottom="0cm" fo:line-height="100%" fo:text-align="center" style:punctuation-wrap="simple" style:writing-mode="lr-tb"/>
-      <style:text-properties fo:font-size="25pt"/>
-    </style:style>
     <style:style style:name="P26" style:family="paragraph">
-      <style:paragraph-properties fo:margin-left="0cm" fo:margin-right="0cm" fo:margin-top="0cm" fo:margin-bottom="1.251cm" fo:line-height="150%" fo:text-align="justify" fo:text-indent="1.9cm"/>
+      <style:paragraph-properties fo:margin-left="0cm" fo:margin-right="0cm" fo:margin-top="0cm" fo:margin-bottom="1.251cm" fo:line-height="150%" fo:text-align="justify" fo:text-indent="1.9cm" style:punctuation-wrap="simple" style:writing-mode="lr-tb"/>
       <style:text-properties fo:color="#343a40" loext:opacity="100%" style:font-name="Arial" fo:font-size="12pt" style:font-name-asian="Arial" style:font-name-complex="Arial"/>
     </style:style>
     <style:style style:name="P27" style:family="paragraph">
-      <style:paragraph-properties fo:margin-top="0cm" fo:margin-bottom="0cm" fo:line-height="100%" fo:text-align="start" style:punctuation-wrap="simple" style:writing-mode="lr-tb"/>
-      <style:text-properties fo:font-size="12pt"/>
+      <style:paragraph-properties fo:margin-left="0cm" fo:margin-right="0cm" fo:margin-top="0cm" fo:margin-bottom="0cm" fo:line-height="100%" fo:text-align="start" fo:text-indent="1.9cm" style:punctuation-wrap="simple" style:writing-mode="lr-tb"/>
+      <style:text-properties fo:color="#343a40" loext:opacity="100%" style:font-name="Arial" fo:font-size="12pt" style:font-name-asian="Arial" style:font-name-complex="Arial"/>
     </style:style>
     <style:style style:name="P28" style:family="paragraph">
       <loext:graphic-properties draw:fill="none"/>
@@ -329,46 +335,52 @@
     </style:style>
     <style:style style:name="P29" style:family="paragraph">
       <loext:graphic-properties draw:fill-color="#ffffff"/>
+      <style:paragraph-properties style:writing-mode="lr-tb"/>
       <style:text-properties fo:font-size="20pt"/>
     </style:style>
     <style:style style:name="P30" style:family="paragraph">
+      <style:paragraph-properties fo:margin-left="0cm" fo:margin-right="0cm" fo:margin-top="0cm" fo:margin-bottom="1.251cm" fo:line-height="150%" fo:text-align="justify" fo:text-indent="1.9cm" style:punctuation-wrap="simple" style:writing-mode="lr-tb"/>
+      <style:text-properties fo:font-size="18pt"/>
+    </style:style>
+    <style:style style:name="P31" style:family="paragraph">
+      <loext:graphic-properties draw:fill="none"/>
       <style:paragraph-properties fo:text-align="center"/>
     </style:style>
     <style:style style:name="T1" style:family="text">
-      <style:text-properties fo:font-variant="small-caps" fo:color="#000000" loext:opacity="100%" style:text-line-through-style="none" style:text-line-through-type="none" style:text-position="0% 100%" style:font-name="Trebuchet MS" fo:font-size="30pt" fo:letter-spacing="normal" fo:language="pt" fo:country="BR" fo:font-style="normal" style:text-underline-style="none" fo:font-weight="bold" fo:background-color="transparent" style:font-size-asian="30pt" style:font-style-asian="normal" style:font-weight-asian="bold" style:font-size-complex="30pt" style:font-style-complex="normal" style:font-weight-complex="bold"/>
+      <style:text-properties fo:font-variant="small-caps" fo:color="#000000" loext:opacity="100%" style:text-line-through-style="none" style:text-line-through-type="none" style:text-position="0% 100%" style:font-name="Trebuchet MS1" fo:font-size="30pt" fo:letter-spacing="normal" fo:language="pt" fo:country="BR" fo:font-style="normal" style:text-underline-style="none" fo:font-weight="bold" fo:background-color="transparent" style:font-size-asian="30pt" style:font-style-asian="normal" style:font-weight-asian="bold" style:font-size-complex="30pt" style:font-style-complex="normal" style:font-weight-complex="bold"/>
     </style:style>
     <style:style style:name="T2" style:family="text">
-      <style:text-properties fo:font-variant="normal" fo:text-transform="none" fo:color="#000000" loext:opacity="100%" style:text-line-through-style="none" style:text-line-through-type="none" style:text-position="0% 100%" style:font-name="Arial2" fo:font-size="12pt" fo:letter-spacing="normal" fo:language="pt" fo:country="BR" fo:font-style="normal" style:text-underline-style="none" fo:font-weight="normal" fo:background-color="transparent" style:font-size-asian="12pt" style:font-style-asian="normal" style:font-weight-asian="normal" style:font-name-complex="Arial2" style:font-size-complex="12pt" style:font-style-complex="normal" style:font-weight-complex="normal"/>
+      <style:text-properties fo:font-variant="normal" fo:text-transform="none" fo:color="#000000" loext:opacity="100%" style:text-line-through-style="none" style:text-line-through-type="none" style:text-position="0% 100%" style:font-name="Arial3" fo:font-size="12pt" fo:letter-spacing="normal" fo:language="pt" fo:country="BR" fo:font-style="normal" style:text-underline-style="none" fo:font-weight="normal" fo:background-color="transparent" style:font-size-asian="12pt" style:font-style-asian="normal" style:font-weight-asian="normal" style:font-name-complex="Arial3" style:font-size-complex="12pt" style:font-style-complex="normal" style:font-weight-complex="normal"/>
     </style:style>
     <style:style style:name="T3" style:family="text">
-      <style:text-properties fo:font-variant="normal" fo:text-transform="none" fo:color="#000000" loext:opacity="100%" style:text-line-through-style="none" style:text-line-through-type="none" style:text-position="0% 100%" style:font-name="Century Schoolbook2" fo:font-size="22pt" fo:letter-spacing="normal" fo:language="pt" fo:country="BR" fo:font-style="normal" style:text-underline-style="none" fo:font-weight="normal" fo:background-color="transparent" style:font-name-asian="Century Schoolbook2" style:font-size-asian="22pt" style:font-style-asian="normal" style:font-weight-asian="normal" style:font-name-complex="Century Schoolbook2" style:font-size-complex="22pt" style:font-style-complex="normal" style:font-weight-complex="normal"/>
+      <style:text-properties fo:font-variant="normal" fo:text-transform="none" fo:color="#000000" loext:opacity="100%" style:text-line-through-style="none" style:text-line-through-type="none" style:text-position="0% 100%" style:font-name="Century Schoolbook" fo:font-size="22pt" fo:letter-spacing="normal" fo:language="pt" fo:country="BR" fo:font-style="normal" style:text-underline-style="none" fo:font-weight="normal" fo:background-color="transparent" style:font-name-asian="Century Schoolbook" style:font-size-asian="22pt" style:font-style-asian="normal" style:font-weight-asian="normal" style:font-name-complex="Century Schoolbook" style:font-size-complex="22pt" style:font-style-complex="normal" style:font-weight-complex="normal"/>
     </style:style>
     <style:style style:name="T4" style:family="text">
-      <style:text-properties fo:font-variant="normal" fo:text-transform="none" fo:color="#000000" loext:opacity="100%" style:text-line-through-style="none" style:text-line-through-type="none" style:text-position="0% 100%" style:font-name="Century Schoolbook2" fo:font-size="24pt" fo:letter-spacing="normal" fo:language="pt" fo:country="BR" fo:font-style="normal" style:text-underline-style="none" fo:font-weight="normal" fo:background-color="transparent" style:font-name-asian="Century Schoolbook2" style:font-size-asian="24pt" style:font-style-asian="normal" style:font-weight-asian="normal" style:font-name-complex="Century Schoolbook2" style:font-size-complex="24pt" style:font-style-complex="normal" style:font-weight-complex="normal"/>
+      <style:text-properties fo:font-variant="normal" fo:text-transform="none" fo:color="#000000" loext:opacity="100%" style:text-line-through-style="none" style:text-line-through-type="none" style:text-position="0% 100%" style:font-name="Century Schoolbook" fo:font-size="24pt" fo:letter-spacing="normal" fo:language="pt" fo:country="BR" fo:font-style="normal" style:text-underline-style="none" fo:font-weight="normal" fo:background-color="transparent" style:font-name-asian="Century Schoolbook" style:font-size-asian="24pt" style:font-style-asian="normal" style:font-weight-asian="normal" style:font-name-complex="Century Schoolbook" style:font-size-complex="24pt" style:font-style-complex="normal" style:font-weight-complex="normal"/>
     </style:style>
     <style:style style:name="T5" style:family="text">
-      <style:text-properties fo:font-variant="normal" fo:text-transform="none" fo:color="#000000" loext:opacity="100%" style:text-line-through-style="none" style:text-line-through-type="none" style:text-position="0% 100%" style:font-name="Century Schoolbook2" fo:font-size="20pt" fo:letter-spacing="normal" fo:language="pt" fo:country="BR" fo:font-style="italic" style:text-underline-style="none" fo:font-weight="normal" fo:background-color="transparent" style:font-name-asian="Century Schoolbook2" style:font-size-asian="20pt" style:font-style-asian="italic" style:font-weight-asian="normal" style:font-name-complex="Century Schoolbook2" style:font-size-complex="20pt" style:font-style-complex="italic" style:font-weight-complex="normal"/>
+      <style:text-properties fo:font-variant="normal" fo:text-transform="none" fo:color="#000000" loext:opacity="100%" style:text-line-through-style="none" style:text-line-through-type="none" style:text-position="0% 100%" style:font-name="Century Schoolbook" fo:font-size="20pt" fo:letter-spacing="normal" fo:language="pt" fo:country="BR" fo:font-style="italic" style:text-underline-style="none" fo:font-weight="normal" fo:background-color="transparent" style:font-name-asian="Century Schoolbook" style:font-size-asian="20pt" style:font-style-asian="italic" style:font-weight-asian="normal" style:font-name-complex="Century Schoolbook" style:font-size-complex="20pt" style:font-style-complex="italic" style:font-weight-complex="normal"/>
     </style:style>
     <style:style style:name="T6" style:family="text">
-      <style:text-properties fo:font-variant="normal" fo:text-transform="none" fo:color="#000000" loext:opacity="100%" style:text-line-through-style="none" style:text-line-through-type="none" style:text-position="0% 100%" style:font-name="Century Schoolbook2" fo:font-size="20pt" fo:letter-spacing="normal" fo:language="pt" fo:country="BR" fo:font-style="normal" style:text-underline-style="none" fo:font-weight="normal" fo:background-color="transparent" style:font-name-asian="Century Schoolbook2" style:font-size-asian="20pt" style:font-style-asian="normal" style:font-weight-asian="normal" style:font-name-complex="Century Schoolbook2" style:font-size-complex="20pt" style:font-style-complex="normal" style:font-weight-complex="normal"/>
+      <style:text-properties fo:font-variant="normal" fo:text-transform="none" fo:color="#000000" loext:opacity="100%" style:text-line-through-style="none" style:text-line-through-type="none" style:text-position="0% 100%" style:font-name="Century Schoolbook" fo:font-size="20pt" fo:letter-spacing="normal" fo:language="pt" fo:country="BR" fo:font-style="normal" style:text-underline-style="none" fo:font-weight="normal" fo:background-color="transparent" style:font-name-asian="Century Schoolbook" style:font-size-asian="20pt" style:font-style-asian="normal" style:font-weight-asian="normal" style:font-name-complex="Century Schoolbook" style:font-size-complex="20pt" style:font-style-complex="normal" style:font-weight-complex="normal"/>
     </style:style>
     <style:style style:name="T7" style:family="text">
-      <style:text-properties fo:font-variant="small-caps" fo:color="#90c226" loext:opacity="100%" style:text-line-through-style="none" style:text-line-through-type="none" style:text-position="0% 100%" style:font-name="Century Schoolbook2" fo:font-size="28pt" fo:letter-spacing="normal" fo:language="pt" fo:country="BR" fo:font-style="normal" style:text-underline-style="none" fo:font-weight="bold" fo:background-color="transparent" style:font-size-asian="28pt" style:font-style-asian="normal" style:font-weight-asian="bold" style:font-size-complex="28pt" style:font-style-complex="normal" style:font-weight-complex="bold"/>
+      <style:text-properties fo:font-variant="small-caps" fo:color="#90c226" loext:opacity="100%" style:text-line-through-style="none" style:text-line-through-type="none" style:text-position="0% 100%" style:font-name="Century Schoolbook" fo:font-size="28pt" fo:letter-spacing="normal" fo:language="pt" fo:country="BR" fo:font-style="normal" style:text-underline-style="none" fo:font-weight="bold" fo:background-color="transparent" style:font-size-asian="28pt" style:font-style-asian="normal" style:font-weight-asian="bold" style:font-size-complex="28pt" style:font-style-complex="normal" style:font-weight-complex="bold"/>
     </style:style>
     <style:style style:name="T8" style:family="text">
-      <style:text-properties fo:font-variant="normal" fo:text-transform="none" fo:color="#000000" loext:opacity="100%" style:text-line-through-style="none" style:text-line-through-type="none" style:text-position="0% 100%" style:font-name="Century Schoolbook2" fo:font-size="26pt" fo:letter-spacing="normal" fo:language="pt" fo:country="BR" fo:font-style="normal" style:text-underline-style="none" fo:font-weight="normal" fo:background-color="transparent" style:font-size-asian="26pt" style:font-style-asian="normal" style:font-weight-asian="normal" style:font-size-complex="26pt" style:font-style-complex="normal" style:font-weight-complex="normal"/>
+      <style:text-properties fo:font-variant="normal" fo:text-transform="none" fo:color="#000000" loext:opacity="100%" style:text-line-through-style="none" style:text-line-through-type="none" style:text-position="0% 100%" style:font-name="Century Schoolbook" fo:font-size="26pt" fo:letter-spacing="normal" fo:language="pt" fo:country="BR" fo:font-style="normal" style:text-underline-style="none" fo:font-weight="normal" fo:background-color="transparent" style:font-size-asian="26pt" style:font-style-asian="normal" style:font-weight-asian="normal" style:font-size-complex="26pt" style:font-style-complex="normal" style:font-weight-complex="normal"/>
     </style:style>
     <style:style style:name="T9" style:family="text">
-      <style:text-properties fo:font-variant="normal" fo:text-transform="none" fo:color="#000000" loext:opacity="100%" style:text-line-through-style="none" style:text-line-through-type="none" style:text-position="0% 100%" style:font-name="Century Schoolbook2" fo:font-size="22pt" fo:letter-spacing="normal" fo:language="pt" fo:country="BR" fo:font-style="normal" style:text-underline-style="none" fo:font-weight="normal" fo:background-color="transparent" style:font-size-asian="22pt" style:font-style-asian="normal" style:font-weight-asian="normal" style:font-size-complex="22pt" style:font-style-complex="normal" style:font-weight-complex="normal"/>
+      <style:text-properties fo:font-variant="normal" fo:text-transform="none" fo:color="#000000" loext:opacity="100%" style:text-line-through-style="none" style:text-line-through-type="none" style:text-position="0% 100%" style:font-name="Century Schoolbook" fo:font-size="22pt" fo:letter-spacing="normal" fo:language="pt" fo:country="BR" fo:font-style="normal" style:text-underline-style="none" fo:font-weight="normal" fo:background-color="transparent" style:font-size-asian="22pt" style:font-style-asian="normal" style:font-weight-asian="normal" style:font-size-complex="22pt" style:font-style-complex="normal" style:font-weight-complex="normal"/>
     </style:style>
     <style:style style:name="T10" style:family="text">
-      <style:text-properties fo:font-variant="small-caps" fo:color="#90c226" loext:opacity="100%" style:text-line-through-style="none" style:text-line-through-type="none" style:text-position="0% 100%" style:font-name="Century Schoolbook2" fo:font-size="30pt" fo:letter-spacing="normal" fo:language="pt" fo:country="BR" fo:font-style="normal" style:text-underline-style="none" fo:font-weight="bold" fo:background-color="transparent" style:font-size-asian="30pt" style:font-style-asian="normal" style:font-weight-asian="bold" style:font-size-complex="30pt" style:font-style-complex="normal" style:font-weight-complex="bold"/>
+      <style:text-properties fo:font-variant="small-caps" fo:color="#90c226" loext:opacity="100%" style:text-line-through-style="none" style:text-line-through-type="none" style:text-position="0% 100%" style:font-name="Century Schoolbook" fo:font-size="30pt" fo:letter-spacing="normal" fo:language="pt" fo:country="BR" fo:font-style="normal" style:text-underline-style="none" fo:font-weight="bold" fo:background-color="transparent" style:font-size-asian="30pt" style:font-style-asian="normal" style:font-weight-asian="bold" style:font-size-complex="30pt" style:font-style-complex="normal" style:font-weight-complex="bold"/>
     </style:style>
     <style:style style:name="T11" style:family="text">
-      <style:text-properties fo:font-variant="normal" fo:text-transform="none" fo:color="#000000" loext:opacity="100%" style:text-line-through-style="none" style:text-line-through-type="none" style:text-position="0% 100%" style:font-name="Century Schoolbook2" fo:font-size="18pt" fo:letter-spacing="normal" fo:language="en" fo:country="US" fo:font-style="normal" style:text-underline-style="none" fo:font-weight="normal" fo:background-color="transparent" style:font-size-asian="18pt" style:font-style-asian="normal" style:font-weight-asian="normal" style:font-name-complex="Arial" style:font-size-complex="18pt" style:font-style-complex="normal" style:font-weight-complex="normal"/>
+      <style:text-properties fo:font-variant="normal" fo:text-transform="none" fo:color="#000000" loext:opacity="100%" style:text-line-through-style="none" style:text-line-through-type="none" style:text-position="0% 100%" style:font-name="Century Schoolbook" fo:font-size="18pt" fo:letter-spacing="normal" fo:language="en" fo:country="US" fo:font-style="normal" style:text-underline-style="none" fo:font-weight="normal" fo:background-color="transparent" style:font-size-asian="18pt" style:font-style-asian="normal" style:font-weight-asian="normal" style:font-name-complex="Arial" style:font-size-complex="18pt" style:font-style-complex="normal" style:font-weight-complex="normal"/>
     </style:style>
     <style:style style:name="T12" style:family="text">
-      <style:text-properties fo:font-variant="normal" fo:text-transform="none" fo:color="#000000" loext:opacity="100%" style:text-line-through-style="none" style:text-line-through-type="none" style:text-position="0% 100%" style:font-name="Arial2" fo:font-size="18pt" fo:letter-spacing="normal" fo:language="en" fo:country="US" fo:font-style="normal" style:text-underline-style="none" fo:font-weight="normal" fo:background-color="transparent" style:font-size-asian="18pt" style:font-style-asian="normal" style:font-weight-asian="normal" style:font-name-complex="Arial2" style:font-size-complex="18pt" style:font-style-complex="normal" style:font-weight-complex="normal"/>
+      <style:text-properties fo:font-variant="normal" fo:text-transform="none" fo:color="#000000" loext:opacity="100%" style:text-line-through-style="none" style:text-line-through-type="none" style:text-position="0% 100%" style:font-name="Arial3" fo:font-size="18pt" fo:letter-spacing="normal" fo:language="en" fo:country="US" fo:font-style="normal" style:text-underline-style="none" fo:font-weight="normal" fo:background-color="transparent" style:font-size-asian="18pt" style:font-style-asian="normal" style:font-weight-asian="normal" style:font-name-complex="Arial3" style:font-size-complex="18pt" style:font-style-complex="normal" style:font-weight-complex="normal"/>
     </style:style>
     <style:style style:name="T13" style:family="text">
       <style:text-properties fo:font-variant="normal" fo:text-transform="none" fo:color="#000000" loext:opacity="100%" style:text-outline="false" style:text-line-through-style="none" style:text-line-through-type="none" style:text-position="0% 100%" style:font-name="Arial" fo:font-size="18pt" fo:letter-spacing="normal" fo:language="en" fo:country="US" fo:font-style="normal" fo:text-shadow="none" style:text-underline-style="none" fo:font-weight="normal" style:letter-kerning="true" fo:background-color="transparent" style:font-name-asian="Arial" style:font-size-asian="18pt" style:font-style-asian="normal" style:font-weight-asian="normal" style:font-name-complex="Arial" style:font-size-complex="18pt" style:font-style-complex="normal" style:font-weight-complex="normal" style:text-emphasize="none" style:font-relief="none" style:text-overline-style="none" style:text-overline-color="font-color"/>
@@ -379,7 +391,7 @@
     <text:list-style style:name="L1">
       <text:list-level-style-bullet text:level="1" text:bullet-char="●">
         <style:list-level-properties text:min-label-width="0.6cm"/>
-        <style:text-properties fo:font-family="StarSymbol" fo:color="#000000" fo:font-size="100%"/>
+        <style:text-properties fo:font-family="StarSymbol" style:use-window-font-color="true" fo:font-size="45%"/>
       </text:list-level-style-bullet>
       <text:list-level-style-bullet text:level="2" text:bullet-char="●">
         <style:list-level-properties text:space-before="0.6cm" text:min-label-width="0.6cm"/>
@@ -421,7 +433,7 @@
     <text:list-style style:name="L2">
       <text:list-level-style-bullet text:level="1" text:bullet-char="●">
         <style:list-level-properties text:min-label-width="0.6cm"/>
-        <style:text-properties fo:font-family="StarSymbol" fo:color="#000000" fo:font-size="100%"/>
+        <style:text-properties fo:font-family="StarSymbol" style:use-window-font-color="true" fo:font-size="45%"/>
       </text:list-level-style-bullet>
       <text:list-level-style-bullet text:level="2" text:bullet-char="●">
         <style:list-level-properties text:space-before="0.6cm" text:min-label-width="0.6cm"/>
@@ -461,10 +473,10 @@
       </text:list-level-style-bullet>
     </text:list-style>
     <text:list-style style:name="L3">
-      <text:list-level-style-number text:level="1" style:num-format="">
+      <text:list-level-style-bullet text:level="1" text:bullet-char="●">
         <style:list-level-properties text:space-before="0.3cm" text:min-label-width="0.9cm"/>
-        <style:text-properties fo:color="#3e3d2d" fo:font-size="55%"/>
-      </text:list-level-style-number>
+        <style:text-properties fo:font-family="StarSymbol" style:use-window-font-color="true" fo:font-size="45%"/>
+      </text:list-level-style-bullet>
       <text:list-level-style-bullet text:level="2" text:bullet-char="–">
         <style:list-level-properties text:space-before="1.5cm" text:min-label-width="0.9cm"/>
         <style:text-properties fo:font-family="StarSymbol" style:use-window-font-color="true" fo:font-size="75%"/>
@@ -503,90 +515,6 @@
       </text:list-level-style-bullet>
     </text:list-style>
     <text:list-style style:name="L4">
-      <text:list-level-style-bullet text:level="1" text:bullet-char="">
-        <style:list-level-properties text:space-before="0.741cm" text:min-label-width="0.744cm"/>
-        <style:text-properties fo:font-family="Wingdings" style:font-pitch="variable" style:font-charset="x-symbol" fo:color="#3e3d2d" fo:font-size="55%"/>
-      </text:list-level-style-bullet>
-      <text:list-level-style-bullet text:level="2" text:bullet-char="–">
-        <style:list-level-properties text:space-before="1.5cm" text:min-label-width="0.9cm"/>
-        <style:text-properties fo:font-family="StarSymbol" style:use-window-font-color="true" fo:font-size="75%"/>
-      </text:list-level-style-bullet>
-      <text:list-level-style-bullet text:level="3" text:bullet-char="●">
-        <style:list-level-properties text:space-before="2.8cm" text:min-label-width="0.8cm"/>
-        <style:text-properties fo:font-family="StarSymbol" style:use-window-font-color="true" fo:font-size="45%"/>
-      </text:list-level-style-bullet>
-      <text:list-level-style-bullet text:level="4" text:bullet-char="–">
-        <style:list-level-properties text:space-before="4.2cm" text:min-label-width="0.6cm"/>
-        <style:text-properties fo:font-family="StarSymbol" style:use-window-font-color="true" fo:font-size="75%"/>
-      </text:list-level-style-bullet>
-      <text:list-level-style-bullet text:level="5" text:bullet-char="●">
-        <style:list-level-properties text:space-before="5.4cm" text:min-label-width="0.6cm"/>
-        <style:text-properties fo:font-family="StarSymbol" style:use-window-font-color="true" fo:font-size="45%"/>
-      </text:list-level-style-bullet>
-      <text:list-level-style-bullet text:level="6" text:bullet-char="●">
-        <style:list-level-properties text:space-before="6.6cm" text:min-label-width="0.6cm"/>
-        <style:text-properties fo:font-family="StarSymbol" style:use-window-font-color="true" fo:font-size="45%"/>
-      </text:list-level-style-bullet>
-      <text:list-level-style-bullet text:level="7" text:bullet-char="●">
-        <style:list-level-properties text:space-before="7.8cm" text:min-label-width="0.6cm"/>
-        <style:text-properties fo:font-family="StarSymbol" style:use-window-font-color="true" fo:font-size="45%"/>
-      </text:list-level-style-bullet>
-      <text:list-level-style-bullet text:level="8" text:bullet-char="●">
-        <style:list-level-properties text:space-before="9cm" text:min-label-width="0.6cm"/>
-        <style:text-properties fo:font-family="StarSymbol" style:use-window-font-color="true" fo:font-size="45%"/>
-      </text:list-level-style-bullet>
-      <text:list-level-style-bullet text:level="9" text:bullet-char="●">
-        <style:list-level-properties text:space-before="10.2cm" text:min-label-width="0.6cm"/>
-        <style:text-properties fo:font-family="StarSymbol" style:use-window-font-color="true" fo:font-size="45%"/>
-      </text:list-level-style-bullet>
-      <text:list-level-style-bullet text:level="10" text:bullet-char="●">
-        <style:list-level-properties text:space-before="11.4cm" text:min-label-width="0.6cm"/>
-        <style:text-properties fo:font-family="StarSymbol" style:use-window-font-color="true" fo:font-size="45%"/>
-      </text:list-level-style-bullet>
-    </text:list-style>
-    <text:list-style style:name="L5">
-      <text:list-level-style-number text:level="1" style:num-format="">
-        <style:list-level-properties text:space-before="0.741cm" text:min-label-width="0.744cm"/>
-        <style:text-properties fo:color="#3e3d2d" fo:font-size="55%"/>
-      </text:list-level-style-number>
-      <text:list-level-style-bullet text:level="2" text:bullet-char="–">
-        <style:list-level-properties text:space-before="1.5cm" text:min-label-width="0.9cm"/>
-        <style:text-properties fo:font-family="StarSymbol" style:use-window-font-color="true" fo:font-size="75%"/>
-      </text:list-level-style-bullet>
-      <text:list-level-style-bullet text:level="3" text:bullet-char="●">
-        <style:list-level-properties text:space-before="2.8cm" text:min-label-width="0.8cm"/>
-        <style:text-properties fo:font-family="StarSymbol" style:use-window-font-color="true" fo:font-size="45%"/>
-      </text:list-level-style-bullet>
-      <text:list-level-style-bullet text:level="4" text:bullet-char="–">
-        <style:list-level-properties text:space-before="4.2cm" text:min-label-width="0.6cm"/>
-        <style:text-properties fo:font-family="StarSymbol" style:use-window-font-color="true" fo:font-size="75%"/>
-      </text:list-level-style-bullet>
-      <text:list-level-style-bullet text:level="5" text:bullet-char="●">
-        <style:list-level-properties text:space-before="5.4cm" text:min-label-width="0.6cm"/>
-        <style:text-properties fo:font-family="StarSymbol" style:use-window-font-color="true" fo:font-size="45%"/>
-      </text:list-level-style-bullet>
-      <text:list-level-style-bullet text:level="6" text:bullet-char="●">
-        <style:list-level-properties text:space-before="6.6cm" text:min-label-width="0.6cm"/>
-        <style:text-properties fo:font-family="StarSymbol" style:use-window-font-color="true" fo:font-size="45%"/>
-      </text:list-level-style-bullet>
-      <text:list-level-style-bullet text:level="7" text:bullet-char="●">
-        <style:list-level-properties text:space-before="7.8cm" text:min-label-width="0.6cm"/>
-        <style:text-properties fo:font-family="StarSymbol" style:use-window-font-color="true" fo:font-size="45%"/>
-      </text:list-level-style-bullet>
-      <text:list-level-style-bullet text:level="8" text:bullet-char="●">
-        <style:list-level-properties text:space-before="9cm" text:min-label-width="0.6cm"/>
-        <style:text-properties fo:font-family="StarSymbol" style:use-window-font-color="true" fo:font-size="45%"/>
-      </text:list-level-style-bullet>
-      <text:list-level-style-bullet text:level="9" text:bullet-char="●">
-        <style:list-level-properties text:space-before="10.2cm" text:min-label-width="0.6cm"/>
-        <style:text-properties fo:font-family="StarSymbol" style:use-window-font-color="true" fo:font-size="45%"/>
-      </text:list-level-style-bullet>
-      <text:list-level-style-bullet text:level="10" text:bullet-char="●">
-        <style:list-level-properties text:space-before="11.4cm" text:min-label-width="0.6cm"/>
-        <style:text-properties fo:font-family="StarSymbol" style:use-window-font-color="true" fo:font-size="45%"/>
-      </text:list-level-style-bullet>
-    </text:list-style>
-    <text:list-style style:name="L6">
       <text:list-level-style-bullet text:level="1" text:bullet-char="●">
         <style:list-level-properties text:min-label-width="0.6cm"/>
         <style:text-properties fo:font-family="StarSymbol" fo:color="#90c226" fo:font-size="100%"/>
@@ -628,10 +556,10 @@
         <style:text-properties fo:font-family="StarSymbol" style:use-window-font-color="true" fo:font-size="45%"/>
       </text:list-level-style-bullet>
     </text:list-style>
-    <text:list-style style:name="L7">
+    <text:list-style style:name="L5">
       <text:list-level-style-bullet text:level="1" text:bullet-char="●">
         <style:list-level-properties text:min-label-width="0.6cm"/>
-        <style:text-properties fo:font-family="StarSymbol" style:use-window-font-color="true" fo:font-size="45%"/>
+        <style:text-properties fo:font-family="StarSymbol" fo:color="#000000" fo:font-size="100%"/>
       </text:list-level-style-bullet>
       <text:list-level-style-bullet text:level="2" text:bullet-char="●">
         <style:list-level-properties text:space-before="0.6cm" text:min-label-width="0.6cm"/>
@@ -670,7 +598,7 @@
         <style:text-properties fo:font-family="StarSymbol" style:use-window-font-color="true" fo:font-size="45%"/>
       </text:list-level-style-bullet>
     </text:list-style>
-    <text:list-style style:name="L8">
+    <text:list-style style:name="L6">
       <text:list-level-style-bullet text:level="1" text:bullet-char="●">
         <style:list-level-properties text:space-before="-0.6cm" text:min-label-width="0.6cm"/>
         <style:text-properties fo:font-family="StarSymbol" style:use-window-font-color="true" fo:font-size="100%"/>
@@ -724,7 +652,7 @@
             <text:span text:style-name="T1"> </text:span>
             <text:span text:style-name="T1">2º semestre - Técnico de Informática para Internet</text:span>
           </text:p>
-          <draw:enhanced-geometry draw:mirror-horizontal="false" draw:mirror-vertical="false" draw:text-areas="0 0 ?f3 ?f2" svg:viewBox="0 0 0 0" draw:type="ooxml-rect" draw:enhanced-path="M 0 0 L ?f3 0 ?f3 ?f2 0 ?f2 Z N">
+          <draw:enhanced-geometry draw:mirror-horizontal="false" draw:mirror-vertical="false" svg:viewBox="0 0 0 0" draw:text-areas="0 0 ?f3 ?f2" draw:type="ooxml-rect" draw:enhanced-path="M 0 0 L ?f3 0 ?f3 ?f2 0 ?f2 Z N">
             <draw:equation draw:name="f0" draw:formula="logwidth/2"/>
             <draw:equation draw:name="f1" draw:formula="logheight/2"/>
             <draw:equation draw:name="f2" draw:formula="logheight"/>
@@ -757,7 +685,7 @@
               <text:span text:style-name="T3"/>
             </text:p>
             <text:p text:style-name="P8">
-              <text:span text:style-name="T4">Richard Moreira de As</text:span>
+              <text:span text:style-name="T4">Richard Moreira de Sa</text:span>
             </text:p>
             <text:p text:style-name="P8">
               <text:span text:style-name="T4">Thiago Inácio lima</text:span>
@@ -782,11 +710,11 @@
             </text:p>
           </draw:text-box>
         </draw:frame>
-        <draw:custom-shape draw:name="Título 1" draw:style-name="gr3" draw:text-style-name="P11" draw:layer="layout" svg:width="20.742cm" svg:height="2.16cm" svg:x="1.349cm" svg:y="1.724cm">
-          <text:p text:style-name="P1">
+        <draw:custom-shape draw:name="Título 1" draw:style-name="gr3" draw:text-style-name="P12" draw:layer="layout" svg:width="20.742cm" svg:height="2.16cm" svg:x="1.349cm" svg:y="1.724cm">
+          <text:p text:style-name="P11">
             <text:span text:style-name="T7">Membros do Grupo</text:span>
           </text:p>
-          <draw:enhanced-geometry draw:mirror-horizontal="false" draw:mirror-vertical="false" draw:text-areas="0 0 ?f3 ?f2" svg:viewBox="0 0 0 0" draw:type="ooxml-rect" draw:enhanced-path="M 0 0 L ?f3 0 ?f3 ?f2 0 ?f2 Z N">
+          <draw:enhanced-geometry draw:mirror-horizontal="false" draw:mirror-vertical="false" svg:viewBox="0 0 0 0" draw:text-areas="0 0 ?f3 ?f2" draw:type="ooxml-rect" draw:enhanced-path="M 0 0 L ?f3 0 ?f3 ?f2 0 ?f2 Z N">
             <draw:equation draw:name="f0" draw:formula="logwidth/2"/>
             <draw:equation draw:name="f1" draw:formula="logheight/2"/>
             <draw:equation draw:name="f2" draw:formula="logheight"/>
@@ -795,15 +723,15 @@
         </draw:custom-shape>
         <presentation:notes draw:style-name="dp4">
           <draw:page-thumbnail draw:style-name="gr2" draw:layer="layout" svg:width="19.798cm" svg:height="11.136cm" svg:x="0.6cm" svg:y="2.257cm" draw:page-number="2" presentation:class="page"/>
-          <draw:frame presentation:style-name="pr4" draw:text-style-name="P12" draw:layer="layout" svg:width="16.799cm" svg:height="13.364cm" svg:x="2.1cm" svg:y="14.107cm" presentation:class="notes" presentation:placeholder="true">
+          <draw:frame presentation:style-name="pr4" draw:text-style-name="P13" draw:layer="layout" svg:width="16.799cm" svg:height="13.364cm" svg:x="2.1cm" svg:y="14.107cm" presentation:class="notes" presentation:placeholder="true">
             <draw:text-box/>
           </draw:frame>
         </presentation:notes>
       </draw:page>
       <draw:page draw:name="page3" draw:style-name="dp3" draw:master-page-name="Título_20_e_20_conteúdo">
-        <draw:frame draw:name="Espaço Reservado para Conteúdo 2" presentation:style-name="pr5" draw:text-style-name="P14" draw:layer="layout" svg:width="20.742cm" svg:height="13.603cm" svg:x="1.363cm" svg:y="4.723cm" presentation:class="outline" presentation:user-transformed="true">
+        <draw:frame draw:name="Espaço Reservado para Conteúdo 2" presentation:style-name="pr5" draw:text-style-name="P15" draw:layer="layout" svg:width="20.742cm" svg:height="13.603cm" svg:x="1.363cm" svg:y="4.723cm" presentation:class="outline" presentation:user-transformed="true">
           <draw:text-box>
-            <text:p text:style-name="P13">
+            <text:p text:style-name="P14">
               <text:span text:style-name="T8">Descrição</text:span>
             </text:p>
             <text:p text:style-name="P7">
@@ -811,11 +739,11 @@
             </text:p>
           </draw:text-box>
         </draw:frame>
-        <draw:custom-shape draw:name="Título 1" draw:style-name="gr3" draw:text-style-name="P11" draw:layer="layout" svg:width="20.742cm" svg:height="2.16cm" svg:x="1.737cm" svg:y="2.125cm">
-          <text:p text:style-name="P1">
+        <draw:custom-shape draw:name="Título 1" draw:style-name="gr3" draw:text-style-name="P12" draw:layer="layout" svg:width="20.742cm" svg:height="2.16cm" svg:x="1.737cm" svg:y="2.125cm">
+          <text:p text:style-name="P11">
             <text:span text:style-name="T10">Projeto Integrador: STPSP</text:span>
           </text:p>
-          <draw:enhanced-geometry draw:mirror-horizontal="false" draw:mirror-vertical="false" draw:text-areas="0 0 ?f3 ?f2" svg:viewBox="0 0 0 0" draw:type="ooxml-rect" draw:enhanced-path="M 0 0 L ?f3 0 ?f3 ?f2 0 ?f2 Z N">
+          <draw:enhanced-geometry draw:mirror-horizontal="false" draw:mirror-vertical="false" svg:viewBox="0 0 0 0" draw:text-areas="0 0 ?f3 ?f2" draw:type="ooxml-rect" draw:enhanced-path="M 0 0 L ?f3 0 ?f3 ?f2 0 ?f2 Z N">
             <draw:equation draw:name="f0" draw:formula="logwidth/2"/>
             <draw:equation draw:name="f1" draw:formula="logheight/2"/>
             <draw:equation draw:name="f2" draw:formula="logheight"/>
@@ -824,31 +752,31 @@
         </draw:custom-shape>
         <presentation:notes draw:style-name="dp4">
           <draw:page-thumbnail draw:style-name="gr2" draw:layer="layout" svg:width="12.699cm" svg:height="9.524cm" svg:x="3.175cm" svg:y="1.93cm" draw:page-number="3" presentation:class="page"/>
-          <draw:frame presentation:style-name="pr6" draw:text-style-name="P12" draw:layer="layout" svg:width="15.239cm" svg:height="11.429cm" svg:x="1.905cm" svg:y="12.065cm" presentation:class="notes" presentation:placeholder="true">
+          <draw:frame presentation:style-name="pr6" draw:text-style-name="P13" draw:layer="layout" svg:width="15.239cm" svg:height="11.429cm" svg:x="1.905cm" svg:y="12.065cm" presentation:class="notes" presentation:placeholder="true">
             <draw:text-box/>
           </draw:frame>
         </presentation:notes>
       </draw:page>
       <draw:page draw:name="page4" draw:style-name="dp3" draw:master-page-name="Título_20_e_20_conteúdo">
-        <draw:custom-shape draw:name="Título 1" draw:style-name="gr3" draw:text-style-name="P11" draw:layer="layout" svg:width="20.742cm" svg:height="1.404cm" svg:x="1.499cm" svg:y="2.522cm">
-          <text:p text:style-name="P1">
+        <draw:custom-shape draw:name="Título 1" draw:style-name="gr3" draw:text-style-name="P12" draw:layer="layout" svg:width="20.742cm" svg:height="1.404cm" svg:x="1.499cm" svg:y="2.522cm">
+          <text:p text:style-name="P11">
             <text:span text:style-name="T7">Escopo</text:span>
           </text:p>
-          <draw:enhanced-geometry draw:mirror-horizontal="false" draw:mirror-vertical="false" draw:text-areas="0 0 ?f3 ?f2" svg:viewBox="0 0 0 0" draw:type="ooxml-rect" draw:enhanced-path="M 0 0 L ?f3 0 ?f3 ?f2 0 ?f2 Z N">
+          <draw:enhanced-geometry draw:mirror-horizontal="false" draw:mirror-vertical="false" svg:viewBox="0 0 0 0" draw:text-areas="0 0 ?f3 ?f2" draw:type="ooxml-rect" draw:enhanced-path="M 0 0 L ?f3 0 ?f3 ?f2 0 ?f2 Z N">
             <draw:equation draw:name="f0" draw:formula="logwidth/2"/>
             <draw:equation draw:name="f1" draw:formula="logheight/2"/>
             <draw:equation draw:name="f2" draw:formula="logheight"/>
             <draw:equation draw:name="f3" draw:formula="logwidth"/>
           </draw:enhanced-geometry>
         </draw:custom-shape>
-        <draw:custom-shape draw:name="CaixaDeTexto 1" draw:style-name="gr4" draw:text-style-name="P16" draw:layer="layout" svg:width="20.747cm" svg:height="11.685cm" svg:x="1.507cm" svg:y="4.027cm">
-          <text:p text:style-name="P15">
+        <draw:custom-shape draw:name="CaixaDeTexto 1" draw:style-name="gr4" draw:text-style-name="P17" draw:layer="layout" svg:width="20.747cm" svg:height="11.685cm" svg:x="1.507cm" svg:y="4.027cm">
+          <text:p text:style-name="P16">
             <text:span text:style-name="T11">O Sistema a ser produzido sera chamado de Sistema de Transporte Público de São Paulo, tendo como objetivo principal a autenticação de cartões de clientes de ônibus. Este produto realizará a administração de funcionários, clientes, linhas e o funcionamento das catracas. Adicionalmente, na entrega deste sistema também se terá uma interface para os gerentes da empresa e uma interface online para os clientes e demais pessoas. Este produto será um produto self-cache, o que significa que ele NÃO realizará qualquer tipo de pagamento. Este sistema será útil para garantir a entrada de clientes apenas com o cartão, além de proporcionar um método de diminuir a interação negativa e geral entre o motorista e o passageiro. Este tipo de sistema trará à empresa a nova tecnologia de veículos públicos que está começando a ser implementada no mercado. Tal sistema busca melhorar o uso de veículos públicos e, portanto, trazer boa fama a empresa disposta a desfrutar deste produto.</text:span>
           </text:p>
-          <text:p text:style-name="P15">
+          <text:p text:style-name="P16">
             <text:span text:style-name="T12"/>
           </text:p>
-          <draw:enhanced-geometry draw:mirror-horizontal="false" draw:mirror-vertical="false" draw:text-areas="0 0 ?f3 ?f2" svg:viewBox="0 0 0 0" draw:type="ooxml-rect" draw:enhanced-path="M 0 0 L ?f3 0 ?f3 ?f2 0 ?f2 Z N">
+          <draw:enhanced-geometry draw:mirror-horizontal="false" draw:mirror-vertical="false" svg:viewBox="0 0 0 0" draw:text-areas="0 0 ?f3 ?f2" draw:type="ooxml-rect" draw:enhanced-path="M 0 0 L ?f3 0 ?f3 ?f2 0 ?f2 Z N">
             <draw:equation draw:name="f0" draw:formula="logwidth/2"/>
             <draw:equation draw:name="f1" draw:formula="logheight/2"/>
             <draw:equation draw:name="f2" draw:formula="logheight"/>
@@ -857,33 +785,33 @@
         </draw:custom-shape>
         <presentation:notes draw:style-name="dp4">
           <draw:page-thumbnail draw:style-name="gr2" draw:layer="layout" svg:width="12.699cm" svg:height="9.524cm" svg:x="3.175cm" svg:y="1.93cm" draw:page-number="4" presentation:class="page"/>
-          <draw:frame presentation:style-name="pr6" draw:text-style-name="P12" draw:layer="layout" svg:width="15.239cm" svg:height="11.429cm" svg:x="1.905cm" svg:y="12.065cm" presentation:class="notes" presentation:placeholder="true">
+          <draw:frame presentation:style-name="pr6" draw:text-style-name="P13" draw:layer="layout" svg:width="15.239cm" svg:height="11.429cm" svg:x="1.905cm" svg:y="12.065cm" presentation:class="notes" presentation:placeholder="true">
             <draw:text-box/>
           </draw:frame>
         </presentation:notes>
       </draw:page>
       <draw:page draw:name="page5" draw:style-name="dp3" draw:master-page-name="Título_20_e_20_conteúdo">
-        <draw:custom-shape draw:name="Título 1" draw:style-name="gr3" draw:text-style-name="P11" draw:layer="layout" svg:width="20.742cm" svg:height="1.58cm" svg:x="1.625cm" svg:y="2.598cm">
-          <text:p text:style-name="P1">
+        <draw:custom-shape draw:name="Título 1" draw:style-name="gr3" draw:text-style-name="P12" draw:layer="layout" svg:width="20.742cm" svg:height="1.58cm" svg:x="1.625cm" svg:y="2.598cm">
+          <text:p text:style-name="P11">
             <text:span text:style-name="T7">Diagrama do Banco</text:span>
           </text:p>
-          <draw:enhanced-geometry draw:mirror-horizontal="false" draw:mirror-vertical="false" draw:text-areas="0 0 ?f3 ?f2" svg:viewBox="0 0 0 0" draw:type="ooxml-rect" draw:enhanced-path="M 0 0 L ?f3 0 ?f3 ?f2 0 ?f2 Z N">
+          <draw:enhanced-geometry draw:mirror-horizontal="false" draw:mirror-vertical="false" svg:viewBox="0 0 0 0" draw:text-areas="0 0 ?f3 ?f2" draw:type="ooxml-rect" draw:enhanced-path="M 0 0 L ?f3 0 ?f3 ?f2 0 ?f2 Z N">
             <draw:equation draw:name="f0" draw:formula="logwidth/2"/>
             <draw:equation draw:name="f1" draw:formula="logheight/2"/>
             <draw:equation draw:name="f2" draw:formula="logheight"/>
             <draw:equation draw:name="f3" draw:formula="logwidth"/>
           </draw:enhanced-geometry>
         </draw:custom-shape>
-        <draw:custom-shape draw:name="Retângulo 1" draw:style-name="gr5" draw:text-style-name="P17" draw:layer="layout" svg:width="3.8cm" svg:height="0.396cm" svg:x="2.897cm" svg:y="17.127cm">
-          <text:p text:style-name="P1"/>
-          <draw:enhanced-geometry draw:mirror-horizontal="false" draw:mirror-vertical="false" draw:text-areas="0 0 ?f3 ?f2" svg:viewBox="0 0 0 0" draw:type="ooxml-rect" draw:enhanced-path="M 0 0 L ?f3 0 ?f3 ?f2 0 ?f2 Z N">
+        <draw:custom-shape draw:name="Retângulo 1" draw:style-name="gr5" draw:text-style-name="P18" draw:layer="layout" svg:width="3.8cm" svg:height="0.396cm" svg:x="2.897cm" svg:y="17.127cm">
+          <text:p/>
+          <draw:enhanced-geometry draw:mirror-horizontal="false" draw:mirror-vertical="false" svg:viewBox="0 0 0 0" draw:text-areas="0 0 ?f3 ?f2" draw:type="ooxml-rect" draw:enhanced-path="M 0 0 L ?f3 0 ?f3 ?f2 0 ?f2 Z N">
             <draw:equation draw:name="f0" draw:formula="logwidth/2"/>
             <draw:equation draw:name="f1" draw:formula="logheight/2"/>
             <draw:equation draw:name="f2" draw:formula="logheight"/>
             <draw:equation draw:name="f3" draw:formula="logwidth"/>
           </draw:enhanced-geometry>
         </draw:custom-shape>
-        <draw:frame draw:name="Imagem 2" draw:style-name="gr6" draw:text-style-name="P18" draw:layer="layout" svg:width="20.737cm" svg:height="12.1cm" svg:x="1.814cm" svg:y="4.86cm">
+        <draw:frame draw:name="Imagem 2" draw:style-name="gr6" draw:text-style-name="P19" draw:layer="layout" svg:width="20.737cm" svg:height="12.1cm" svg:x="1.814cm" svg:y="4.86cm">
           <draw:image xlink:href="Pictures/10000000000004500000032BB1C76DD6DCCD9D0A.jpg" xlink:type="simple" xlink:show="embed" xlink:actuate="onLoad" draw:mime-type="image/jpeg">
             <text:p/>
           </draw:image>
@@ -892,31 +820,31 @@
         </draw:frame>
         <presentation:notes draw:style-name="dp4">
           <draw:page-thumbnail draw:style-name="gr2" draw:layer="layout" svg:width="12.699cm" svg:height="9.524cm" svg:x="3.175cm" svg:y="1.93cm" draw:page-number="5" presentation:class="page"/>
-          <draw:frame presentation:style-name="pr6" draw:text-style-name="P12" draw:layer="layout" svg:width="15.239cm" svg:height="11.429cm" svg:x="1.905cm" svg:y="12.065cm" presentation:class="notes" presentation:placeholder="true">
+          <draw:frame presentation:style-name="pr6" draw:text-style-name="P13" draw:layer="layout" svg:width="15.239cm" svg:height="11.429cm" svg:x="1.905cm" svg:y="12.065cm" presentation:class="notes" presentation:placeholder="true">
             <draw:text-box/>
           </draw:frame>
         </presentation:notes>
       </draw:page>
       <draw:page draw:name="page6" draw:style-name="dp3" draw:master-page-name="Título_20_e_20_conteúdo">
-        <draw:custom-shape draw:name="Título 1" draw:style-name="gr3" draw:text-style-name="P11" draw:layer="layout" svg:width="20.742cm" svg:height="1.479cm" svg:x="1.499cm" svg:y="2.8cm">
-          <text:p text:style-name="P1">
+        <draw:custom-shape draw:name="Título 1" draw:style-name="gr3" draw:text-style-name="P12" draw:layer="layout" svg:width="20.742cm" svg:height="1.479cm" svg:x="1.499cm" svg:y="2.8cm">
+          <text:p text:style-name="P11">
             <text:span text:style-name="T7">Lista de Funções</text:span>
           </text:p>
-          <draw:enhanced-geometry draw:mirror-horizontal="false" draw:mirror-vertical="false" draw:text-areas="0 0 ?f3 ?f2" svg:viewBox="0 0 0 0" draw:type="ooxml-rect" draw:enhanced-path="M 0 0 L ?f3 0 ?f3 ?f2 0 ?f2 Z N">
+          <draw:enhanced-geometry draw:mirror-horizontal="false" draw:mirror-vertical="false" svg:viewBox="0 0 0 0" draw:text-areas="0 0 ?f3 ?f2" draw:type="ooxml-rect" draw:enhanced-path="M 0 0 L ?f3 0 ?f3 ?f2 0 ?f2 Z N">
             <draw:equation draw:name="f0" draw:formula="logwidth/2"/>
             <draw:equation draw:name="f1" draw:formula="logheight/2"/>
             <draw:equation draw:name="f2" draw:formula="logheight"/>
             <draw:equation draw:name="f3" draw:formula="logwidth"/>
           </draw:enhanced-geometry>
         </draw:custom-shape>
-        <draw:custom-shape draw:name="CaixaDeTexto 4" draw:style-name="gr4" draw:text-style-name="P21" draw:layer="layout" svg:width="20.747cm" svg:height="11.41cm" svg:x="1.753cm" svg:y="4.858cm">
-          <text:p text:style-name="P19">
+        <draw:custom-shape draw:name="CaixaDeTexto 4" draw:style-name="gr4" draw:text-style-name="P22" draw:layer="layout" svg:width="20.747cm" svg:height="11.41cm" svg:x="1.753cm" svg:y="4.858cm">
+          <text:p text:style-name="P20">
             <text:span text:style-name="T13">O sistema terá métodos para a autenticação do cliente e do administrador, assim assegurando a segurança dos dados do cliente e do sistema administrador. A recarga poderá ser feita pelos próprios clientes. Caso o cliente desejar realizar a recarga sozinho, ele deverá se autenticar no site público e se direcionar à aba de recarga. O software também será capaz de cadastro, edição, exclusão e visualização de clientes, linhas e motoristas, tendo também uma lista de cada um dos mencionados.</text:span>
           </text:p>
-          <text:p text:style-name="P20">
+          <text:p text:style-name="P21">
             <text:span text:style-name="T12"/>
           </text:p>
-          <draw:enhanced-geometry draw:mirror-horizontal="false" draw:mirror-vertical="false" draw:text-areas="0 0 ?f3 ?f2" svg:viewBox="0 0 0 0" draw:type="ooxml-rect" draw:enhanced-path="M 0 0 L ?f3 0 ?f3 ?f2 0 ?f2 Z N">
+          <draw:enhanced-geometry draw:mirror-horizontal="false" draw:mirror-vertical="false" svg:viewBox="0 0 0 0" draw:text-areas="0 0 ?f3 ?f2" draw:type="ooxml-rect" draw:enhanced-path="M 0 0 L ?f3 0 ?f3 ?f2 0 ?f2 Z N">
             <draw:equation draw:name="f0" draw:formula="logwidth/2"/>
             <draw:equation draw:name="f1" draw:formula="logheight/2"/>
             <draw:equation draw:name="f2" draw:formula="logheight"/>
@@ -925,54 +853,54 @@
         </draw:custom-shape>
         <presentation:notes draw:style-name="dp4">
           <draw:page-thumbnail draw:style-name="gr2" draw:layer="layout" svg:width="12.699cm" svg:height="9.524cm" svg:x="3.175cm" svg:y="1.93cm" draw:page-number="6" presentation:class="page"/>
-          <draw:frame presentation:style-name="pr6" draw:text-style-name="P12" draw:layer="layout" svg:width="15.239cm" svg:height="11.429cm" svg:x="1.905cm" svg:y="12.065cm" presentation:class="notes" presentation:placeholder="true">
+          <draw:frame presentation:style-name="pr6" draw:text-style-name="P13" draw:layer="layout" svg:width="15.239cm" svg:height="11.429cm" svg:x="1.905cm" svg:y="12.065cm" presentation:class="notes" presentation:placeholder="true">
             <draw:text-box/>
           </draw:frame>
         </presentation:notes>
       </draw:page>
       <draw:page draw:name="page7" draw:style-name="dp3" draw:master-page-name="Título_20_e_20_conteúdo_5f_">
-        <draw:custom-shape draw:name="Título 2" draw:style-name="gr7" draw:text-style-name="P22" draw:layer="layout" svg:width="20.742cm" svg:height="1.479cm" svg:x="1.499cm" svg:y="2.8cm">
-          <text:p text:style-name="P1">
+        <draw:custom-shape draw:name="Título 2" draw:style-name="gr7" draw:text-style-name="P23" draw:layer="layout" svg:width="20.742cm" svg:height="1.479cm" svg:x="1.499cm" svg:y="2.8cm">
+          <text:p text:style-name="P11">
             <text:span text:style-name="T7">Sistema administrativo</text:span>
           </text:p>
-          <draw:enhanced-geometry draw:mirror-horizontal="false" draw:mirror-vertical="false" draw:text-areas="0 0 ?f3 ?f2" svg:viewBox="0 0 0 0" draw:type="ooxml-rect" draw:enhanced-path="M 0 0 L ?f3 0 ?f3 ?f2 0 ?f2 Z N">
+          <draw:enhanced-geometry draw:mirror-horizontal="false" draw:mirror-vertical="false" svg:viewBox="0 0 0 0" draw:text-areas="0 0 ?f3 ?f2" draw:type="ooxml-rect" draw:enhanced-path="M 0 0 L ?f3 0 ?f3 ?f2 0 ?f2 Z N">
             <draw:equation draw:name="f0" draw:formula="logwidth/2"/>
             <draw:equation draw:name="f1" draw:formula="logheight/2"/>
             <draw:equation draw:name="f2" draw:formula="logheight"/>
             <draw:equation draw:name="f3" draw:formula="logwidth"/>
           </draw:enhanced-geometry>
         </draw:custom-shape>
-        <draw:custom-shape draw:name="CaixaDeTexto 2" draw:style-name="gr8" draw:text-style-name="P24" draw:layer="layout" svg:width="20.747cm" svg:height="12.553cm" svg:x="1.507cm" svg:y="4.858cm">
-          <text:p text:style-name="P23">
+        <draw:custom-shape draw:name="CaixaDeTexto 2" draw:style-name="gr8" draw:text-style-name="P25" draw:layer="layout" svg:width="20.747cm" svg:height="12.553cm" svg:x="1.507cm" svg:y="4.858cm">
+          <text:p text:style-name="P24">
             <text:span text:style-name="T13">
               O sistema admnistrativo terá a capacidade de realizar a autenticação de admnistradores para a proteção dos dados sensíveis presentes no sistema. O cadastro de 
               <text:s/>
               perfis de clientes, juntamente com sua edição, visualização, listagem e exclusão, serão uma parte das funcionalidades do sistema admnistrativo, o mesmo se aplicando para outros elementos como linhas e motoristas. Acrescentando às funcionalidades do projeto teremos a listagem de agendamentos feitos no site público pelos clientes, assim permitindo aos funcionários se prepararem para possíveis clientes que queiram se cadastrarem no sistema.
             </text:span>
           </text:p>
-          <text:p text:style-name="P15">
+          <text:p text:style-name="P16">
             <text:span text:style-name="T12"/>
           </text:p>
-          <draw:enhanced-geometry draw:mirror-horizontal="false" draw:mirror-vertical="false" draw:text-areas="0 0 ?f3 ?f2" svg:viewBox="0 0 0 0" draw:type="ooxml-rect" draw:enhanced-path="M 0 0 L ?f3 0 ?f3 ?f2 0 ?f2 Z N">
+          <draw:enhanced-geometry draw:mirror-horizontal="false" draw:mirror-vertical="false" svg:viewBox="0 0 0 0" draw:text-areas="0 0 ?f3 ?f2" draw:type="ooxml-rect" draw:enhanced-path="M 0 0 L ?f3 0 ?f3 ?f2 0 ?f2 Z N">
             <draw:equation draw:name="f0" draw:formula="logwidth/2"/>
             <draw:equation draw:name="f1" draw:formula="logheight/2"/>
             <draw:equation draw:name="f2" draw:formula="logheight"/>
             <draw:equation draw:name="f3" draw:formula="logwidth"/>
           </draw:enhanced-geometry>
         </draw:custom-shape>
-        <presentation:notes draw:style-name="dp5">
+        <presentation:notes draw:style-name="dp4">
           <draw:page-thumbnail draw:style-name="gr2" draw:layer="layout" svg:width="12.699cm" svg:height="9.524cm" svg:x="3.175cm" svg:y="1.93cm" draw:page-number="7" presentation:class="page"/>
-          <draw:frame presentation:style-name="pr7" draw:text-style-name="P12" draw:layer="layout" svg:width="15.239cm" svg:height="11.429cm" svg:x="1.905cm" svg:y="12.065cm" presentation:class="notes" presentation:placeholder="true">
+          <draw:frame presentation:style-name="pr7" draw:text-style-name="P13" draw:layer="layout" svg:width="15.239cm" svg:height="11.429cm" svg:x="1.905cm" svg:y="12.065cm" presentation:class="notes" presentation:placeholder="true">
             <draw:text-box/>
           </draw:frame>
         </presentation:notes>
       </draw:page>
       <draw:page draw:name="page8" draw:style-name="dp3" draw:master-page-name="Título_20_e_20_conteúdo_5f_">
-        <draw:custom-shape draw:name="Título 4" draw:style-name="gr9" draw:text-style-name="P22" draw:layer="layout" svg:width="20.742cm" svg:height="1.479cm" svg:x="1.499cm" svg:y="2.8cm">
-          <text:p text:style-name="P25">
+        <draw:custom-shape draw:name="Título 4" draw:style-name="gr9" draw:text-style-name="P23" draw:layer="layout" svg:width="20.742cm" svg:height="1.479cm" svg:x="1.499cm" svg:y="2.8cm">
+          <text:p text:style-name="P11">
             <text:span text:style-name="T7">Sistema Público</text:span>
           </text:p>
-          <draw:enhanced-geometry draw:mirror-horizontal="false" draw:mirror-vertical="false" draw:text-areas="0 0 ?f3 ?f2" svg:viewBox="0 0 0 0" draw:type="ooxml-rect" draw:enhanced-path="M 0 0 L ?f3 0 ?f3 ?f2 0 ?f2 Z N">
+          <draw:enhanced-geometry draw:mirror-horizontal="false" draw:mirror-vertical="false" svg:viewBox="0 0 0 0" draw:text-areas="0 0 ?f3 ?f2" draw:type="ooxml-rect" draw:enhanced-path="M 0 0 L ?f3 0 ?f3 ?f2 0 ?f2 Z N">
             <draw:equation draw:name="f0" draw:formula="logwidth/2"/>
             <draw:equation draw:name="f1" draw:formula="logheight/2"/>
             <draw:equation draw:name="f2" draw:formula="logheight"/>
@@ -986,14 +914,14 @@
           <text:p text:style-name="P27">
             <text:span text:style-name="T12"/>
           </text:p>
-          <draw:enhanced-geometry draw:mirror-horizontal="false" draw:mirror-vertical="false" draw:text-areas="0 0 ?f3 ?f2" svg:viewBox="0 0 0 0" draw:type="ooxml-rect" draw:enhanced-path="M 0 0 L ?f3 0 ?f3 ?f2 0 ?f2 Z N">
+          <draw:enhanced-geometry draw:mirror-horizontal="false" draw:mirror-vertical="false" svg:viewBox="0 0 0 0" draw:text-areas="0 0 ?f3 ?f2" draw:type="ooxml-rect" draw:enhanced-path="M 0 0 L ?f3 0 ?f3 ?f2 0 ?f2 Z N">
             <draw:equation draw:name="f0" draw:formula="logwidth/2"/>
             <draw:equation draw:name="f1" draw:formula="logheight/2"/>
             <draw:equation draw:name="f2" draw:formula="logheight"/>
             <draw:equation draw:name="f3" draw:formula="logwidth"/>
           </draw:enhanced-geometry>
         </draw:custom-shape>
-        <presentation:notes draw:style-name="dp5">
+        <presentation:notes draw:style-name="dp4">
           <draw:page-thumbnail draw:style-name="gr2" draw:layer="layout" svg:width="12.699cm" svg:height="9.524cm" svg:x="3.175cm" svg:y="1.93cm" draw:page-number="8" presentation:class="page"/>
           <draw:frame presentation:style-name="pr7" draw:text-style-name="P29" draw:layer="layout" svg:width="15.239cm" svg:height="11.429cm" svg:x="1.905cm" svg:y="12.065cm" presentation:class="notes" presentation:placeholder="true">
             <draw:text-box/>
@@ -1001,51 +929,51 @@
         </presentation:notes>
       </draw:page>
       <draw:page draw:name="page9" draw:style-name="dp3" draw:master-page-name="Título_20_e_20_conteúdo_5f_">
-        <draw:custom-shape draw:name="Título 3" draw:style-name="gr11" draw:text-style-name="P22" draw:layer="layout" svg:width="20.742cm" svg:height="1.479cm" svg:x="1.499cm" svg:y="2.8cm">
-          <text:p text:style-name="P1">
+        <draw:custom-shape draw:name="Título 3" draw:style-name="gr11" draw:text-style-name="P23" draw:layer="layout" svg:width="20.742cm" svg:height="1.479cm" svg:x="1.499cm" svg:y="2.8cm">
+          <text:p text:style-name="P11">
             <text:span text:style-name="T7">SiSTEMA cATRACA</text:span>
           </text:p>
-          <draw:enhanced-geometry draw:mirror-horizontal="false" draw:mirror-vertical="false" draw:text-areas="0 0 ?f3 ?f2" svg:viewBox="0 0 0 0" draw:type="ooxml-rect" draw:enhanced-path="M 0 0 L ?f3 0 ?f3 ?f2 0 ?f2 Z N">
+          <draw:enhanced-geometry draw:mirror-horizontal="false" draw:mirror-vertical="false" svg:viewBox="0 0 0 0" draw:text-areas="0 0 ?f3 ?f2" draw:type="ooxml-rect" draw:enhanced-path="M 0 0 L ?f3 0 ?f3 ?f2 0 ?f2 Z N">
             <draw:equation draw:name="f0" draw:formula="logwidth/2"/>
             <draw:equation draw:name="f1" draw:formula="logheight/2"/>
             <draw:equation draw:name="f2" draw:formula="logheight"/>
             <draw:equation draw:name="f3" draw:formula="logwidth"/>
           </draw:enhanced-geometry>
         </draw:custom-shape>
-        <draw:custom-shape draw:name="CaixaDeTexto 3" draw:style-name="gr12" draw:text-style-name="P24" draw:layer="layout" svg:width="20.747cm" svg:height="7.981cm" svg:x="1.507cm" svg:y="4.858cm">
-          <text:p text:style-name="P26">
+        <draw:custom-shape draw:name="CaixaDeTexto 3" draw:style-name="gr12" draw:text-style-name="P25" draw:layer="layout" svg:width="20.747cm" svg:height="7.981cm" svg:x="1.507cm" svg:y="4.858cm">
+          <text:p text:style-name="P30">
             <text:span text:style-name="T14">O sistema da catraca será o sistema mais simples, com interação humana minimizada ao passe de carteira pelo passageiro. Este sistema irá permitir, ou não, a passagem do passageiro baseando-se em seu tipo de carteirinha e a quantidade de seu saldo. Este sistema utiliza a tecnologia do sistema RFID para seu funcionamento.</text:span>
           </text:p>
-          <text:p text:style-name="P15">
+          <text:p text:style-name="P16">
             <text:span text:style-name="T12"/>
           </text:p>
-          <draw:enhanced-geometry draw:mirror-horizontal="false" draw:mirror-vertical="false" draw:text-areas="0 0 ?f3 ?f2" svg:viewBox="0 0 0 0" draw:type="ooxml-rect" draw:enhanced-path="M 0 0 L ?f3 0 ?f3 ?f2 0 ?f2 Z N">
+          <draw:enhanced-geometry draw:mirror-horizontal="false" draw:mirror-vertical="false" svg:viewBox="0 0 0 0" draw:text-areas="0 0 ?f3 ?f2" draw:type="ooxml-rect" draw:enhanced-path="M 0 0 L ?f3 0 ?f3 ?f2 0 ?f2 Z N">
             <draw:equation draw:name="f0" draw:formula="logwidth/2"/>
             <draw:equation draw:name="f1" draw:formula="logheight/2"/>
             <draw:equation draw:name="f2" draw:formula="logheight"/>
             <draw:equation draw:name="f3" draw:formula="logwidth"/>
           </draw:enhanced-geometry>
         </draw:custom-shape>
-        <presentation:notes draw:style-name="dp5">
+        <presentation:notes draw:style-name="dp4">
           <draw:page-thumbnail draw:style-name="gr2" draw:layer="layout" svg:width="12.699cm" svg:height="9.524cm" svg:x="3.175cm" svg:y="1.93cm" draw:page-number="9" presentation:class="page"/>
-          <draw:frame presentation:style-name="pr7" draw:text-style-name="P12" draw:layer="layout" svg:width="15.239cm" svg:height="11.429cm" svg:x="1.905cm" svg:y="12.065cm" presentation:class="notes" presentation:placeholder="true">
+          <draw:frame presentation:style-name="pr7" draw:text-style-name="P13" draw:layer="layout" svg:width="15.239cm" svg:height="11.429cm" svg:x="1.905cm" svg:y="12.065cm" presentation:class="notes" presentation:placeholder="true">
             <draw:text-box/>
           </draw:frame>
         </presentation:notes>
       </draw:page>
       <draw:page draw:name="page10" draw:style-name="dp3" draw:master-page-name="Título_20_e_20_conteúdo">
-        <draw:custom-shape draw:name="Título 1" draw:style-name="gr3" draw:text-style-name="P11" draw:layer="layout" svg:width="20.742cm" svg:height="2.16cm" svg:x="1.499cm" svg:y="2.28cm">
-          <text:p text:style-name="P1">
+        <draw:custom-shape draw:name="Título 1" draw:style-name="gr3" draw:text-style-name="P12" draw:layer="layout" svg:width="20.742cm" svg:height="2.16cm" svg:x="1.499cm" svg:y="2.28cm">
+          <text:p text:style-name="P11">
             <text:span text:style-name="T7">Protótipo Catraca</text:span>
           </text:p>
-          <draw:enhanced-geometry draw:mirror-horizontal="false" draw:mirror-vertical="false" draw:text-areas="0 0 ?f3 ?f2" svg:viewBox="0 0 0 0" draw:type="ooxml-rect" draw:enhanced-path="M 0 0 L ?f3 0 ?f3 ?f2 0 ?f2 Z N">
+          <draw:enhanced-geometry draw:mirror-horizontal="false" draw:mirror-vertical="false" svg:viewBox="0 0 0 0" draw:text-areas="0 0 ?f3 ?f2" draw:type="ooxml-rect" draw:enhanced-path="M 0 0 L ?f3 0 ?f3 ?f2 0 ?f2 Z N">
             <draw:equation draw:name="f0" draw:formula="logwidth/2"/>
             <draw:equation draw:name="f1" draw:formula="logheight/2"/>
             <draw:equation draw:name="f2" draw:formula="logheight"/>
             <draw:equation draw:name="f3" draw:formula="logwidth"/>
           </draw:enhanced-geometry>
         </draw:custom-shape>
-        <draw:frame draw:name="Imagem 3" draw:style-name="gr6" draw:text-style-name="P18" draw:layer="layout" svg:width="9.13cm" svg:height="13.722cm" svg:x="7.366cm" svg:y="4.642cm">
+        <draw:frame draw:name="Imagem 3" draw:style-name="gr6" draw:text-style-name="P19" draw:layer="layout" svg:width="9.13cm" svg:height="13.722cm" svg:x="7.366cm" svg:y="4.642cm">
           <draw:image xlink:href="Pictures/10000001000001F10000036C95C023328BF8E61C.png" xlink:type="simple" xlink:show="embed" xlink:actuate="onLoad" draw:mime-type="image/png">
             <text:p/>
           </draw:image>
@@ -1054,24 +982,24 @@
         </draw:frame>
         <presentation:notes draw:style-name="dp4">
           <draw:page-thumbnail draw:style-name="gr2" draw:layer="layout" svg:width="12.699cm" svg:height="9.524cm" svg:x="3.175cm" svg:y="1.93cm" draw:page-number="10" presentation:class="page"/>
-          <draw:frame presentation:style-name="pr6" draw:text-style-name="P12" draw:layer="layout" svg:width="15.239cm" svg:height="11.429cm" svg:x="1.905cm" svg:y="12.065cm" presentation:class="notes" presentation:placeholder="true">
+          <draw:frame presentation:style-name="pr6" draw:text-style-name="P13" draw:layer="layout" svg:width="15.239cm" svg:height="11.429cm" svg:x="1.905cm" svg:y="12.065cm" presentation:class="notes" presentation:placeholder="true">
             <draw:text-box/>
           </draw:frame>
         </presentation:notes>
       </draw:page>
       <draw:page draw:name="page11" draw:style-name="dp3" draw:master-page-name="Título_20_e_20_conteúdo">
-        <draw:custom-shape draw:name="Título 1" draw:style-name="gr3" draw:text-style-name="P11" draw:layer="layout" svg:width="20.742cm" svg:height="2.16cm" svg:x="1.499cm" svg:y="2.28cm">
-          <text:p text:style-name="P1">
+        <draw:custom-shape draw:name="Título 1" draw:style-name="gr3" draw:text-style-name="P12" draw:layer="layout" svg:width="20.742cm" svg:height="2.16cm" svg:x="1.499cm" svg:y="2.28cm">
+          <text:p text:style-name="P11">
             <text:span text:style-name="T7">Protótipo Site Público</text:span>
           </text:p>
-          <draw:enhanced-geometry draw:mirror-horizontal="false" draw:mirror-vertical="false" draw:text-areas="0 0 ?f3 ?f2" svg:viewBox="0 0 0 0" draw:type="ooxml-rect" draw:enhanced-path="M 0 0 L ?f3 0 ?f3 ?f2 0 ?f2 Z N">
+          <draw:enhanced-geometry draw:mirror-horizontal="false" draw:mirror-vertical="false" svg:viewBox="0 0 0 0" draw:text-areas="0 0 ?f3 ?f2" draw:type="ooxml-rect" draw:enhanced-path="M 0 0 L ?f3 0 ?f3 ?f2 0 ?f2 Z N">
             <draw:equation draw:name="f0" draw:formula="logwidth/2"/>
             <draw:equation draw:name="f1" draw:formula="logheight/2"/>
             <draw:equation draw:name="f2" draw:formula="logheight"/>
             <draw:equation draw:name="f3" draw:formula="logwidth"/>
           </draw:enhanced-geometry>
         </draw:custom-shape>
-        <draw:frame draw:name="Imagem 1" draw:style-name="gr6" draw:text-style-name="P18" draw:layer="layout" svg:width="20.747cm" svg:height="12.967cm" svg:x="1.507cm" svg:y="4.956cm">
+        <draw:frame draw:name="Imagem 1" draw:style-name="gr6" draw:text-style-name="P19" draw:layer="layout" svg:width="20.747cm" svg:height="12.967cm" svg:x="1.507cm" svg:y="4.956cm">
           <draw:image xlink:href="Pictures/1000000100000555000002B19E948912DC31A413.png" xlink:type="simple" xlink:show="embed" xlink:actuate="onLoad" draw:mime-type="image/png">
             <text:p/>
           </draw:image>
@@ -1080,91 +1008,91 @@
         </draw:frame>
         <presentation:notes draw:style-name="dp4">
           <draw:page-thumbnail draw:style-name="gr2" draw:layer="layout" svg:width="12.699cm" svg:height="9.524cm" svg:x="3.175cm" svg:y="1.93cm" draw:page-number="11" presentation:class="page"/>
-          <draw:frame presentation:style-name="pr6" draw:text-style-name="P12" draw:layer="layout" svg:width="15.239cm" svg:height="11.429cm" svg:x="1.905cm" svg:y="12.065cm" presentation:class="notes" presentation:placeholder="true">
+          <draw:frame presentation:style-name="pr6" draw:text-style-name="P13" draw:layer="layout" svg:width="15.239cm" svg:height="11.429cm" svg:x="1.905cm" svg:y="12.065cm" presentation:class="notes" presentation:placeholder="true">
             <draw:text-box/>
           </draw:frame>
         </presentation:notes>
       </draw:page>
       <draw:page draw:name="page12" draw:style-name="dp3" draw:master-page-name="Título_20_e_20_conteúdo_5f_">
-        <draw:custom-shape draw:name="Título 5" draw:style-name="gr13" draw:text-style-name="P22" draw:layer="layout" svg:width="20.742cm" svg:height="2.16cm" svg:x="1.499cm" svg:y="2.28cm">
-          <text:p text:style-name="P1">
+        <draw:custom-shape draw:name="Título 5" draw:style-name="gr13" draw:text-style-name="P23" draw:layer="layout" svg:width="20.742cm" svg:height="2.16cm" svg:x="1.499cm" svg:y="2.28cm">
+          <text:p text:style-name="P11">
             <text:span text:style-name="T7">Tecnologias Utilizadas</text:span>
           </text:p>
-          <draw:enhanced-geometry draw:mirror-horizontal="false" draw:mirror-vertical="false" draw:text-areas="0 0 ?f3 ?f2" svg:viewBox="0 0 0 0" draw:type="ooxml-rect" draw:enhanced-path="M 0 0 L ?f3 0 ?f3 ?f2 0 ?f2 Z N">
+          <draw:enhanced-geometry draw:mirror-horizontal="false" draw:mirror-vertical="false" svg:viewBox="0 0 0 0" draw:text-areas="0 0 ?f3 ?f2" draw:type="ooxml-rect" draw:enhanced-path="M 0 0 L ?f3 0 ?f3 ?f2 0 ?f2 Z N">
             <draw:equation draw:name="f0" draw:formula="logwidth/2"/>
             <draw:equation draw:name="f1" draw:formula="logheight/2"/>
             <draw:equation draw:name="f2" draw:formula="logheight"/>
             <draw:equation draw:name="f3" draw:formula="logwidth"/>
           </draw:enhanced-geometry>
         </draw:custom-shape>
-        <draw:frame draw:style-name="gr14" draw:text-style-name="P30" draw:layer="layout" svg:width="2.808cm" svg:height="2.808cm" svg:x="1.5cm" svg:y="5.192cm">
+        <draw:frame draw:style-name="gr14" draw:text-style-name="P31" draw:layer="layout" svg:width="2.808cm" svg:height="2.808cm" svg:x="1.5cm" svg:y="5.192cm">
           <draw:image xlink:href="Pictures/100000000000020000000200BD4F21CBFB2A4C48.png" xlink:type="simple" xlink:show="embed" xlink:actuate="onLoad" draw:mime-type="image/png">
             <text:p/>
           </draw:image>
         </draw:frame>
-        <draw:frame draw:style-name="gr14" draw:text-style-name="P30" draw:layer="layout" svg:width="3cm" svg:height="3cm" svg:x="5cm" svg:y="5cm">
+        <draw:frame draw:style-name="gr14" draw:text-style-name="P31" draw:layer="layout" svg:width="3cm" svg:height="3cm" svg:x="5cm" svg:y="5cm">
           <draw:image xlink:href="Pictures/10000001000002000000020079B523222E56B549.png" xlink:type="simple" xlink:show="embed" xlink:actuate="onLoad" draw:mime-type="image/png">
             <text:p/>
           </draw:image>
         </draw:frame>
-        <draw:frame draw:style-name="gr14" draw:text-style-name="P30" draw:layer="layout" svg:width="3cm" svg:height="3cm" svg:x="8.5cm" svg:y="5cm">
+        <draw:frame draw:style-name="gr14" draw:text-style-name="P31" draw:layer="layout" svg:width="3cm" svg:height="3cm" svg:x="8.5cm" svg:y="5cm">
           <draw:image xlink:href="Pictures/10000001000002000000020018F781865F80E49E.png" xlink:type="simple" xlink:show="embed" xlink:actuate="onLoad" draw:mime-type="image/png">
             <text:p/>
           </draw:image>
         </draw:frame>
-        <draw:frame draw:style-name="gr14" draw:text-style-name="P30" draw:layer="layout" svg:width="3.097cm" svg:height="3.097cm" svg:x="12.403cm" svg:y="5cm">
+        <draw:frame draw:style-name="gr14" draw:text-style-name="P31" draw:layer="layout" svg:width="3.097cm" svg:height="3.097cm" svg:x="12.403cm" svg:y="5cm">
           <draw:image xlink:href="Pictures/1000000000000088000000888C93DFF6438C0C87.png" xlink:type="simple" xlink:show="embed" xlink:actuate="onLoad" draw:mime-type="image/png">
             <text:p/>
           </draw:image>
         </draw:frame>
-        <draw:frame draw:style-name="gr14" draw:text-style-name="P30" draw:layer="layout" svg:width="3cm" svg:height="3cm" svg:x="16cm" svg:y="5cm">
+        <draw:frame draw:style-name="gr14" draw:text-style-name="P31" draw:layer="layout" svg:width="3cm" svg:height="3cm" svg:x="16cm" svg:y="5cm">
           <draw:image xlink:href="Pictures/10000001000001000000010011AA046ADC3DAB99.png" xlink:type="simple" xlink:show="embed" xlink:actuate="onLoad" draw:mime-type="image/png">
             <text:p/>
           </draw:image>
         </draw:frame>
-        <draw:frame draw:style-name="gr14" draw:text-style-name="P30" draw:layer="layout" svg:width="3cm" svg:height="3cm" svg:x="19.5cm" svg:y="5cm">
+        <draw:frame draw:style-name="gr14" draw:text-style-name="P31" draw:layer="layout" svg:width="3cm" svg:height="3cm" svg:x="19.5cm" svg:y="5cm">
           <draw:image xlink:href="Pictures/1000000000000200000002008485A6A15C9F51D6.png" xlink:type="simple" xlink:show="embed" xlink:actuate="onLoad" draw:mime-type="image/png">
             <text:p/>
           </draw:image>
         </draw:frame>
-        <draw:frame draw:style-name="gr14" draw:text-style-name="P30" draw:layer="layout" svg:width="2.762cm" svg:height="2.762cm" svg:x="1.5cm" svg:y="8.5cm">
+        <draw:frame draw:style-name="gr14" draw:text-style-name="P31" draw:layer="layout" svg:width="2.762cm" svg:height="2.762cm" svg:x="1.5cm" svg:y="8.5cm">
           <draw:image xlink:href="Pictures/10000000000000E1000000E1750F4401EC129DB8.png" xlink:type="simple" xlink:show="embed" xlink:actuate="onLoad" draw:mime-type="image/png">
             <text:p/>
           </draw:image>
         </draw:frame>
-        <draw:frame draw:style-name="gr14" draw:text-style-name="P30" draw:layer="layout" svg:width="2.5cm" svg:height="2.5cm" svg:x="5cm" svg:y="8.5cm">
+        <draw:frame draw:style-name="gr14" draw:text-style-name="P31" draw:layer="layout" svg:width="2.5cm" svg:height="2.5cm" svg:x="5cm" svg:y="8.5cm">
           <draw:image xlink:href="Pictures/100000010000020000000200265EE52A970C760E.png" xlink:type="simple" xlink:show="embed" xlink:actuate="onLoad" draw:mime-type="image/png">
             <text:p/>
           </draw:image>
         </draw:frame>
-        <draw:frame draw:style-name="gr14" draw:text-style-name="P30" draw:layer="layout" svg:width="3.515cm" svg:height="2.9cm" svg:x="7.985cm" svg:y="8.5cm">
+        <draw:frame draw:style-name="gr14" draw:text-style-name="P31" draw:layer="layout" svg:width="3.515cm" svg:height="2.9cm" svg:x="7.985cm" svg:y="8.5cm">
           <draw:image xlink:href="Pictures/10000001000001900000014A5D11AED89951CFB4.png" xlink:type="simple" xlink:show="embed" xlink:actuate="onLoad" draw:mime-type="image/png">
             <text:p/>
           </draw:image>
         </draw:frame>
-        <draw:frame draw:style-name="gr14" draw:text-style-name="P30" draw:layer="layout" svg:width="3cm" svg:height="3cm" svg:x="12.5cm" svg:y="8.5cm">
+        <draw:frame draw:style-name="gr14" draw:text-style-name="P31" draw:layer="layout" svg:width="3cm" svg:height="3cm" svg:x="12.5cm" svg:y="8.5cm">
           <draw:image xlink:href="Pictures/10000000000000E0000000E0F607CB491F74D378.png" xlink:type="simple" xlink:show="embed" xlink:actuate="onLoad" draw:mime-type="image/png">
             <text:p/>
           </draw:image>
         </draw:frame>
-        <draw:frame draw:style-name="gr14" draw:text-style-name="P30" draw:layer="layout" svg:width="3cm" svg:height="3cm" svg:x="16cm" svg:y="8.5cm">
+        <draw:frame draw:style-name="gr14" draw:text-style-name="P31" draw:layer="layout" svg:width="3cm" svg:height="3cm" svg:x="16cm" svg:y="8.5cm">
           <draw:image xlink:href="Pictures/1000000100000200000002009E0F80AB54E5F039.png" xlink:type="simple" xlink:show="embed" xlink:actuate="onLoad" draw:mime-type="image/png">
             <text:p/>
           </draw:image>
         </draw:frame>
-        <draw:frame draw:style-name="gr14" draw:text-style-name="P30" draw:layer="layout" svg:width="3cm" svg:height="3cm" svg:x="19.5cm" svg:y="8.5cm">
+        <draw:frame draw:style-name="gr14" draw:text-style-name="P31" draw:layer="layout" svg:width="3cm" svg:height="3cm" svg:x="19.5cm" svg:y="8.5cm">
           <draw:image xlink:href="Pictures/100000010000020000000200354A97D390A57AD9.png" xlink:type="simple" xlink:show="embed" xlink:actuate="onLoad" draw:mime-type="image/png">
             <text:p/>
           </draw:image>
         </draw:frame>
-        <draw:frame draw:style-name="gr14" draw:text-style-name="P30" draw:layer="layout" svg:width="8.097cm" svg:height="6.051cm" svg:x="7.5cm" svg:y="12cm">
+        <draw:frame draw:style-name="gr14" draw:text-style-name="P31" draw:layer="layout" svg:width="8.097cm" svg:height="6.051cm" svg:x="7.5cm" svg:y="12cm">
           <draw:image xlink:href="Pictures/10000000000003570000027FC3DC75C58E2EBCE6.png" xlink:type="simple" xlink:show="embed" xlink:actuate="onLoad" draw:mime-type="image/png">
             <text:p/>
           </draw:image>
         </draw:frame>
-        <presentation:notes draw:style-name="dp5">
+        <presentation:notes draw:style-name="dp4">
           <draw:page-thumbnail draw:style-name="gr2" draw:layer="layout" svg:width="12.699cm" svg:height="9.524cm" svg:x="3.175cm" svg:y="1.93cm" draw:page-number="12" presentation:class="page"/>
-          <draw:frame presentation:style-name="pr7" draw:text-style-name="P12" draw:layer="layout" svg:width="15.239cm" svg:height="11.429cm" svg:x="1.905cm" svg:y="12.065cm" presentation:class="notes" presentation:placeholder="true">
+          <draw:frame presentation:style-name="pr7" draw:text-style-name="P13" draw:layer="layout" svg:width="15.239cm" svg:height="11.429cm" svg:x="1.905cm" svg:y="12.065cm" presentation:class="notes" presentation:placeholder="true">
             <draw:text-box/>
           </draw:frame>
         </presentation:notes>
@@ -1180,10 +1108,10 @@
   <office:meta>
     <dc:title>Apresentação do PowerPoint</dc:title>
     <meta:initial-creator>Adriana</meta:initial-creator>
-    <meta:editing-cycles>478</meta:editing-cycles>
+    <meta:editing-cycles>479</meta:editing-cycles>
     <meta:creation-date>2015-02-06T17:44:01</meta:creation-date>
-    <dc:date>2023-12-11T16:47:17.251000000</dc:date>
-    <meta:editing-duration>P3DT4H57M19S</meta:editing-duration>
+    <dc:date>2023-12-12T13:37:01.247000000</dc:date>
+    <meta:editing-duration>P3DT4H57M41S</meta:editing-duration>
     <meta:generator>LibreOffice/7.3.2.2$Windows_X86_64 LibreOffice_project/49f2b1bff42cfccbd8f788c8dc32c1c309559be0</meta:generator>
     <meta:document-statistic meta:object-count="136"/>
     <meta:user-defined meta:name="AppVersion">16.0000</meta:user-defined>
@@ -1199,7 +1127,7 @@
 <office:document-settings xmlns:office="urn:oasis:names:tc:opendocument:xmlns:office:1.0" xmlns:anim="urn:oasis:names:tc:opendocument:xmlns:animation:1.0" xmlns:ooo="http://openoffice.org/2004/office" xmlns:xlink="http://www.w3.org/1999/xlink" xmlns:config="urn:oasis:names:tc:opendocument:xmlns:config:1.0" xmlns:officeooo="http://openoffice.org/2009/office" xmlns:presentation="urn:oasis:names:tc:opendocument:xmlns:presentation:1.0" xmlns:smil="urn:oasis:names:tc:opendocument:xmlns:smil-compatible:1.0" office:version="1.3">
   <office:settings>
     <config:config-item-set config:name="ooo:view-settings">
-      <config:config-item config:name="VisibleAreaTop" config:type="int">-404</config:config-item>
+      <config:config-item config:name="VisibleAreaTop" config:type="int">-291</config:config-item>
       <config:config-item config:name="VisibleAreaLeft" config:type="int">-2870</config:config-item>
       <config:config-item config:name="VisibleAreaWidth" config:type="int">31189</config:config-item>
       <config:config-item config:name="VisibleAreaHeight" config:type="int">19642</config:config-item>
@@ -1230,7 +1158,7 @@
           <config:config-item config:name="IsClickChangeRotation" config:type="boolean">true</config:config-item>
           <config:config-item config:name="SlidesPerRow" config:type="short">4</config:config-item>
           <config:config-item config:name="EditMode" config:type="int">0</config:config-item>
-          <config:config-item config:name="VisibleAreaTop" config:type="int">-404</config:config-item>
+          <config:config-item config:name="VisibleAreaTop" config:type="int">-291</config:config-item>
           <config:config-item config:name="VisibleAreaLeft" config:type="int">-2870</config:config-item>
           <config:config-item config:name="VisibleAreaWidth" config:type="int">31190</config:config-item>
           <config:config-item config:name="VisibleAreaHeight" config:type="int">19643</config:config-item>
@@ -1300,9 +1228,9 @@
       <config:config-item config:name="ParagraphSummation" config:type="boolean">true</config:config-item>
       <config:config-item config:name="PrintQuality" config:type="int">0</config:config-item>
       <config:config-item config:name="PrinterIndependentLayout" config:type="string">low-resolution</config:config-item>
-      <config:config-item config:name="PrinterName" config:type="string"/>
+      <config:config-item config:name="PrinterName" config:type="string">Imprimir para PDF</config:config-item>
       <config:config-item config:name="PrinterPaperFromSetup" config:type="boolean">false</config:config-item>
-      <config:config-item config:name="PrinterSetup" config:type="base64Binary"/>
+      <config:config-item config:name="PrinterSetup" config:type="base64Binary">NQX+/0ltcHJpbWlyIHBhcmEgUERGAAAAAAAAAAAAAAAAAAAAAAAAAAAAAAAAAAAAAAAAAAAAAAAAAAAAAAAAAAAAAAAAAAAAAAAAAAAAAAAAAAAAAAAAAAAAAAAAAAAAAAAAAAAAAAAAAAAAAAAAAAAAAAAAAAAAAAAAAAAAAAAAAAAARG9ybyBQREYgV3JpdGVyAAAAAAAAAAAAAAAAAAAAAAAWAAEAUgQAAAAAAAAEAAhSAAAEdAAAM1ROVwAAAAAKAEkAbQBwAHIAaQBtAGkAcgAgAHAAYQByAGEAIABQAEQARgAAAAAAAAAAAAAAAAAAAAAAAAAAAAAAAAAAAAAAAAABBAMG3ABsA1PvgAEBAAkAmgs0CGQAAQAPAFgCAgABAFgCAwABAEEANAAAAAAAAAAAAAAAAAAAAAAAAAAAAAAAAAAAAAAAAAAAAAAAAAAAAAAAAAAAAAAAAAAAAAAAAAAAAAAAAAAAAAAAAAAAAAAAAAAAAAEAAAAAAAAAAQAAAAIAAAABAAAAAAAAAAAAAAAAAAAAAAAAAAAAAABQUklW4jAAAAAAAAAAAAAAAAAAAAAAAAAAAAAAAAAAAAAAAAAAAAAAAAAAAAAAAAAAAAAAAAAAAAAAAAAAAAAAAAAAAAAAAAAAAAAAAAAAAAAAAAAAAAAAGAAAAAAAECcQJxAnAAAQJwAAAAAAAAAAeABsAwAAAAAAAAAAAAAAAAAAAAAAAAAAAAAAAAMAAAAAAAAAAAAQAFA0AwAoiAQAAAAAAAAAAAAAAAEAAAAAAAAAAAAAAAAAAAAAAHarNQEDAAAABQAKAP8AAAAAAAAAAAAAAAAAAAAAAAAAAAAAAAAAAAAAAAAAAAAAAAAAAAAAAAAAAAAAAAAAAAAAAAAAAAAAAAAAAAAAAAAAAAAAAAAAAAAAAAAAAAAAAAAAAAAAAAAAAAAAAAAAAAAAAAAAAAAAAAAAAAAAAAAAAAAAAAAAAAAAAAAAAAAAAAAAAAAAAAAAAAAAAAAAAAAAAAAAAAAAAAAAAAAAAAAAAAAAAAAAAAAAAAAAAAAAAAAAAAAAAAAAAAAAAAAAAAAAAAAAAAAAAAAAAAAAAAAAAAAAAAAAAAAAAAAAAAAAAAAAAAAAAAAAAAAAAAAAAAAAAAAAAAAAAAAAAAAAAAAAAAAAAAAAAAAAAAAAAAAAAAAAAAAAAAAAAAAAAAAAAAAAAAAAAAAAAAAAAAAAAAAAAAAAAAAAAAAAAAAAAAAAAAAAAAAAAAAAAAAAAAAAAAAAAAAAAAAAAAAAAAAAAAAAAAAAAAAAAAAAAAAAAAAAAAAAAAAAAAAAAAAAAAAAAAAAAAAAAAAAAAAAAAAAAAAAAAAAAAAAAAAAAAAAAAAAAAAAAAAAAAAAAAAAAAAAAAAAAAAAAAAAAAAAAAAAAAAAAAAAAAAAAAAAAAAAAAAAAAAAAAAAAAAAAAAAAAAAAAAAAAAAAAAAAAAAAAAAAAAAAAAAAAAAAAABAAAAAAAAAAAAAAAAAAAAAAAAAAAAAAAAAAAAAAAAAAAAAAAAAAAAAAAAAAAAAAB4AAAAU01USgAAAAAQAGgAAAAAAAAAAAAAAAAAAAAAAAAAAAAAAAAAAAAAAAAAAAAAAAAAAAAAAAAAAAAAAAAAAAAAAAAAAAAAAAAAAAAAAAAAAAAAAAAAAAAAAAAAAAAAAAAAAAAAAAAAAAAAAAAAAAAAAAAAAAASAENPTVBBVF9EVVBMRVhfTU9ERRMARHVwbGV4TW9kZTo6VW5rbm93bg==</config:config-item>
       <config:config-item config:name="SaveThumbnail" config:type="boolean">true</config:config-item>
       <config:config-item config:name="SaveVersionOnClose" config:type="boolean">false</config:config-item>
       <config:config-item config:name="SlidesPerHandout" config:type="short">6</config:config-item>
@@ -1316,32 +1244,39 @@
 <office:document-styles xmlns:meta="urn:oasis:names:tc:opendocument:xmlns:meta:1.0" xmlns:office="urn:oasis:names:tc:opendocument:xmlns:office:1.0" xmlns:fo="urn:oasis:names:tc:opendocument:xmlns:xsl-fo-compatible:1.0" xmlns:ooo="http://openoffice.org/2004/office" xmlns:xlink="http://www.w3.org/1999/xlink" xmlns:dc="http://purl.org/dc/elements/1.1/" xmlns:style="urn:oasis:names:tc:opendocument:xmlns:style:1.0" xmlns:text="urn:oasis:names:tc:opendocument:xmlns:text:1.0" xmlns:draw="urn:oasis:names:tc:opendocument:xmlns:drawing:1.0" xmlns:dr3d="urn:oasis:names:tc:opendocument:xmlns:dr3d:1.0" xmlns:svg="urn:oasis:names:tc:opendocument:xmlns:svg-compatible:1.0" xmlns:chart="urn:oasis:names:tc:opendocument:xmlns:chart:1.0" xmlns:rpt="http://openoffice.org/2005/report" xmlns:table="urn:oasis:names:tc:opendocument:xmlns:table:1.0" xmlns:number="urn:oasis:names:tc:opendocument:xmlns:datastyle:1.0" xmlns:ooow="http://openoffice.org/2004/writer" xmlns:oooc="http://openoffice.org/2004/calc" xmlns:of="urn:oasis:names:tc:opendocument:xmlns:of:1.2" xmlns:tableooo="http://openoffice.org/2009/table" xmlns:calcext="urn:org:documentfoundation:names:experimental:calc:xmlns:calcext:1.0" xmlns:drawooo="http://openoffice.org/2010/draw" xmlns:loext="urn:org:documentfoundation:names:experimental:office:xmlns:loext:1.0" xmlns:field="urn:openoffice:names:experimental:ooo-ms-interop:xmlns:field:1.0" xmlns:math="http://www.w3.org/1998/Math/MathML" xmlns:form="urn:oasis:names:tc:opendocument:xmlns:form:1.0" xmlns:script="urn:oasis:names:tc:opendocument:xmlns:script:1.0" xmlns:dom="http://www.w3.org/2001/xml-events" xmlns:xhtml="http://www.w3.org/1999/xhtml" xmlns:grddl="http://www.w3.org/2003/g/data-view#" xmlns:css3t="http://www.w3.org/TR/css3-text/" xmlns:presentation="urn:oasis:names:tc:opendocument:xmlns:presentation:1.0" xmlns:smil="urn:oasis:names:tc:opendocument:xmlns:smil-compatible:1.0" xmlns:anim="urn:oasis:names:tc:opendocument:xmlns:animation:1.0" xmlns:officeooo="http://openoffice.org/2009/office" office:version="1.3">
   <office:font-face-decls>
     <style:font-face style:name="Arial" svg:font-family="Arial"/>
-    <style:font-face style:name="Arial Unicode MS" svg:font-family="'Arial Unicode MS'" style:font-pitch="variable"/>
+    <style:font-face style:name="Arial Unicode MS" svg:font-family="'Arial Unicode MS'" style:font-family-generic="system" style:font-pitch="variable"/>
     <style:font-face style:name="Arial Unicode MS1" svg:font-family="'Arial Unicode MS'" style:font-family-generic="swiss" style:font-pitch="variable"/>
-    <style:font-face style:name="Arial Unicode MS2" svg:font-family="'Arial Unicode MS'" style:font-family-generic="system" style:font-pitch="variable"/>
+    <style:font-face style:name="Arial Unicode MS2" svg:font-family="'Arial Unicode MS'" style:font-pitch="variable"/>
     <style:font-face style:name="Arial1" svg:font-family="Arial" style:font-pitch="variable"/>
-    <style:font-face style:name="Arial2" svg:font-family="Arial" style:font-family-generic="swiss" style:font-pitch="variable"/>
-    <style:font-face style:name="Arial3" svg:font-family="Arial" style:font-family-generic="swiss"/>
+    <style:font-face style:name="Arial2" svg:font-family="Arial" style:font-family-generic="swiss"/>
+    <style:font-face style:name="Arial3" svg:font-family="Arial" style:font-family-generic="swiss" style:font-pitch="variable"/>
     <style:font-face style:name="Calibri" svg:font-family="Calibri" style:font-family-generic="swiss" style:font-pitch="variable"/>
-    <style:font-face style:name="Century Schoolbook" svg:font-family="'Century Schoolbook'" style:font-family-generic="roman" style:font-pitch="variable"/>
+    <style:font-face style:name="Century Schoolbook" svg:font-family="'Century Schoolbook'"/>
     <style:font-face style:name="Century Schoolbook1" svg:font-family="'Century Schoolbook'" style:font-pitch="variable"/>
-    <style:font-face style:name="Century Schoolbook2" svg:font-family="'Century Schoolbook'"/>
-    <style:font-face style:name="Century Schoolbook3" svg:font-family="'Century Schoolbook'" style:font-family-generic="swiss"/>
+    <style:font-face style:name="Century Schoolbook2" svg:font-family="'Century Schoolbook'" style:font-family-generic="roman" style:font-pitch="variable"/>
     <style:font-face style:name="Liberation Sans" svg:font-family="'Liberation Sans'" style:font-family-generic="roman" style:font-pitch="variable"/>
-    <style:font-face style:name="Liberation Sans1" svg:font-family="'Liberation Sans'" style:font-family-generic="swiss" style:font-pitch="variable"/>
-    <style:font-face style:name="Liberation Sans2" svg:font-family="'Liberation Sans'" style:font-pitch="variable"/>
+    <style:font-face style:name="Liberation Sans1" svg:font-family="'Liberation Sans'" style:font-pitch="variable"/>
+    <style:font-face style:name="Liberation Sans2" svg:font-family="'Liberation Sans'" style:font-family-generic="swiss" style:font-pitch="variable"/>
     <style:font-face style:name="Liberation Serif" svg:font-family="'Liberation Serif'" style:font-pitch="variable"/>
-    <style:font-face style:name="Liberation Serif1" svg:font-family="'Liberation Serif'" style:font-family-generic="roman" style:font-pitch="variable"/>
+    <style:font-face style:name="Liberation Serif1" svg:font-family="'Liberation Serif'" style:font-family-generic="roman" style:font-pitch="variable" style:font-charset="x-symbol"/>
     <style:font-face style:name="Liberation Serif2" svg:font-family="'Liberation Serif'" style:font-family-generic="swiss" style:font-pitch="variable"/>
-    <style:font-face style:name="Microsoft YaHei" svg:font-family="'Microsoft YaHei'" style:font-pitch="variable"/>
-    <style:font-face style:name="Microsoft YaHei1" svg:font-family="'Microsoft YaHei'" style:font-family-generic="system" style:font-pitch="variable"/>
+    <style:font-face style:name="Liberation Serif3" svg:font-family="'Liberation Serif'" style:font-family-generic="roman" style:font-pitch="variable"/>
+    <style:font-face style:name="Liberation Serif4" svg:font-family="'Liberation Serif'" style:font-pitch="variable" style:font-charset="x-symbol"/>
+    <style:font-face style:name="Microsoft YaHei" svg:font-family="'Microsoft YaHei'" style:font-family-generic="system" style:font-pitch="variable"/>
+    <style:font-face style:name="Microsoft YaHei1" svg:font-family="'Microsoft YaHei'" style:font-pitch="variable"/>
     <style:font-face style:name="Noto Sans" svg:font-family="'Noto Sans'" style:font-family-generic="roman" style:font-pitch="variable"/>
     <style:font-face style:name="OpenSymbol" svg:font-family="OpenSymbol, 'Arial Unicode MS'" style:font-charset="x-symbol"/>
+    <style:font-face style:name="OpenSymbol1" svg:font-family="OpenSymbol, 'Arial Unicode MS'" style:font-pitch="variable" style:font-charset="x-symbol"/>
     <style:font-face style:name="Segoe UI" svg:font-family="'Segoe UI'" style:font-family-generic="system" style:font-pitch="variable"/>
+    <style:font-face style:name="Segoe UI1" svg:font-family="'Segoe UI'" style:font-family-generic="swiss" style:font-pitch="variable"/>
+    <style:font-face style:name="Segoe UI2" svg:font-family="'Segoe UI'" style:font-pitch="variable" style:font-charset="x-symbol"/>
+    <style:font-face style:name="Segoe UI3" svg:font-family="'Segoe UI'" style:font-family-generic="system" style:font-pitch="variable" style:font-charset="x-symbol"/>
     <style:font-face style:name="Tahoma" svg:font-family="Tahoma" style:font-family-generic="swiss" style:font-pitch="variable"/>
     <style:font-face style:name="Tahoma1" svg:font-family="Tahoma" style:font-family-generic="system" style:font-pitch="variable"/>
-    <style:font-face style:name="Trebuchet MS" svg:font-family="'Trebuchet MS'"/>
-    <style:font-face style:name="Trebuchet MS1" svg:font-family="'Trebuchet MS'" style:font-pitch="variable"/>
+    <style:font-face style:name="Tahoma2" svg:font-family="Tahoma" style:font-family-generic="system" style:font-pitch="variable" style:font-charset="x-symbol"/>
+    <style:font-face style:name="Tahoma3" svg:font-family="Tahoma" style:font-pitch="variable" style:font-charset="x-symbol"/>
+    <style:font-face style:name="Trebuchet MS" svg:font-family="'Trebuchet MS'" style:font-pitch="variable"/>
+    <style:font-face style:name="Trebuchet MS1" svg:font-family="'Trebuchet MS'"/>
   </office:font-face-decls>
   <office:styles>
     <draw:gradient draw:name="Formas" draw:style="rectangular" draw:cx="50%" draw:cy="50%" draw:start-color="#cccccc" draw:end-color="#ffffff" draw:start-intensity="100%" draw:end-intensity="100%" draw:angle="0deg" draw:border="0%"/>
@@ -1353,10 +1288,10 @@
     <draw:marker draw:name="Arrow" svg:viewBox="0 0 20 30" svg:d="M10 0l-10 30h20z"/>
     <style:default-style style:family="graphic">
       <style:graphic-properties svg:stroke-color="#3465a4" draw:fill-color="#729fcf" fo:wrap-option="no-wrap"/>
-      <style:paragraph-properties style:text-autospace="ideograph-alpha" style:punctuation-wrap="simple" style:line-break="strict" style:writing-mode="lr-tb" style:font-independent-line-spacing="false">
+      <style:paragraph-properties style:text-autospace="ideograph-alpha" style:punctuation-wrap="simple" style:line-break="strict" style:font-independent-line-spacing="false">
         <style:tab-stops/>
       </style:paragraph-properties>
-      <style:text-properties style:use-window-font-color="true" loext:opacity="0%" style:font-name="Liberation Serif1" fo:font-size="24pt" fo:language="pt" fo:country="BR" style:font-name-asian="Segoe UI" style:font-size-asian="24pt" style:language-asian="zh" style:country-asian="CN" style:font-name-complex="Tahoma1" style:font-size-complex="24pt" style:language-complex="hi" style:country-complex="IN"/>
+      <style:text-properties style:use-window-font-color="true" loext:opacity="0%" style:font-name="Liberation Serif3" fo:font-size="24pt" fo:language="pt" fo:country="BR" style:font-name-asian="Segoe UI" style:font-size-asian="24pt" style:language-asian="zh" style:country-asian="CN" style:font-name-complex="Tahoma1" style:font-size-complex="24pt" style:language-complex="hi" style:country-complex="IN"/>
     </style:default-style>
     <style:style style:name="standard" style:family="graphic">
       <style:graphic-properties draw:stroke="solid" svg:stroke-width="0cm" svg:stroke-color="#3465a4" draw:marker-start-width="0.2cm" draw:marker-start-center="false" draw:marker-end-width="0.2cm" draw:marker-end-center="false" draw:fill="solid" draw:fill-color="#729fcf" draw:textarea-horizontal-align="justify" fo:padding-top="0.125cm" fo:padding-bottom="0.125cm" fo:padding-left="0.25cm" fo:padding-right="0.25cm" fo:wrap-option="wrap" draw:shadow="hidden" draw:shadow-offset-x="0.2cm" draw:shadow-offset-y="0.2cm" draw:shadow-color="#808080">
@@ -1404,7 +1339,7 @@
         </text:list-style>
       </style:graphic-properties>
       <style:paragraph-properties fo:margin-left="0cm" fo:margin-right="0cm" fo:margin-top="0cm" fo:margin-bottom="0cm" fo:line-height="100%" fo:text-indent="0cm"/>
-      <style:text-properties fo:font-variant="normal" fo:text-transform="none" style:use-window-font-color="true" loext:opacity="0%" style:text-outline="false" style:text-line-through-style="none" style:text-line-through-type="none" style:font-name="Liberation Sans" fo:font-family="'Liberation Sans'" style:font-family-generic="roman" style:font-pitch="variable" fo:font-size="18pt" fo:font-style="normal" fo:text-shadow="none" style:text-underline-style="none" fo:font-weight="normal" style:letter-kerning="true" style:font-name-asian="Microsoft YaHei1" style:font-family-asian="'Microsoft YaHei'" style:font-family-generic-asian="system" style:font-pitch-asian="variable" style:font-size-asian="18pt" style:font-style-asian="normal" style:font-weight-asian="normal" style:font-name-complex="Arial Unicode MS2" style:font-family-complex="'Arial Unicode MS'" style:font-family-generic-complex="system" style:font-pitch-complex="variable" style:font-size-complex="18pt" style:font-style-complex="normal" style:font-weight-complex="normal" style:text-emphasize="none" style:font-relief="none" style:text-overline-style="none" style:text-overline-color="font-color"/>
+      <style:text-properties fo:font-variant="normal" fo:text-transform="none" style:use-window-font-color="true" loext:opacity="0%" style:text-outline="false" style:text-line-through-style="none" style:text-line-through-type="none" style:font-name="Liberation Sans" fo:font-family="'Liberation Sans'" style:font-family-generic="roman" style:font-pitch="variable" fo:font-size="18pt" fo:font-style="normal" fo:text-shadow="none" style:text-underline-style="none" fo:font-weight="normal" style:letter-kerning="true" style:font-name-asian="Microsoft YaHei" style:font-family-asian="'Microsoft YaHei'" style:font-family-generic-asian="system" style:font-pitch-asian="variable" style:font-size-asian="18pt" style:font-style-asian="normal" style:font-weight-asian="normal" style:font-name-complex="Arial Unicode MS" style:font-family-complex="'Arial Unicode MS'" style:font-family-generic-complex="system" style:font-pitch-complex="variable" style:font-size-complex="18pt" style:font-style-complex="normal" style:font-weight-complex="normal" style:text-emphasize="none" style:font-relief="none" style:text-overline-style="none" style:text-overline-color="font-color"/>
     </style:style>
     <style:style style:name="objectwithoutfill" style:family="graphic" style:parent-style-name="standard">
       <style:graphic-properties draw:fill="none"/>
@@ -1520,7 +1455,7 @@
     <style:style style:name="Slide_20_de_20_título-notes" style:display-name="Slide de título-notes" style:family="presentation">
       <style:graphic-properties draw:stroke="none" draw:fill="none"/>
       <style:paragraph-properties fo:margin-left="0.6cm" fo:margin-right="0cm" fo:text-indent="-0.6cm"/>
-      <style:text-properties fo:font-variant="normal" fo:text-transform="none" style:use-window-font-color="true" loext:opacity="0%" style:text-outline="false" style:text-line-through-style="none" style:text-line-through-type="none" style:font-name="Liberation Sans" fo:font-family="'Liberation Sans'" style:font-family-generic="roman" style:font-pitch="variable" fo:font-size="20pt" fo:font-style="normal" fo:text-shadow="none" style:text-underline-style="none" fo:font-weight="normal" style:letter-kerning="true" fo:background-color="transparent" style:font-name-asian="Microsoft YaHei1" style:font-family-asian="'Microsoft YaHei'" style:font-family-generic-asian="system" style:font-pitch-asian="variable" style:font-size-asian="20pt" style:font-style-asian="normal" style:font-weight-asian="normal" style:font-name-complex="Arial Unicode MS2" style:font-family-complex="'Arial Unicode MS'" style:font-family-generic-complex="system" style:font-pitch-complex="variable" style:font-size-complex="20pt" style:font-style-complex="normal" style:font-weight-complex="normal" style:text-emphasize="none" style:font-relief="none" style:text-overline-style="none" style:text-overline-color="font-color"/>
+      <style:text-properties fo:font-variant="normal" fo:text-transform="none" style:use-window-font-color="true" loext:opacity="0%" style:text-outline="false" style:text-line-through-style="none" style:text-line-through-type="none" style:font-name="Liberation Sans" fo:font-family="'Liberation Sans'" style:font-family-generic="roman" style:font-pitch="variable" fo:font-size="20pt" fo:font-style="normal" fo:text-shadow="none" style:text-underline-style="none" fo:font-weight="normal" style:letter-kerning="true" fo:background-color="transparent" style:font-name-asian="Microsoft YaHei" style:font-family-asian="'Microsoft YaHei'" style:font-family-generic-asian="system" style:font-pitch-asian="variable" style:font-size-asian="20pt" style:font-style-asian="normal" style:font-weight-asian="normal" style:font-name-complex="Arial Unicode MS" style:font-family-complex="'Arial Unicode MS'" style:font-family-generic-complex="system" style:font-pitch-complex="variable" style:font-size-complex="20pt" style:font-style-complex="normal" style:font-weight-complex="normal" style:text-emphasize="none" style:font-relief="none" style:text-overline-style="none" style:text-overline-color="font-color"/>
     </style:style>
     <style:style style:name="Slide_20_de_20_título-outline1" style:display-name="Slide de título-outline1" style:family="presentation">
       <style:graphic-properties draw:stroke="none" draw:fill="none" draw:auto-grow-height="false" draw:fit-to-size="false" style:shrink-to-fit="true">
@@ -1568,19 +1503,19 @@
         </text:list-style>
       </style:graphic-properties>
       <style:paragraph-properties fo:margin-top="0.5cm" fo:margin-bottom="0cm" fo:line-height="100%" fo:text-align="start" style:punctuation-wrap="simple" style:writing-mode="lr-tb"/>
-      <style:text-properties fo:font-variant="normal" fo:text-transform="none" fo:color="#000000" loext:opacity="100%" style:text-outline="false" style:text-line-through-style="none" style:text-line-through-type="none" style:text-position="0% 100%" style:font-name="Century Schoolbook2" fo:font-family="'Century Schoolbook'" fo:font-size="20pt" fo:letter-spacing="normal" fo:language="pt" fo:country="BR" fo:font-style="normal" fo:text-shadow="none" style:text-underline-style="none" fo:font-weight="normal" style:letter-kerning="true" fo:background-color="transparent" style:font-name-asian="Microsoft YaHei1" style:font-family-asian="'Microsoft YaHei'" style:font-family-generic-asian="system" style:font-pitch-asian="variable" style:font-size-asian="20pt" style:font-style-asian="normal" style:font-weight-asian="normal" style:font-name-complex="Arial2" style:font-family-complex="Arial" style:font-family-generic-complex="swiss" style:font-pitch-complex="variable" style:font-size-complex="20pt" style:font-style-complex="normal" style:font-weight-complex="normal" style:text-emphasize="none" style:font-relief="none" style:text-overline-style="none" style:text-overline-color="font-color"/>
+      <style:text-properties fo:font-variant="normal" fo:text-transform="none" fo:color="#000000" loext:opacity="100%" style:text-outline="false" style:text-line-through-style="none" style:text-line-through-type="none" style:text-position="0% 100%" style:font-name="Century Schoolbook" fo:font-family="'Century Schoolbook'" fo:font-size="20pt" fo:letter-spacing="normal" fo:language="pt" fo:country="BR" fo:font-style="normal" fo:text-shadow="none" style:text-underline-style="none" fo:font-weight="normal" style:letter-kerning="true" fo:background-color="transparent" style:font-name-asian="Microsoft YaHei" style:font-family-asian="'Microsoft YaHei'" style:font-family-generic-asian="system" style:font-pitch-asian="variable" style:font-size-asian="20pt" style:font-style-asian="normal" style:font-weight-asian="normal" style:font-name-complex="Arial3" style:font-family-complex="Arial" style:font-family-generic-complex="swiss" style:font-pitch-complex="variable" style:font-size-complex="20pt" style:font-style-complex="normal" style:font-weight-complex="normal" style:text-emphasize="none" style:font-relief="none" style:text-overline-style="none" style:text-overline-color="font-color"/>
     </style:style>
     <style:style style:name="Slide_20_de_20_título-outline2" style:display-name="Slide de título-outline2" style:family="presentation" style:parent-style-name="Slide_20_de_20_título-outline1">
       <style:paragraph-properties fo:margin-top="0.4cm" fo:margin-bottom="0cm" fo:line-height="100%" fo:text-align="start" style:punctuation-wrap="simple" style:writing-mode="lr-tb"/>
-      <style:text-properties fo:font-variant="normal" fo:text-transform="none" fo:color="#000000" loext:opacity="100%" style:text-line-through-style="none" style:text-line-through-type="none" style:text-position="0% 100%" style:font-name="Century Schoolbook2" fo:font-family="'Century Schoolbook'" fo:font-size="18pt" fo:letter-spacing="normal" fo:font-style="normal" style:text-underline-style="none" fo:font-weight="normal" fo:background-color="transparent" style:font-size-asian="18pt" style:font-style-asian="normal" style:font-weight-asian="normal" style:font-name-complex="Arial2" style:font-family-complex="Arial" style:font-family-generic-complex="swiss" style:font-pitch-complex="variable" style:font-size-complex="18pt" style:font-style-complex="normal" style:font-weight-complex="normal"/>
+      <style:text-properties fo:font-variant="normal" fo:text-transform="none" fo:color="#000000" loext:opacity="100%" style:text-line-through-style="none" style:text-line-through-type="none" style:text-position="0% 100%" style:font-name="Century Schoolbook" fo:font-family="'Century Schoolbook'" fo:font-size="18pt" fo:letter-spacing="normal" fo:font-style="normal" style:text-underline-style="none" fo:font-weight="normal" fo:background-color="transparent" style:font-size-asian="18pt" style:font-style-asian="normal" style:font-weight-asian="normal" style:font-name-complex="Arial3" style:font-family-complex="Arial" style:font-family-generic-complex="swiss" style:font-pitch-complex="variable" style:font-size-complex="18pt" style:font-style-complex="normal" style:font-weight-complex="normal"/>
     </style:style>
     <style:style style:name="Slide_20_de_20_título-outline3" style:display-name="Slide de título-outline3" style:family="presentation" style:parent-style-name="Slide_20_de_20_título-outline2">
       <style:paragraph-properties fo:margin-top="0.3cm" fo:margin-bottom="0cm" fo:line-height="100%" fo:text-align="start" style:punctuation-wrap="simple" style:writing-mode="lr-tb"/>
-      <style:text-properties fo:font-variant="normal" fo:text-transform="none" fo:color="#000000" loext:opacity="100%" style:text-line-through-style="none" style:text-line-through-type="none" style:text-position="0% 100%" style:font-name="Century Schoolbook2" fo:font-family="'Century Schoolbook'" fo:font-size="18pt" fo:letter-spacing="normal" fo:font-style="normal" style:text-underline-style="none" fo:font-weight="normal" fo:background-color="transparent" style:font-size-asian="18pt" style:font-style-asian="normal" style:font-weight-asian="normal" style:font-name-complex="Arial2" style:font-family-complex="Arial" style:font-family-generic-complex="swiss" style:font-pitch-complex="variable" style:font-size-complex="18pt" style:font-style-complex="normal" style:font-weight-complex="normal"/>
+      <style:text-properties fo:font-variant="normal" fo:text-transform="none" fo:color="#000000" loext:opacity="100%" style:text-line-through-style="none" style:text-line-through-type="none" style:text-position="0% 100%" style:font-name="Century Schoolbook" fo:font-family="'Century Schoolbook'" fo:font-size="18pt" fo:letter-spacing="normal" fo:font-style="normal" style:text-underline-style="none" fo:font-weight="normal" fo:background-color="transparent" style:font-size-asian="18pt" style:font-style-asian="normal" style:font-weight-asian="normal" style:font-name-complex="Arial3" style:font-family-complex="Arial" style:font-family-generic-complex="swiss" style:font-pitch-complex="variable" style:font-size-complex="18pt" style:font-style-complex="normal" style:font-weight-complex="normal"/>
     </style:style>
     <style:style style:name="Slide_20_de_20_título-outline4" style:display-name="Slide de título-outline4" style:family="presentation" style:parent-style-name="Slide_20_de_20_título-outline3">
       <style:paragraph-properties fo:margin-top="0.2cm" fo:margin-bottom="0cm" fo:line-height="100%" fo:text-align="start" style:punctuation-wrap="simple" style:writing-mode="lr-tb"/>
-      <style:text-properties fo:font-variant="normal" fo:text-transform="none" fo:color="#000000" loext:opacity="100%" style:text-line-through-style="none" style:text-line-through-type="none" style:text-position="0% 100%" style:font-name="Century Schoolbook2" fo:font-family="'Century Schoolbook'" fo:font-size="16pt" fo:letter-spacing="normal" fo:font-style="normal" style:text-underline-style="none" fo:font-weight="normal" fo:background-color="transparent" style:font-size-asian="16pt" style:font-style-asian="normal" style:font-weight-asian="normal" style:font-name-complex="Arial2" style:font-family-complex="Arial" style:font-family-generic-complex="swiss" style:font-pitch-complex="variable" style:font-size-complex="16pt" style:font-style-complex="normal" style:font-weight-complex="normal"/>
+      <style:text-properties fo:font-variant="normal" fo:text-transform="none" fo:color="#000000" loext:opacity="100%" style:text-line-through-style="none" style:text-line-through-type="none" style:text-position="0% 100%" style:font-name="Century Schoolbook" fo:font-family="'Century Schoolbook'" fo:font-size="16pt" fo:letter-spacing="normal" fo:font-style="normal" style:text-underline-style="none" fo:font-weight="normal" fo:background-color="transparent" style:font-size-asian="16pt" style:font-style-asian="normal" style:font-weight-asian="normal" style:font-name-complex="Arial3" style:font-family-complex="Arial" style:font-family-generic-complex="swiss" style:font-pitch-complex="variable" style:font-size-complex="16pt" style:font-style-complex="normal" style:font-weight-complex="normal"/>
     </style:style>
     <style:style style:name="Slide_20_de_20_título-outline5" style:display-name="Slide de título-outline5" style:family="presentation" style:parent-style-name="Slide_20_de_20_título-outline4">
       <style:paragraph-properties fo:margin-top="0.1cm" fo:margin-bottom="0cm"/>
@@ -1648,7 +1583,7 @@
         </text:list-style>
       </style:graphic-properties>
       <style:paragraph-properties fo:margin-left="0cm" fo:margin-right="0cm" fo:text-align="center" fo:text-indent="0cm"/>
-      <style:text-properties fo:font-variant="normal" fo:text-transform="none" style:use-window-font-color="true" loext:opacity="0%" style:text-outline="false" style:text-line-through-style="none" style:text-line-through-type="none" style:font-name="Liberation Sans" fo:font-family="'Liberation Sans'" style:font-family-generic="roman" style:font-pitch="variable" fo:font-size="32pt" fo:font-style="normal" fo:text-shadow="none" style:text-underline-style="none" fo:font-weight="normal" style:letter-kerning="true" fo:background-color="transparent" style:font-name-asian="Microsoft YaHei1" style:font-family-asian="'Microsoft YaHei'" style:font-family-generic-asian="system" style:font-pitch-asian="variable" style:font-size-asian="32pt" style:font-style-asian="normal" style:font-weight-asian="normal" style:font-name-complex="Arial Unicode MS2" style:font-family-complex="'Arial Unicode MS'" style:font-family-generic-complex="system" style:font-pitch-complex="variable" style:font-size-complex="32pt" style:font-style-complex="normal" style:font-weight-complex="normal" style:text-emphasize="none" style:font-relief="none" style:text-overline-style="none" style:text-overline-color="font-color"/>
+      <style:text-properties fo:font-variant="normal" fo:text-transform="none" style:use-window-font-color="true" loext:opacity="0%" style:text-outline="false" style:text-line-through-style="none" style:text-line-through-type="none" style:font-name="Liberation Sans" fo:font-family="'Liberation Sans'" style:font-family-generic="roman" style:font-pitch="variable" fo:font-size="32pt" fo:font-style="normal" fo:text-shadow="none" style:text-underline-style="none" fo:font-weight="normal" style:letter-kerning="true" fo:background-color="transparent" style:font-name-asian="Microsoft YaHei" style:font-family-asian="'Microsoft YaHei'" style:font-family-generic-asian="system" style:font-pitch-asian="variable" style:font-size-asian="32pt" style:font-style-asian="normal" style:font-weight-asian="normal" style:font-name-complex="Arial Unicode MS" style:font-family-complex="'Arial Unicode MS'" style:font-family-generic-complex="system" style:font-pitch-complex="variable" style:font-size-complex="32pt" style:font-style-complex="normal" style:font-weight-complex="normal" style:text-emphasize="none" style:font-relief="none" style:text-overline-style="none" style:text-overline-color="font-color"/>
     </style:style>
     <style:style style:name="Slide_20_de_20_título-title" style:display-name="Slide de título-title" style:family="presentation">
       <style:graphic-properties draw:stroke="none" draw:fill="none" draw:textarea-vertical-align="middle">
@@ -1696,7 +1631,7 @@
         </text:list-style>
       </style:graphic-properties>
       <style:paragraph-properties fo:line-height="100%" fo:text-align="start" style:punctuation-wrap="simple" style:writing-mode="lr-tb"/>
-      <style:text-properties fo:font-variant="normal" fo:text-transform="none" fo:color="#000000" loext:opacity="100%" style:text-outline="false" style:text-line-through-style="none" style:text-line-through-type="none" style:text-position="0% 100%" style:font-name="Arial2" fo:font-family="Arial" style:font-family-generic="swiss" style:font-pitch="variable" fo:font-size="25pt" fo:letter-spacing="normal" fo:language="pt" fo:country="BR" fo:font-style="normal" fo:text-shadow="none" style:text-underline-style="none" fo:font-weight="normal" style:letter-kerning="true" fo:background-color="transparent" style:font-name-asian="Microsoft YaHei1" style:font-family-asian="'Microsoft YaHei'" style:font-family-generic-asian="system" style:font-pitch-asian="variable" style:font-size-asian="25pt" style:font-style-asian="normal" style:font-weight-asian="normal" style:font-name-complex="Arial2" style:font-family-complex="Arial" style:font-family-generic-complex="swiss" style:font-pitch-complex="variable" style:font-size-complex="25pt" style:font-style-complex="normal" style:font-weight-complex="normal" style:text-emphasize="none" style:font-relief="none" style:text-overline-style="none" style:text-overline-color="font-color"/>
+      <style:text-properties fo:font-variant="normal" fo:text-transform="none" fo:color="#000000" loext:opacity="100%" style:text-outline="false" style:text-line-through-style="none" style:text-line-through-type="none" style:text-position="0% 100%" style:font-name="Arial3" fo:font-family="Arial" style:font-family-generic="swiss" style:font-pitch="variable" fo:font-size="25pt" fo:letter-spacing="normal" fo:language="pt" fo:country="BR" fo:font-style="normal" fo:text-shadow="none" style:text-underline-style="none" fo:font-weight="normal" style:letter-kerning="true" fo:background-color="transparent" style:font-name-asian="Microsoft YaHei" style:font-family-asian="'Microsoft YaHei'" style:font-family-generic-asian="system" style:font-pitch-asian="variable" style:font-size-asian="25pt" style:font-style-asian="normal" style:font-weight-asian="normal" style:font-name-complex="Arial3" style:font-family-complex="Arial" style:font-family-generic-complex="swiss" style:font-pitch-complex="variable" style:font-size-complex="25pt" style:font-style-complex="normal" style:font-weight-complex="normal" style:text-emphasize="none" style:font-relief="none" style:text-overline-style="none" style:text-overline-color="font-color"/>
     </style:style>
     <style:style style:name="Título_20_e_20_conteúdo-background" style:display-name="Título e conteúdo-background" style:family="presentation">
       <style:graphic-properties draw:stroke="none" draw:fill="solid" draw:fill-color="#ffffff"/>
@@ -1709,7 +1644,7 @@
     <style:style style:name="Título_20_e_20_conteúdo-notes" style:display-name="Título e conteúdo-notes" style:family="presentation">
       <style:graphic-properties draw:stroke="none" draw:fill="none"/>
       <style:paragraph-properties fo:margin-left="0.6cm" fo:margin-right="0cm" fo:text-indent="-0.6cm"/>
-      <style:text-properties fo:font-variant="normal" fo:text-transform="none" style:use-window-font-color="true" loext:opacity="0%" style:text-outline="false" style:text-line-through-style="none" style:text-line-through-type="none" style:font-name="Liberation Sans" fo:font-family="'Liberation Sans'" style:font-family-generic="roman" style:font-pitch="variable" fo:font-size="20pt" fo:font-style="normal" fo:text-shadow="none" style:text-underline-style="none" fo:font-weight="normal" style:letter-kerning="true" fo:background-color="transparent" style:font-name-asian="Microsoft YaHei1" style:font-family-asian="'Microsoft YaHei'" style:font-family-generic-asian="system" style:font-pitch-asian="variable" style:font-size-asian="20pt" style:font-style-asian="normal" style:font-weight-asian="normal" style:font-name-complex="Arial Unicode MS2" style:font-family-complex="'Arial Unicode MS'" style:font-family-generic-complex="system" style:font-pitch-complex="variable" style:font-size-complex="20pt" style:font-style-complex="normal" style:font-weight-complex="normal" style:text-emphasize="none" style:font-relief="none" style:text-overline-style="none" style:text-overline-color="font-color"/>
+      <style:text-properties fo:font-variant="normal" fo:text-transform="none" style:use-window-font-color="true" loext:opacity="0%" style:text-outline="false" style:text-line-through-style="none" style:text-line-through-type="none" style:font-name="Liberation Sans" fo:font-family="'Liberation Sans'" style:font-family-generic="roman" style:font-pitch="variable" fo:font-size="20pt" fo:font-style="normal" fo:text-shadow="none" style:text-underline-style="none" fo:font-weight="normal" style:letter-kerning="true" fo:background-color="transparent" style:font-name-asian="Microsoft YaHei" style:font-family-asian="'Microsoft YaHei'" style:font-family-generic-asian="system" style:font-pitch-asian="variable" style:font-size-asian="20pt" style:font-style-asian="normal" style:font-weight-asian="normal" style:font-name-complex="Arial Unicode MS" style:font-family-complex="'Arial Unicode MS'" style:font-family-generic-complex="system" style:font-pitch-complex="variable" style:font-size-complex="20pt" style:font-style-complex="normal" style:font-weight-complex="normal" style:text-emphasize="none" style:font-relief="none" style:text-overline-style="none" style:text-overline-color="font-color"/>
     </style:style>
     <style:style style:name="Título_20_e_20_conteúdo-outline1" style:display-name="Título e conteúdo-outline1" style:family="presentation">
       <style:graphic-properties draw:stroke="none" draw:fill="none" draw:auto-grow-height="false" draw:fit-to-size="false" style:shrink-to-fit="true">
@@ -1757,19 +1692,19 @@
         </text:list-style>
       </style:graphic-properties>
       <style:paragraph-properties fo:margin-top="0.5cm" fo:margin-bottom="0cm" fo:line-height="100%" fo:text-align="start" style:punctuation-wrap="simple" style:writing-mode="lr-tb"/>
-      <style:text-properties fo:font-variant="normal" fo:text-transform="none" fo:color="#000000" loext:opacity="100%" style:text-outline="false" style:text-line-through-style="none" style:text-line-through-type="none" style:text-position="0% 100%" style:font-name="Century Schoolbook2" fo:font-family="'Century Schoolbook'" fo:font-size="20pt" fo:letter-spacing="normal" fo:language="pt" fo:country="BR" fo:font-style="normal" fo:text-shadow="none" style:text-underline-style="none" fo:font-weight="normal" style:letter-kerning="true" fo:background-color="transparent" style:font-name-asian="Microsoft YaHei1" style:font-family-asian="'Microsoft YaHei'" style:font-family-generic-asian="system" style:font-pitch-asian="variable" style:font-size-asian="20pt" style:font-style-asian="normal" style:font-weight-asian="normal" style:font-name-complex="Arial2" style:font-family-complex="Arial" style:font-family-generic-complex="swiss" style:font-pitch-complex="variable" style:font-size-complex="20pt" style:font-style-complex="normal" style:font-weight-complex="normal" style:text-emphasize="none" style:font-relief="none" style:text-overline-style="none" style:text-overline-color="font-color"/>
+      <style:text-properties fo:font-variant="normal" fo:text-transform="none" fo:color="#000000" loext:opacity="100%" style:text-outline="false" style:text-line-through-style="none" style:text-line-through-type="none" style:text-position="0% 100%" style:font-name="Century Schoolbook" fo:font-family="'Century Schoolbook'" fo:font-size="20pt" fo:letter-spacing="normal" fo:language="pt" fo:country="BR" fo:font-style="normal" fo:text-shadow="none" style:text-underline-style="none" fo:font-weight="normal" style:letter-kerning="true" fo:background-color="transparent" style:font-name-asian="Microsoft YaHei" style:font-family-asian="'Microsoft YaHei'" style:font-family-generic-asian="system" style:font-pitch-asian="variable" style:font-size-asian="20pt" style:font-style-asian="normal" style:font-weight-asian="normal" style:font-name-complex="Arial3" style:font-family-complex="Arial" style:font-family-generic-complex="swiss" style:font-pitch-complex="variable" style:font-size-complex="20pt" style:font-style-complex="normal" style:font-weight-complex="normal" style:text-emphasize="none" style:font-relief="none" style:text-overline-style="none" style:text-overline-color="font-color"/>
     </style:style>
     <style:style style:name="Título_20_e_20_conteúdo-outline2" style:display-name="Título e conteúdo-outline2" style:family="presentation" style:parent-style-name="Título_20_e_20_conteúdo-outline1">
       <style:paragraph-properties fo:margin-top="0.4cm" fo:margin-bottom="0cm" fo:line-height="100%" fo:text-align="start" style:punctuation-wrap="simple" style:writing-mode="lr-tb"/>
-      <style:text-properties fo:font-variant="normal" fo:text-transform="none" fo:color="#000000" loext:opacity="100%" style:text-line-through-style="none" style:text-line-through-type="none" style:text-position="0% 100%" style:font-name="Century Schoolbook2" fo:font-family="'Century Schoolbook'" fo:font-size="18pt" fo:letter-spacing="normal" fo:font-style="normal" style:text-underline-style="none" fo:font-weight="normal" fo:background-color="transparent" style:font-size-asian="18pt" style:font-style-asian="normal" style:font-weight-asian="normal" style:font-name-complex="Arial2" style:font-family-complex="Arial" style:font-family-generic-complex="swiss" style:font-pitch-complex="variable" style:font-size-complex="18pt" style:font-style-complex="normal" style:font-weight-complex="normal"/>
+      <style:text-properties fo:font-variant="normal" fo:text-transform="none" fo:color="#000000" loext:opacity="100%" style:text-line-through-style="none" style:text-line-through-type="none" style:text-position="0% 100%" style:font-name="Century Schoolbook" fo:font-family="'Century Schoolbook'" fo:font-size="18pt" fo:letter-spacing="normal" fo:font-style="normal" style:text-underline-style="none" fo:font-weight="normal" fo:background-color="transparent" style:font-size-asian="18pt" style:font-style-asian="normal" style:font-weight-asian="normal" style:font-name-complex="Arial3" style:font-family-complex="Arial" style:font-family-generic-complex="swiss" style:font-pitch-complex="variable" style:font-size-complex="18pt" style:font-style-complex="normal" style:font-weight-complex="normal"/>
     </style:style>
     <style:style style:name="Título_20_e_20_conteúdo-outline3" style:display-name="Título e conteúdo-outline3" style:family="presentation" style:parent-style-name="Título_20_e_20_conteúdo-outline2">
       <style:paragraph-properties fo:margin-top="0.3cm" fo:margin-bottom="0cm" fo:line-height="100%" fo:text-align="start" style:punctuation-wrap="simple" style:writing-mode="lr-tb"/>
-      <style:text-properties fo:font-variant="normal" fo:text-transform="none" fo:color="#000000" loext:opacity="100%" style:text-line-through-style="none" style:text-line-through-type="none" style:text-position="0% 100%" style:font-name="Century Schoolbook2" fo:font-family="'Century Schoolbook'" fo:font-size="18pt" fo:letter-spacing="normal" fo:font-style="normal" style:text-underline-style="none" fo:font-weight="normal" fo:background-color="transparent" style:font-size-asian="18pt" style:font-style-asian="normal" style:font-weight-asian="normal" style:font-name-complex="Arial2" style:font-family-complex="Arial" style:font-family-generic-complex="swiss" style:font-pitch-complex="variable" style:font-size-complex="18pt" style:font-style-complex="normal" style:font-weight-complex="normal"/>
+      <style:text-properties fo:font-variant="normal" fo:text-transform="none" fo:color="#000000" loext:opacity="100%" style:text-line-through-style="none" style:text-line-through-type="none" style:text-position="0% 100%" style:font-name="Century Schoolbook" fo:font-family="'Century Schoolbook'" fo:font-size="18pt" fo:letter-spacing="normal" fo:font-style="normal" style:text-underline-style="none" fo:font-weight="normal" fo:background-color="transparent" style:font-size-asian="18pt" style:font-style-asian="normal" style:font-weight-asian="normal" style:font-name-complex="Arial3" style:font-family-complex="Arial" style:font-family-generic-complex="swiss" style:font-pitch-complex="variable" style:font-size-complex="18pt" style:font-style-complex="normal" style:font-weight-complex="normal"/>
     </style:style>
     <style:style style:name="Título_20_e_20_conteúdo-outline4" style:display-name="Título e conteúdo-outline4" style:family="presentation" style:parent-style-name="Título_20_e_20_conteúdo-outline3">
       <style:paragraph-properties fo:margin-top="0.2cm" fo:margin-bottom="0cm" fo:line-height="100%" fo:text-align="start" style:punctuation-wrap="simple" style:writing-mode="lr-tb"/>
-      <style:text-properties fo:font-variant="normal" fo:text-transform="none" fo:color="#000000" loext:opacity="100%" style:text-line-through-style="none" style:text-line-through-type="none" style:text-position="0% 100%" style:font-name="Century Schoolbook2" fo:font-family="'Century Schoolbook'" fo:font-size="16pt" fo:letter-spacing="normal" fo:font-style="normal" style:text-underline-style="none" fo:font-weight="normal" fo:background-color="transparent" style:font-size-asian="16pt" style:font-style-asian="normal" style:font-weight-asian="normal" style:font-name-complex="Arial2" style:font-family-complex="Arial" style:font-family-generic-complex="swiss" style:font-pitch-complex="variable" style:font-size-complex="16pt" style:font-style-complex="normal" style:font-weight-complex="normal"/>
+      <style:text-properties fo:font-variant="normal" fo:text-transform="none" fo:color="#000000" loext:opacity="100%" style:text-line-through-style="none" style:text-line-through-type="none" style:text-position="0% 100%" style:font-name="Century Schoolbook" fo:font-family="'Century Schoolbook'" fo:font-size="16pt" fo:letter-spacing="normal" fo:font-style="normal" style:text-underline-style="none" fo:font-weight="normal" fo:background-color="transparent" style:font-size-asian="16pt" style:font-style-asian="normal" style:font-weight-asian="normal" style:font-name-complex="Arial3" style:font-family-complex="Arial" style:font-family-generic-complex="swiss" style:font-pitch-complex="variable" style:font-size-complex="16pt" style:font-style-complex="normal" style:font-weight-complex="normal"/>
     </style:style>
     <style:style style:name="Título_20_e_20_conteúdo-outline5" style:display-name="Título e conteúdo-outline5" style:family="presentation" style:parent-style-name="Título_20_e_20_conteúdo-outline4">
       <style:paragraph-properties fo:margin-top="0.1cm" fo:margin-bottom="0cm"/>
@@ -1837,7 +1772,7 @@
         </text:list-style>
       </style:graphic-properties>
       <style:paragraph-properties fo:margin-left="0cm" fo:margin-right="0cm" fo:text-align="center" fo:text-indent="0cm"/>
-      <style:text-properties fo:font-variant="normal" fo:text-transform="none" style:use-window-font-color="true" loext:opacity="0%" style:text-outline="false" style:text-line-through-style="none" style:text-line-through-type="none" style:font-name="Liberation Sans" fo:font-family="'Liberation Sans'" style:font-family-generic="roman" style:font-pitch="variable" fo:font-size="32pt" fo:font-style="normal" fo:text-shadow="none" style:text-underline-style="none" fo:font-weight="normal" style:letter-kerning="true" fo:background-color="transparent" style:font-name-asian="Microsoft YaHei1" style:font-family-asian="'Microsoft YaHei'" style:font-family-generic-asian="system" style:font-pitch-asian="variable" style:font-size-asian="32pt" style:font-style-asian="normal" style:font-weight-asian="normal" style:font-name-complex="Arial Unicode MS2" style:font-family-complex="'Arial Unicode MS'" style:font-family-generic-complex="system" style:font-pitch-complex="variable" style:font-size-complex="32pt" style:font-style-complex="normal" style:font-weight-complex="normal" style:text-emphasize="none" style:font-relief="none" style:text-overline-style="none" style:text-overline-color="font-color"/>
+      <style:text-properties fo:font-variant="normal" fo:text-transform="none" style:use-window-font-color="true" loext:opacity="0%" style:text-outline="false" style:text-line-through-style="none" style:text-line-through-type="none" style:font-name="Liberation Sans" fo:font-family="'Liberation Sans'" style:font-family-generic="roman" style:font-pitch="variable" fo:font-size="32pt" fo:font-style="normal" fo:text-shadow="none" style:text-underline-style="none" fo:font-weight="normal" style:letter-kerning="true" fo:background-color="transparent" style:font-name-asian="Microsoft YaHei" style:font-family-asian="'Microsoft YaHei'" style:font-family-generic-asian="system" style:font-pitch-asian="variable" style:font-size-asian="32pt" style:font-style-asian="normal" style:font-weight-asian="normal" style:font-name-complex="Arial Unicode MS" style:font-family-complex="'Arial Unicode MS'" style:font-family-generic-complex="system" style:font-pitch-complex="variable" style:font-size-complex="32pt" style:font-style-complex="normal" style:font-weight-complex="normal" style:text-emphasize="none" style:font-relief="none" style:text-overline-style="none" style:text-overline-color="font-color"/>
     </style:style>
     <style:style style:name="Título_20_e_20_conteúdo-title" style:display-name="Título e conteúdo-title" style:family="presentation">
       <style:graphic-properties draw:stroke="none" draw:fill="none" draw:textarea-vertical-align="middle">
@@ -1885,7 +1820,7 @@
         </text:list-style>
       </style:graphic-properties>
       <style:paragraph-properties fo:line-height="100%" fo:text-align="start" style:punctuation-wrap="simple" style:writing-mode="lr-tb"/>
-      <style:text-properties fo:font-variant="normal" fo:text-transform="none" fo:color="#000000" loext:opacity="100%" style:text-outline="false" style:text-line-through-style="none" style:text-line-through-type="none" style:text-position="0% 100%" style:font-name="Arial2" fo:font-family="Arial" style:font-family-generic="swiss" style:font-pitch="variable" fo:font-size="25pt" fo:letter-spacing="normal" fo:language="pt" fo:country="BR" fo:font-style="normal" fo:text-shadow="none" style:text-underline-style="none" fo:font-weight="normal" style:letter-kerning="true" fo:background-color="transparent" style:font-name-asian="Microsoft YaHei1" style:font-family-asian="'Microsoft YaHei'" style:font-family-generic-asian="system" style:font-pitch-asian="variable" style:font-size-asian="25pt" style:font-style-asian="normal" style:font-weight-asian="normal" style:font-name-complex="Arial2" style:font-family-complex="Arial" style:font-family-generic-complex="swiss" style:font-pitch-complex="variable" style:font-size-complex="25pt" style:font-style-complex="normal" style:font-weight-complex="normal" style:text-emphasize="none" style:font-relief="none" style:text-overline-style="none" style:text-overline-color="font-color"/>
+      <style:text-properties fo:font-variant="normal" fo:text-transform="none" fo:color="#000000" loext:opacity="100%" style:text-outline="false" style:text-line-through-style="none" style:text-line-through-type="none" style:text-position="0% 100%" style:font-name="Arial3" fo:font-family="Arial" style:font-family-generic="swiss" style:font-pitch="variable" fo:font-size="25pt" fo:letter-spacing="normal" fo:language="pt" fo:country="BR" fo:font-style="normal" fo:text-shadow="none" style:text-underline-style="none" fo:font-weight="normal" style:letter-kerning="true" fo:background-color="transparent" style:font-name-asian="Microsoft YaHei" style:font-family-asian="'Microsoft YaHei'" style:font-family-generic-asian="system" style:font-pitch-asian="variable" style:font-size-asian="25pt" style:font-style-asian="normal" style:font-weight-asian="normal" style:font-name-complex="Arial3" style:font-family-complex="Arial" style:font-family-generic-complex="swiss" style:font-pitch-complex="variable" style:font-size-complex="25pt" style:font-style-complex="normal" style:font-weight-complex="normal" style:text-emphasize="none" style:font-relief="none" style:text-overline-style="none" style:text-overline-color="font-color"/>
     </style:style>
     <style:style style:name="Título_20_e_20_conteúdo_5f_-background" style:display-name="Título e conteúdo_-background" style:family="presentation">
       <style:graphic-properties draw:stroke="none" draw:fill="solid" draw:fill-color="#ffffff"/>
@@ -1898,7 +1833,7 @@
     <style:style style:name="Título_20_e_20_conteúdo_5f_-notes" style:display-name="Título e conteúdo_-notes" style:family="presentation">
       <style:graphic-properties draw:stroke="none" draw:fill="none"/>
       <style:paragraph-properties fo:margin-left="0.6cm" fo:margin-right="0cm" fo:text-indent="-0.6cm"/>
-      <style:text-properties fo:font-variant="normal" fo:text-transform="none" style:use-window-font-color="true" loext:opacity="0%" style:text-outline="false" style:text-line-through-style="none" style:text-line-through-type="none" style:font-name="Liberation Sans" fo:font-family="'Liberation Sans'" style:font-family-generic="roman" style:font-pitch="variable" fo:font-size="20pt" fo:font-style="normal" fo:text-shadow="none" style:text-underline-style="none" fo:font-weight="normal" style:letter-kerning="true" fo:background-color="transparent" style:font-name-asian="Microsoft YaHei1" style:font-family-asian="'Microsoft YaHei'" style:font-family-generic-asian="system" style:font-pitch-asian="variable" style:font-size-asian="20pt" style:font-style-asian="normal" style:font-weight-asian="normal" style:font-name-complex="Arial Unicode MS2" style:font-family-complex="'Arial Unicode MS'" style:font-family-generic-complex="system" style:font-pitch-complex="variable" style:font-size-complex="20pt" style:font-style-complex="normal" style:font-weight-complex="normal" style:text-emphasize="none" style:font-relief="none" style:text-overline-style="none" style:text-overline-color="font-color"/>
+      <style:text-properties fo:font-variant="normal" fo:text-transform="none" style:use-window-font-color="true" loext:opacity="0%" style:text-outline="false" style:text-line-through-style="none" style:text-line-through-type="none" style:font-name="Liberation Sans" fo:font-family="'Liberation Sans'" style:font-family-generic="roman" style:font-pitch="variable" fo:font-size="20pt" fo:font-style="normal" fo:text-shadow="none" style:text-underline-style="none" fo:font-weight="normal" style:letter-kerning="true" fo:background-color="transparent" style:font-name-asian="Microsoft YaHei" style:font-family-asian="'Microsoft YaHei'" style:font-family-generic-asian="system" style:font-pitch-asian="variable" style:font-size-asian="20pt" style:font-style-asian="normal" style:font-weight-asian="normal" style:font-name-complex="Arial Unicode MS" style:font-family-complex="'Arial Unicode MS'" style:font-family-generic-complex="system" style:font-pitch-complex="variable" style:font-size-complex="20pt" style:font-style-complex="normal" style:font-weight-complex="normal" style:text-emphasize="none" style:font-relief="none" style:text-overline-style="none" style:text-overline-color="font-color"/>
     </style:style>
     <style:style style:name="Título_20_e_20_conteúdo_5f_-outline1" style:display-name="Título e conteúdo_-outline1" style:family="presentation">
       <style:graphic-properties draw:stroke="none" draw:fill="none" draw:auto-grow-height="false" draw:fit-to-size="false" style:shrink-to-fit="true">
@@ -1946,19 +1881,19 @@
         </text:list-style>
       </style:graphic-properties>
       <style:paragraph-properties fo:margin-top="0.5cm" fo:margin-bottom="0cm" fo:line-height="100%" fo:text-align="start" style:punctuation-wrap="simple" style:writing-mode="lr-tb"/>
-      <style:text-properties fo:font-variant="normal" fo:text-transform="none" fo:color="#000000" loext:opacity="100%" style:text-outline="false" style:text-line-through-style="none" style:text-line-through-type="none" style:text-position="0% 100%" style:font-name="Century Schoolbook2" fo:font-family="'Century Schoolbook'" fo:font-size="20pt" fo:letter-spacing="normal" fo:language="pt" fo:country="BR" fo:font-style="normal" fo:text-shadow="none" style:text-underline-style="none" fo:font-weight="normal" style:letter-kerning="true" fo:background-color="transparent" style:font-name-asian="Microsoft YaHei1" style:font-family-asian="'Microsoft YaHei'" style:font-family-generic-asian="system" style:font-pitch-asian="variable" style:font-size-asian="20pt" style:font-style-asian="normal" style:font-weight-asian="normal" style:font-name-complex="Arial2" style:font-family-complex="Arial" style:font-family-generic-complex="swiss" style:font-pitch-complex="variable" style:font-size-complex="20pt" style:font-style-complex="normal" style:font-weight-complex="normal" style:text-emphasize="none" style:font-relief="none" style:text-overline-style="none" style:text-overline-color="font-color"/>
+      <style:text-properties fo:font-variant="normal" fo:text-transform="none" fo:color="#000000" loext:opacity="100%" style:text-outline="false" style:text-line-through-style="none" style:text-line-through-type="none" style:text-position="0% 100%" style:font-name="Century Schoolbook" fo:font-family="'Century Schoolbook'" fo:font-size="20pt" fo:letter-spacing="normal" fo:language="pt" fo:country="BR" fo:font-style="normal" fo:text-shadow="none" style:text-underline-style="none" fo:font-weight="normal" style:letter-kerning="true" fo:background-color="transparent" style:font-name-asian="Microsoft YaHei" style:font-family-asian="'Microsoft YaHei'" style:font-family-generic-asian="system" style:font-pitch-asian="variable" style:font-size-asian="20pt" style:font-style-asian="normal" style:font-weight-asian="normal" style:font-name-complex="Arial3" style:font-family-complex="Arial" style:font-family-generic-complex="swiss" style:font-pitch-complex="variable" style:font-size-complex="20pt" style:font-style-complex="normal" style:font-weight-complex="normal" style:text-emphasize="none" style:font-relief="none" style:text-overline-style="none" style:text-overline-color="font-color"/>
     </style:style>
     <style:style style:name="Título_20_e_20_conteúdo_5f_-outline2" style:display-name="Título e conteúdo_-outline2" style:family="presentation" style:parent-style-name="Título_20_e_20_conteúdo_5f_-outline1">
       <style:paragraph-properties fo:margin-top="0.4cm" fo:margin-bottom="0cm" fo:line-height="100%" fo:text-align="start" style:punctuation-wrap="simple" style:writing-mode="lr-tb"/>
-      <style:text-properties fo:font-variant="normal" fo:text-transform="none" fo:color="#000000" loext:opacity="100%" style:text-line-through-style="none" style:text-line-through-type="none" style:text-position="0% 100%" style:font-name="Century Schoolbook2" fo:font-family="'Century Schoolbook'" fo:font-size="18pt" fo:letter-spacing="normal" fo:font-style="normal" style:text-underline-style="none" fo:font-weight="normal" fo:background-color="transparent" style:font-size-asian="18pt" style:font-style-asian="normal" style:font-weight-asian="normal" style:font-name-complex="Arial2" style:font-family-complex="Arial" style:font-family-generic-complex="swiss" style:font-pitch-complex="variable" style:font-size-complex="18pt" style:font-style-complex="normal" style:font-weight-complex="normal"/>
+      <style:text-properties fo:font-variant="normal" fo:text-transform="none" fo:color="#000000" loext:opacity="100%" style:text-line-through-style="none" style:text-line-through-type="none" style:text-position="0% 100%" style:font-name="Century Schoolbook" fo:font-family="'Century Schoolbook'" fo:font-size="18pt" fo:letter-spacing="normal" fo:font-style="normal" style:text-underline-style="none" fo:font-weight="normal" fo:background-color="transparent" style:font-size-asian="18pt" style:font-style-asian="normal" style:font-weight-asian="normal" style:font-name-complex="Arial3" style:font-family-complex="Arial" style:font-family-generic-complex="swiss" style:font-pitch-complex="variable" style:font-size-complex="18pt" style:font-style-complex="normal" style:font-weight-complex="normal"/>
     </style:style>
     <style:style style:name="Título_20_e_20_conteúdo_5f_-outline3" style:display-name="Título e conteúdo_-outline3" style:family="presentation" style:parent-style-name="Título_20_e_20_conteúdo_5f_-outline2">
       <style:paragraph-properties fo:margin-top="0.3cm" fo:margin-bottom="0cm" fo:line-height="100%" fo:text-align="start" style:punctuation-wrap="simple" style:writing-mode="lr-tb"/>
-      <style:text-properties fo:font-variant="normal" fo:text-transform="none" fo:color="#000000" loext:opacity="100%" style:text-line-through-style="none" style:text-line-through-type="none" style:text-position="0% 100%" style:font-name="Century Schoolbook2" fo:font-family="'Century Schoolbook'" fo:font-size="18pt" fo:letter-spacing="normal" fo:font-style="normal" style:text-underline-style="none" fo:font-weight="normal" fo:background-color="transparent" style:font-size-asian="18pt" style:font-style-asian="normal" style:font-weight-asian="normal" style:font-name-complex="Arial2" style:font-family-complex="Arial" style:font-family-generic-complex="swiss" style:font-pitch-complex="variable" style:font-size-complex="18pt" style:font-style-complex="normal" style:font-weight-complex="normal"/>
+      <style:text-properties fo:font-variant="normal" fo:text-transform="none" fo:color="#000000" loext:opacity="100%" style:text-line-through-style="none" style:text-line-through-type="none" style:text-position="0% 100%" style:font-name="Century Schoolbook" fo:font-family="'Century Schoolbook'" fo:font-size="18pt" fo:letter-spacing="normal" fo:font-style="normal" style:text-underline-style="none" fo:font-weight="normal" fo:background-color="transparent" style:font-size-asian="18pt" style:font-style-asian="normal" style:font-weight-asian="normal" style:font-name-complex="Arial3" style:font-family-complex="Arial" style:font-family-generic-complex="swiss" style:font-pitch-complex="variable" style:font-size-complex="18pt" style:font-style-complex="normal" style:font-weight-complex="normal"/>
     </style:style>
     <style:style style:name="Título_20_e_20_conteúdo_5f_-outline4" style:display-name="Título e conteúdo_-outline4" style:family="presentation" style:parent-style-name="Título_20_e_20_conteúdo_5f_-outline3">
       <style:paragraph-properties fo:margin-top="0.2cm" fo:margin-bottom="0cm" fo:line-height="100%" fo:text-align="start" style:punctuation-wrap="simple" style:writing-mode="lr-tb"/>
-      <style:text-properties fo:font-variant="normal" fo:text-transform="none" fo:color="#000000" loext:opacity="100%" style:text-line-through-style="none" style:text-line-through-type="none" style:text-position="0% 100%" style:font-name="Century Schoolbook2" fo:font-family="'Century Schoolbook'" fo:font-size="16pt" fo:letter-spacing="normal" fo:font-style="normal" style:text-underline-style="none" fo:font-weight="normal" fo:background-color="transparent" style:font-size-asian="16pt" style:font-style-asian="normal" style:font-weight-asian="normal" style:font-name-complex="Arial2" style:font-family-complex="Arial" style:font-family-generic-complex="swiss" style:font-pitch-complex="variable" style:font-size-complex="16pt" style:font-style-complex="normal" style:font-weight-complex="normal"/>
+      <style:text-properties fo:font-variant="normal" fo:text-transform="none" fo:color="#000000" loext:opacity="100%" style:text-line-through-style="none" style:text-line-through-type="none" style:text-position="0% 100%" style:font-name="Century Schoolbook" fo:font-family="'Century Schoolbook'" fo:font-size="16pt" fo:letter-spacing="normal" fo:font-style="normal" style:text-underline-style="none" fo:font-weight="normal" fo:background-color="transparent" style:font-size-asian="16pt" style:font-style-asian="normal" style:font-weight-asian="normal" style:font-name-complex="Arial3" style:font-family-complex="Arial" style:font-family-generic-complex="swiss" style:font-pitch-complex="variable" style:font-size-complex="16pt" style:font-style-complex="normal" style:font-weight-complex="normal"/>
     </style:style>
     <style:style style:name="Título_20_e_20_conteúdo_5f_-outline5" style:display-name="Título e conteúdo_-outline5" style:family="presentation" style:parent-style-name="Título_20_e_20_conteúdo_5f_-outline4">
       <style:paragraph-properties fo:margin-top="0.1cm" fo:margin-bottom="0cm"/>
@@ -2026,7 +1961,7 @@
         </text:list-style>
       </style:graphic-properties>
       <style:paragraph-properties fo:margin-left="0cm" fo:margin-right="0cm" fo:text-align="center" fo:text-indent="0cm"/>
-      <style:text-properties fo:font-variant="normal" fo:text-transform="none" style:use-window-font-color="true" loext:opacity="0%" style:text-outline="false" style:text-line-through-style="none" style:text-line-through-type="none" style:font-name="Liberation Sans" fo:font-family="'Liberation Sans'" style:font-family-generic="roman" style:font-pitch="variable" fo:font-size="32pt" fo:font-style="normal" fo:text-shadow="none" style:text-underline-style="none" fo:font-weight="normal" style:letter-kerning="true" fo:background-color="transparent" style:font-name-asian="Microsoft YaHei1" style:font-family-asian="'Microsoft YaHei'" style:font-family-generic-asian="system" style:font-pitch-asian="variable" style:font-size-asian="32pt" style:font-style-asian="normal" style:font-weight-asian="normal" style:font-name-complex="Arial Unicode MS2" style:font-family-complex="'Arial Unicode MS'" style:font-family-generic-complex="system" style:font-pitch-complex="variable" style:font-size-complex="32pt" style:font-style-complex="normal" style:font-weight-complex="normal" style:text-emphasize="none" style:font-relief="none" style:text-overline-style="none" style:text-overline-color="font-color"/>
+      <style:text-properties fo:font-variant="normal" fo:text-transform="none" style:use-window-font-color="true" loext:opacity="0%" style:text-outline="false" style:text-line-through-style="none" style:text-line-through-type="none" style:font-name="Liberation Sans" fo:font-family="'Liberation Sans'" style:font-family-generic="roman" style:font-pitch="variable" fo:font-size="32pt" fo:font-style="normal" fo:text-shadow="none" style:text-underline-style="none" fo:font-weight="normal" style:letter-kerning="true" fo:background-color="transparent" style:font-name-asian="Microsoft YaHei" style:font-family-asian="'Microsoft YaHei'" style:font-family-generic-asian="system" style:font-pitch-asian="variable" style:font-size-asian="32pt" style:font-style-asian="normal" style:font-weight-asian="normal" style:font-name-complex="Arial Unicode MS" style:font-family-complex="'Arial Unicode MS'" style:font-family-generic-complex="system" style:font-pitch-complex="variable" style:font-size-complex="32pt" style:font-style-complex="normal" style:font-weight-complex="normal" style:text-emphasize="none" style:font-relief="none" style:text-overline-style="none" style:text-overline-color="font-color"/>
     </style:style>
     <style:style style:name="Título_20_e_20_conteúdo_5f_-title" style:display-name="Título e conteúdo_-title" style:family="presentation">
       <style:graphic-properties draw:stroke="none" draw:fill="none" draw:textarea-vertical-align="middle">
@@ -2074,7 +2009,7 @@
         </text:list-style>
       </style:graphic-properties>
       <style:paragraph-properties fo:line-height="100%" fo:text-align="start" style:punctuation-wrap="simple" style:writing-mode="lr-tb"/>
-      <style:text-properties fo:font-variant="normal" fo:text-transform="none" fo:color="#000000" loext:opacity="100%" style:text-outline="false" style:text-line-through-style="none" style:text-line-through-type="none" style:text-position="0% 100%" style:font-name="Arial2" fo:font-family="Arial" style:font-family-generic="swiss" style:font-pitch="variable" fo:font-size="25pt" fo:letter-spacing="normal" fo:language="pt" fo:country="BR" fo:font-style="normal" fo:text-shadow="none" style:text-underline-style="none" fo:font-weight="normal" style:letter-kerning="true" fo:background-color="transparent" style:font-name-asian="Microsoft YaHei1" style:font-family-asian="'Microsoft YaHei'" style:font-family-generic-asian="system" style:font-pitch-asian="variable" style:font-size-asian="25pt" style:font-style-asian="normal" style:font-weight-asian="normal" style:font-name-complex="Arial2" style:font-family-complex="Arial" style:font-family-generic-complex="swiss" style:font-pitch-complex="variable" style:font-size-complex="25pt" style:font-style-complex="normal" style:font-weight-complex="normal" style:text-emphasize="none" style:font-relief="none" style:text-overline-style="none" style:text-overline-color="font-color"/>
+      <style:text-properties fo:font-variant="normal" fo:text-transform="none" fo:color="#000000" loext:opacity="100%" style:text-outline="false" style:text-line-through-style="none" style:text-line-through-type="none" style:text-position="0% 100%" style:font-name="Arial3" fo:font-family="Arial" style:font-family-generic="swiss" style:font-pitch="variable" fo:font-size="25pt" fo:letter-spacing="normal" fo:language="pt" fo:country="BR" fo:font-style="normal" fo:text-shadow="none" style:text-underline-style="none" fo:font-weight="normal" style:letter-kerning="true" fo:background-color="transparent" style:font-name-asian="Microsoft YaHei" style:font-family-asian="'Microsoft YaHei'" style:font-family-generic-asian="system" style:font-pitch-asian="variable" style:font-size-asian="25pt" style:font-style-asian="normal" style:font-weight-asian="normal" style:font-name-complex="Arial3" style:font-family-complex="Arial" style:font-family-generic-complex="swiss" style:font-pitch-complex="variable" style:font-size-complex="25pt" style:font-style-complex="normal" style:font-weight-complex="normal" style:text-emphasize="none" style:font-relief="none" style:text-overline-style="none" style:text-overline-color="font-color"/>
     </style:style>
     <style:presentation-page-layout style:name="AL0T26">
       <presentation:placeholder presentation:object="handout" svg:x="2.058cm" svg:y="1.743cm" svg:width="10.556cm" svg:height="-0.231cm"/>
@@ -2230,19 +2165,21 @@
       <style:paragraph-properties style:writing-mode="lr-tb"/>
     </style:style>
     <style:style style:name="MP1" style:family="paragraph">
+      <style:paragraph-properties style:writing-mode="lr-tb"/>
       <style:text-properties fo:font-size="14pt" style:font-size-asian="14pt" style:font-size-complex="14pt"/>
     </style:style>
     <style:style style:name="MP2" style:family="paragraph">
       <loext:graphic-properties draw:fill="none" draw:fill-color="#ffffff"/>
+      <style:paragraph-properties style:writing-mode="lr-tb"/>
       <style:text-properties fo:font-size="14pt" style:font-size-asian="14pt" style:font-size-complex="14pt"/>
     </style:style>
     <style:style style:name="MP3" style:family="paragraph">
-      <style:paragraph-properties fo:text-align="end"/>
+      <style:paragraph-properties fo:text-align="end" style:writing-mode="lr-tb"/>
       <style:text-properties fo:font-size="14pt" style:font-size-asian="14pt" style:font-size-complex="14pt"/>
     </style:style>
     <style:style style:name="MP4" style:family="paragraph">
       <loext:graphic-properties draw:fill="none" draw:fill-color="#ffffff"/>
-      <style:paragraph-properties fo:text-align="end"/>
+      <style:paragraph-properties fo:text-align="end" style:writing-mode="lr-tb"/>
       <style:text-properties fo:font-size="14pt" style:font-size-asian="14pt" style:font-size-complex="14pt"/>
     </style:style>
     <style:style style:name="MP5" style:family="paragraph">
@@ -2292,25 +2229,24 @@
     </style:style>
     <style:style style:name="MP14" style:family="paragraph">
       <style:paragraph-properties fo:margin-top="0cm" fo:margin-bottom="0cm" fo:line-height="100%" fo:text-align="center" style:punctuation-wrap="simple" style:writing-mode="lr-tb"/>
-      <style:text-properties fo:font-size="32pt"/>
     </style:style>
     <style:style style:name="MP15" style:family="paragraph">
       <loext:graphic-properties draw:fill="none"/>
-      <style:paragraph-properties fo:text-align="start" style:font-independent-line-spacing="true"/>
+      <style:paragraph-properties fo:text-align="start" style:writing-mode="lr-tb" style:font-independent-line-spacing="true"/>
       <style:text-properties fo:font-size="32pt"/>
     </style:style>
     <style:style style:name="MP16" style:family="paragraph">
       <style:paragraph-properties fo:margin-top="0cm" fo:margin-bottom="0cm" fo:line-height="100%" fo:text-align="end" style:punctuation-wrap="hanging" style:writing-mode="lr-tb"/>
-      <style:text-properties fo:font-size="14pt" style:font-size-asian="14pt" style:font-size-complex="14pt" fo:hyphenate="false"/>
+      <style:text-properties fo:font-size="12pt" style:font-size-asian="14pt" style:font-size-complex="14pt" fo:hyphenate="false"/>
     </style:style>
     <style:style style:name="MP17" style:family="paragraph">
       <loext:graphic-properties draw:fill="none" draw:fill-color="#ffffff"/>
-      <style:paragraph-properties fo:text-align="start" style:font-independent-line-spacing="true"/>
+      <style:paragraph-properties fo:text-align="start" style:writing-mode="lr-tb" style:font-independent-line-spacing="true"/>
       <style:text-properties fo:font-size="12pt" style:font-size-asian="14pt" style:font-size-complex="14pt"/>
     </style:style>
     <style:style style:name="MP18" style:family="paragraph">
-      <style:paragraph-properties fo:text-align="center"/>
-      <style:text-properties fo:font-size="14pt" style:font-size-asian="14pt" style:font-size-complex="14pt"/>
+      <style:paragraph-properties fo:text-align="center" style:writing-mode="lr-tb"/>
+      <style:text-properties fo:font-size="12pt" style:font-size-asian="14pt" style:font-size-complex="14pt"/>
     </style:style>
     <style:style style:name="MP19" style:family="paragraph">
       <style:paragraph-properties fo:margin-top="0cm" fo:margin-bottom="0cm" fo:line-height="100%" fo:text-align="center" style:punctuation-wrap="hanging" style:writing-mode="lr-tb"/>
@@ -2318,50 +2254,49 @@
     </style:style>
     <style:style style:name="MP20" style:family="paragraph">
       <loext:graphic-properties draw:fill="none" draw:fill-color="#ffffff"/>
-      <style:paragraph-properties fo:text-align="start" style:font-independent-line-spacing="true"/>
+      <style:paragraph-properties fo:text-align="start" style:writing-mode="lr-tb" style:font-independent-line-spacing="true"/>
       <style:text-properties fo:font-size="14pt" style:font-size-asian="14pt" style:font-size-complex="14pt"/>
     </style:style>
     <style:style style:name="MP21" style:family="paragraph">
       <style:paragraph-properties fo:margin-left="0cm" fo:margin-right="0cm" fo:margin-top="0.212cm" fo:margin-bottom="0cm" fo:line-height="100%" fo:text-align="start" fo:text-indent="0cm" style:punctuation-wrap="simple" style:writing-mode="lr-tb"/>
-      <style:text-properties fo:font-size="20pt"/>
     </style:style>
     <style:style style:name="MP22" style:family="paragraph">
       <style:paragraph-properties fo:margin-left="0cm" fo:margin-right="0cm" fo:margin-top="0.148cm" fo:margin-bottom="0cm" fo:line-height="100%" fo:text-align="start" fo:text-indent="0cm" style:punctuation-wrap="simple" style:writing-mode="lr-tb"/>
-      <style:text-properties fo:font-size="20pt"/>
     </style:style>
     <style:style style:name="MP23" style:family="paragraph">
       <style:paragraph-properties fo:margin-left="0cm" fo:margin-right="0cm" fo:margin-top="0.127cm" fo:margin-bottom="0cm" fo:line-height="100%" fo:text-align="start" fo:text-indent="0cm" style:punctuation-wrap="simple" style:writing-mode="lr-tb"/>
-      <style:text-properties fo:font-size="20pt"/>
     </style:style>
     <style:style style:name="MP24" style:family="paragraph">
       <style:paragraph-properties fo:margin-left="0cm" fo:margin-right="0cm" fo:margin-top="0.113cm" fo:margin-bottom="0cm" fo:line-height="100%" fo:text-align="start" fo:text-indent="0cm" style:punctuation-wrap="simple" style:writing-mode="lr-tb"/>
-      <style:text-properties fo:font-size="20pt"/>
     </style:style>
     <style:style style:name="MP25" style:family="paragraph">
       <loext:graphic-properties draw:fill="none"/>
-      <style:paragraph-properties fo:text-align="start" style:font-independent-line-spacing="true"/>
+      <style:paragraph-properties fo:text-align="start" style:writing-mode="lr-tb" style:font-independent-line-spacing="true"/>
       <style:text-properties fo:font-size="20pt"/>
     </style:style>
     <style:style style:name="MT1" style:family="text">
-      <style:text-properties fo:font-variant="small-caps" fo:color="#90c226" loext:opacity="100%" style:text-line-through-style="none" style:text-line-through-type="none" style:text-position="0% 100%" style:font-name="Century Schoolbook2" fo:font-size="32pt" fo:letter-spacing="normal" fo:language="pt" fo:country="BR" fo:font-style="normal" style:text-underline-style="none" fo:font-weight="bold" fo:background-color="transparent" style:font-size-asian="32pt" style:font-style-asian="normal" style:font-weight-asian="bold" style:font-size-complex="32pt" style:font-style-complex="normal" style:font-weight-complex="bold"/>
+      <style:text-properties fo:font-size="14pt" style:font-size-asian="14pt" style:font-size-complex="14pt"/>
     </style:style>
     <style:style style:name="MT2" style:family="text">
-      <style:text-properties fo:font-variant="normal" fo:text-transform="none" fo:color="#3e3d2d" loext:opacity="100%" style:text-line-through-style="none" style:text-line-through-type="none" style:text-position="0% 100%" style:font-name="Century Schoolbook2" fo:font-size="12pt" fo:letter-spacing="normal" fo:language="pt" fo:country="BR" fo:font-style="normal" style:text-underline-style="none" fo:font-weight="normal" fo:background-color="transparent" style:font-size-asian="12pt" style:font-style-asian="normal" style:font-weight-asian="normal" style:font-size-complex="12pt" style:font-style-complex="normal" style:font-weight-complex="normal"/>
+      <style:text-properties fo:font-variant="small-caps" fo:color="#90c226" loext:opacity="100%" style:text-line-through-style="none" style:text-line-through-type="none" style:text-position="0% 100%" style:font-name="Century Schoolbook" fo:font-size="32pt" fo:letter-spacing="normal" fo:language="pt" fo:country="BR" fo:font-style="normal" style:text-underline-style="none" fo:font-weight="bold" fo:background-color="transparent" style:font-size-asian="32pt" style:font-style-asian="normal" style:font-weight-asian="bold" style:font-size-complex="32pt" style:font-style-complex="normal" style:font-weight-complex="bold"/>
     </style:style>
     <style:style style:name="MT3" style:family="text">
-      <style:text-properties fo:font-variant="normal" fo:text-transform="none" fo:color="#ffffff" loext:opacity="100%" style:text-line-through-style="none" style:text-line-through-type="none" style:text-position="0% 100%" style:font-name="Century Schoolbook" fo:font-size="14pt" fo:letter-spacing="normal" fo:language="pt" fo:country="BR" fo:font-style="normal" style:text-underline-style="none" fo:font-weight="bold" fo:background-color="transparent" style:font-size-asian="14pt" style:font-style-asian="normal" style:font-weight-asian="bold" style:font-name-complex="Arial2" style:font-size-complex="14pt" style:font-style-complex="normal" style:font-weight-complex="bold"/>
+      <style:text-properties fo:font-variant="normal" fo:text-transform="none" fo:color="#3e3d2d" loext:opacity="100%" style:text-line-through-style="none" style:text-line-through-type="none" style:text-position="0% 100%" style:font-name="Century Schoolbook" fo:font-size="12pt" fo:letter-spacing="normal" fo:language="pt" fo:country="BR" fo:font-style="normal" style:text-underline-style="none" fo:font-weight="normal" fo:background-color="transparent" style:font-size-asian="12pt" style:font-style-asian="normal" style:font-weight-asian="normal" style:font-size-complex="12pt" style:font-style-complex="normal" style:font-weight-complex="normal"/>
     </style:style>
     <style:style style:name="MT4" style:family="text">
-      <style:text-properties fo:font-variant="normal" fo:text-transform="none" fo:color="#000000" loext:opacity="100%" style:text-line-through-style="none" style:text-line-through-type="none" style:text-position="0% 100%" style:font-name="Century Schoolbook2" fo:font-size="20pt" fo:letter-spacing="normal" fo:language="pt" fo:country="BR" fo:font-style="normal" style:text-underline-style="none" fo:font-weight="normal" fo:background-color="transparent" style:font-size-asian="20pt" style:font-style-asian="normal" style:font-weight-asian="normal" style:font-size-complex="20pt" style:font-style-complex="normal" style:font-weight-complex="normal"/>
+      <style:text-properties fo:font-variant="normal" fo:text-transform="none" fo:color="#ffffff" loext:opacity="100%" style:text-line-through-style="none" style:text-line-through-type="none" style:text-position="0% 100%" style:font-name="Century Schoolbook2" fo:font-size="14pt" fo:letter-spacing="normal" fo:language="pt" fo:country="BR" fo:font-style="normal" style:text-underline-style="none" fo:font-weight="bold" fo:background-color="transparent" style:font-size-asian="14pt" style:font-style-asian="normal" style:font-weight-asian="bold" style:font-name-complex="Arial3" style:font-size-complex="14pt" style:font-style-complex="normal" style:font-weight-complex="bold"/>
     </style:style>
     <style:style style:name="MT5" style:family="text">
-      <style:text-properties fo:font-variant="normal" fo:text-transform="none" fo:color="#000000" loext:opacity="100%" style:text-line-through-style="none" style:text-line-through-type="none" style:text-position="0% 100%" style:font-name="Century Schoolbook2" fo:font-size="21pt" fo:letter-spacing="normal" fo:language="pt" fo:country="BR" fo:font-style="normal" style:text-underline-style="none" fo:font-weight="normal" fo:background-color="transparent" style:font-size-asian="21pt" style:font-style-asian="normal" style:font-weight-asian="normal" style:font-size-complex="21pt" style:font-style-complex="normal" style:font-weight-complex="normal"/>
+      <style:text-properties fo:font-variant="normal" fo:text-transform="none" fo:color="#000000" loext:opacity="100%" style:text-line-through-style="none" style:text-line-through-type="none" style:text-position="0% 100%" style:font-name="Century Schoolbook" fo:font-size="20pt" fo:letter-spacing="normal" fo:language="pt" fo:country="BR" fo:font-style="normal" style:text-underline-style="none" fo:font-weight="normal" fo:background-color="transparent" style:font-size-asian="20pt" style:font-style-asian="normal" style:font-weight-asian="normal" style:font-size-complex="20pt" style:font-style-complex="normal" style:font-weight-complex="normal"/>
     </style:style>
     <style:style style:name="MT6" style:family="text">
-      <style:text-properties fo:font-variant="normal" fo:text-transform="none" fo:color="#000000" loext:opacity="100%" style:text-line-through-style="none" style:text-line-through-type="none" style:text-position="0% 100%" style:font-name="Century Schoolbook2" fo:font-size="18pt" fo:letter-spacing="normal" fo:language="pt" fo:country="BR" fo:font-style="normal" style:text-underline-style="none" fo:font-weight="normal" fo:background-color="transparent" style:font-size-asian="18pt" style:font-style-asian="normal" style:font-weight-asian="normal" style:font-size-complex="18pt" style:font-style-complex="normal" style:font-weight-complex="normal"/>
+      <style:text-properties fo:font-variant="normal" fo:text-transform="none" fo:color="#000000" loext:opacity="100%" style:text-line-through-style="none" style:text-line-through-type="none" style:text-position="0% 100%" style:font-name="Century Schoolbook" fo:font-size="21pt" fo:letter-spacing="normal" fo:language="pt" fo:country="BR" fo:font-style="normal" style:text-underline-style="none" fo:font-weight="normal" fo:background-color="transparent" style:font-size-asian="21pt" style:font-style-asian="normal" style:font-weight-asian="normal" style:font-size-complex="21pt" style:font-style-complex="normal" style:font-weight-complex="normal"/>
     </style:style>
     <style:style style:name="MT7" style:family="text">
-      <style:text-properties fo:font-variant="normal" fo:text-transform="none" fo:color="#000000" loext:opacity="100%" style:text-line-through-style="none" style:text-line-through-type="none" style:text-position="0% 100%" style:font-name="Century Schoolbook2" fo:font-size="16pt" fo:letter-spacing="normal" fo:language="pt" fo:country="BR" fo:font-style="normal" style:text-underline-style="none" fo:font-weight="normal" fo:background-color="transparent" style:font-size-asian="16pt" style:font-style-asian="normal" style:font-weight-asian="normal" style:font-size-complex="16pt" style:font-style-complex="normal" style:font-weight-complex="normal"/>
+      <style:text-properties fo:font-variant="normal" fo:text-transform="none" fo:color="#000000" loext:opacity="100%" style:text-line-through-style="none" style:text-line-through-type="none" style:text-position="0% 100%" style:font-name="Century Schoolbook" fo:font-size="18pt" fo:letter-spacing="normal" fo:language="pt" fo:country="BR" fo:font-style="normal" style:text-underline-style="none" fo:font-weight="normal" fo:background-color="transparent" style:font-size-asian="18pt" style:font-style-asian="normal" style:font-weight-asian="normal" style:font-size-complex="18pt" style:font-style-complex="normal" style:font-weight-complex="normal"/>
+    </style:style>
+    <style:style style:name="MT8" style:family="text">
+      <style:text-properties fo:font-variant="normal" fo:text-transform="none" fo:color="#000000" loext:opacity="100%" style:text-line-through-style="none" style:text-line-through-type="none" style:text-position="0% 100%" style:font-name="Century Schoolbook" fo:font-size="16pt" fo:letter-spacing="normal" fo:language="pt" fo:country="BR" fo:font-style="normal" style:text-underline-style="none" fo:font-weight="normal" fo:background-color="transparent" style:font-size-asian="16pt" style:font-style-asian="normal" style:font-weight-asian="normal" style:font-size-complex="16pt" style:font-style-complex="normal" style:font-weight-complex="normal"/>
     </style:style>
     <text:list-style style:name="ML1">
       <text:list-level-style-bullet text:level="1" text:bullet-char="●">
@@ -2408,7 +2343,7 @@
     <text:list-style style:name="ML2">
       <text:list-level-style-bullet text:level="1" text:bullet-char="●">
         <style:list-level-properties text:min-label-width="0.6cm"/>
-        <style:text-properties fo:font-family="StarSymbol" fo:color="#90c226" fo:font-size="100%"/>
+        <style:text-properties fo:font-family="StarSymbol" style:use-window-font-color="true" fo:font-size="45%"/>
       </text:list-level-style-bullet>
       <text:list-level-style-bullet text:level="2" text:bullet-char="●">
         <style:list-level-properties text:space-before="0.6cm" text:min-label-width="0.6cm"/>
@@ -2449,134 +2384,8 @@
     </text:list-style>
     <text:list-style style:name="ML3">
       <text:list-level-style-bullet text:level="1" text:bullet-char="●">
-        <style:list-level-properties text:min-label-width="0.6cm"/>
-        <style:text-properties fo:font-family="StarSymbol" fo:color="#3e3d2d" fo:font-size="100%"/>
-      </text:list-level-style-bullet>
-      <text:list-level-style-bullet text:level="2" text:bullet-char="●">
-        <style:list-level-properties text:space-before="0.6cm" text:min-label-width="0.6cm"/>
-        <style:text-properties fo:font-family="StarSymbol" style:use-window-font-color="true" fo:font-size="45%"/>
-      </text:list-level-style-bullet>
-      <text:list-level-style-bullet text:level="3" text:bullet-char="●">
-        <style:list-level-properties text:space-before="1.2cm" text:min-label-width="0.6cm"/>
-        <style:text-properties fo:font-family="StarSymbol" style:use-window-font-color="true" fo:font-size="45%"/>
-      </text:list-level-style-bullet>
-      <text:list-level-style-bullet text:level="4" text:bullet-char="●">
-        <style:list-level-properties text:space-before="1.8cm" text:min-label-width="0.6cm"/>
-        <style:text-properties fo:font-family="StarSymbol" style:use-window-font-color="true" fo:font-size="45%"/>
-      </text:list-level-style-bullet>
-      <text:list-level-style-bullet text:level="5" text:bullet-char="●">
-        <style:list-level-properties text:space-before="2.4cm" text:min-label-width="0.6cm"/>
-        <style:text-properties fo:font-family="StarSymbol" style:use-window-font-color="true" fo:font-size="45%"/>
-      </text:list-level-style-bullet>
-      <text:list-level-style-bullet text:level="6" text:bullet-char="●">
-        <style:list-level-properties text:space-before="3cm" text:min-label-width="0.6cm"/>
-        <style:text-properties fo:font-family="StarSymbol" style:use-window-font-color="true" fo:font-size="45%"/>
-      </text:list-level-style-bullet>
-      <text:list-level-style-bullet text:level="7" text:bullet-char="●">
-        <style:list-level-properties text:space-before="3.6cm" text:min-label-width="0.6cm"/>
-        <style:text-properties fo:font-family="StarSymbol" style:use-window-font-color="true" fo:font-size="45%"/>
-      </text:list-level-style-bullet>
-      <text:list-level-style-bullet text:level="8" text:bullet-char="●">
-        <style:list-level-properties text:space-before="4.2cm" text:min-label-width="0.6cm"/>
-        <style:text-properties fo:font-family="StarSymbol" style:use-window-font-color="true" fo:font-size="45%"/>
-      </text:list-level-style-bullet>
-      <text:list-level-style-bullet text:level="9" text:bullet-char="●">
-        <style:list-level-properties text:space-before="4.8cm" text:min-label-width="0.6cm"/>
-        <style:text-properties fo:font-family="StarSymbol" style:use-window-font-color="true" fo:font-size="45%"/>
-      </text:list-level-style-bullet>
-      <text:list-level-style-bullet text:level="10" text:bullet-char="●">
-        <style:list-level-properties text:space-before="5.4cm" text:min-label-width="0.6cm"/>
-        <style:text-properties fo:font-family="StarSymbol" style:use-window-font-color="true" fo:font-size="45%"/>
-      </text:list-level-style-bullet>
-    </text:list-style>
-    <text:list-style style:name="ML4">
-      <text:list-level-style-bullet text:level="1" text:bullet-char="●">
-        <style:list-level-properties text:min-label-width="0.6cm"/>
-        <style:text-properties fo:font-family="StarSymbol" style:use-window-font-color="true" fo:font-size="45%"/>
-      </text:list-level-style-bullet>
-      <text:list-level-style-bullet text:level="2" text:bullet-char="●">
-        <style:list-level-properties text:space-before="0.6cm" text:min-label-width="0.6cm"/>
-        <style:text-properties fo:font-family="StarSymbol" style:use-window-font-color="true" fo:font-size="45%"/>
-      </text:list-level-style-bullet>
-      <text:list-level-style-bullet text:level="3" text:bullet-char="●">
-        <style:list-level-properties text:space-before="1.2cm" text:min-label-width="0.6cm"/>
-        <style:text-properties fo:font-family="StarSymbol" style:use-window-font-color="true" fo:font-size="45%"/>
-      </text:list-level-style-bullet>
-      <text:list-level-style-bullet text:level="4" text:bullet-char="●">
-        <style:list-level-properties text:space-before="1.8cm" text:min-label-width="0.6cm"/>
-        <style:text-properties fo:font-family="StarSymbol" style:use-window-font-color="true" fo:font-size="45%"/>
-      </text:list-level-style-bullet>
-      <text:list-level-style-bullet text:level="5" text:bullet-char="●">
-        <style:list-level-properties text:space-before="2.4cm" text:min-label-width="0.6cm"/>
-        <style:text-properties fo:font-family="StarSymbol" style:use-window-font-color="true" fo:font-size="45%"/>
-      </text:list-level-style-bullet>
-      <text:list-level-style-bullet text:level="6" text:bullet-char="●">
-        <style:list-level-properties text:space-before="3cm" text:min-label-width="0.6cm"/>
-        <style:text-properties fo:font-family="StarSymbol" style:use-window-font-color="true" fo:font-size="45%"/>
-      </text:list-level-style-bullet>
-      <text:list-level-style-bullet text:level="7" text:bullet-char="●">
-        <style:list-level-properties text:space-before="3.6cm" text:min-label-width="0.6cm"/>
-        <style:text-properties fo:font-family="StarSymbol" style:use-window-font-color="true" fo:font-size="45%"/>
-      </text:list-level-style-bullet>
-      <text:list-level-style-bullet text:level="8" text:bullet-char="●">
-        <style:list-level-properties text:space-before="4.2cm" text:min-label-width="0.6cm"/>
-        <style:text-properties fo:font-family="StarSymbol" style:use-window-font-color="true" fo:font-size="45%"/>
-      </text:list-level-style-bullet>
-      <text:list-level-style-bullet text:level="9" text:bullet-char="●">
-        <style:list-level-properties text:space-before="4.8cm" text:min-label-width="0.6cm"/>
-        <style:text-properties fo:font-family="StarSymbol" style:use-window-font-color="true" fo:font-size="45%"/>
-      </text:list-level-style-bullet>
-      <text:list-level-style-bullet text:level="10" text:bullet-char="●">
-        <style:list-level-properties text:space-before="5.4cm" text:min-label-width="0.6cm"/>
-        <style:text-properties fo:font-family="StarSymbol" style:use-window-font-color="true" fo:font-size="45%"/>
-      </text:list-level-style-bullet>
-    </text:list-style>
-    <text:list-style style:name="ML5">
-      <text:list-level-style-bullet text:level="1" text:bullet-char="●">
-        <style:list-level-properties text:min-label-width="0.6cm"/>
-        <style:text-properties fo:font-family="StarSymbol" fo:color="#ffffff" fo:font-size="100%"/>
-      </text:list-level-style-bullet>
-      <text:list-level-style-bullet text:level="2" text:bullet-char="●">
-        <style:list-level-properties text:space-before="0.6cm" text:min-label-width="0.6cm"/>
-        <style:text-properties fo:font-family="StarSymbol" style:use-window-font-color="true" fo:font-size="45%"/>
-      </text:list-level-style-bullet>
-      <text:list-level-style-bullet text:level="3" text:bullet-char="●">
-        <style:list-level-properties text:space-before="1.2cm" text:min-label-width="0.6cm"/>
-        <style:text-properties fo:font-family="StarSymbol" style:use-window-font-color="true" fo:font-size="45%"/>
-      </text:list-level-style-bullet>
-      <text:list-level-style-bullet text:level="4" text:bullet-char="●">
-        <style:list-level-properties text:space-before="1.8cm" text:min-label-width="0.6cm"/>
-        <style:text-properties fo:font-family="StarSymbol" style:use-window-font-color="true" fo:font-size="45%"/>
-      </text:list-level-style-bullet>
-      <text:list-level-style-bullet text:level="5" text:bullet-char="●">
-        <style:list-level-properties text:space-before="2.4cm" text:min-label-width="0.6cm"/>
-        <style:text-properties fo:font-family="StarSymbol" style:use-window-font-color="true" fo:font-size="45%"/>
-      </text:list-level-style-bullet>
-      <text:list-level-style-bullet text:level="6" text:bullet-char="●">
-        <style:list-level-properties text:space-before="3cm" text:min-label-width="0.6cm"/>
-        <style:text-properties fo:font-family="StarSymbol" style:use-window-font-color="true" fo:font-size="45%"/>
-      </text:list-level-style-bullet>
-      <text:list-level-style-bullet text:level="7" text:bullet-char="●">
-        <style:list-level-properties text:space-before="3.6cm" text:min-label-width="0.6cm"/>
-        <style:text-properties fo:font-family="StarSymbol" style:use-window-font-color="true" fo:font-size="45%"/>
-      </text:list-level-style-bullet>
-      <text:list-level-style-bullet text:level="8" text:bullet-char="●">
-        <style:list-level-properties text:space-before="4.2cm" text:min-label-width="0.6cm"/>
-        <style:text-properties fo:font-family="StarSymbol" style:use-window-font-color="true" fo:font-size="45%"/>
-      </text:list-level-style-bullet>
-      <text:list-level-style-bullet text:level="9" text:bullet-char="●">
-        <style:list-level-properties text:space-before="4.8cm" text:min-label-width="0.6cm"/>
-        <style:text-properties fo:font-family="StarSymbol" style:use-window-font-color="true" fo:font-size="45%"/>
-      </text:list-level-style-bullet>
-      <text:list-level-style-bullet text:level="10" text:bullet-char="●">
-        <style:list-level-properties text:space-before="5.4cm" text:min-label-width="0.6cm"/>
-        <style:text-properties fo:font-family="StarSymbol" style:use-window-font-color="true" fo:font-size="45%"/>
-      </text:list-level-style-bullet>
-    </text:list-style>
-    <text:list-style style:name="ML6">
-      <text:list-level-style-bullet text:level="1" text:bullet-char="">
-        <style:list-level-properties text:space-before="0.741cm" text:min-label-width="0.745cm"/>
-        <style:text-properties fo:font-family="Wingdings" style:font-pitch="variable" style:font-charset="x-symbol" fo:color="#3e3d2d" fo:font-size="55%"/>
+        <style:list-level-properties text:space-before="0.3cm" text:min-label-width="0.9cm"/>
+        <style:text-properties fo:font-family="StarSymbol" style:use-window-font-color="true" fo:font-size="45%"/>
       </text:list-level-style-bullet>
       <text:list-level-style-bullet text:level="2" text:bullet-char="–">
         <style:list-level-properties text:space-before="1.5cm" text:min-label-width="0.9cm"/>
@@ -2593,174 +2402,6 @@
       <text:list-level-style-bullet text:level="5" text:bullet-char="●">
         <style:list-level-properties text:space-before="5.4cm" text:min-label-width="0.6cm"/>
         <style:text-properties fo:font-family="StarSymbol" style:use-window-font-color="true" fo:font-size="45%"/>
-      </text:list-level-style-bullet>
-      <text:list-level-style-bullet text:level="6" text:bullet-char="●">
-        <style:list-level-properties text:space-before="6.6cm" text:min-label-width="0.6cm"/>
-        <style:text-properties fo:font-family="StarSymbol" style:use-window-font-color="true" fo:font-size="45%"/>
-      </text:list-level-style-bullet>
-      <text:list-level-style-bullet text:level="7" text:bullet-char="●">
-        <style:list-level-properties text:space-before="7.8cm" text:min-label-width="0.6cm"/>
-        <style:text-properties fo:font-family="StarSymbol" style:use-window-font-color="true" fo:font-size="45%"/>
-      </text:list-level-style-bullet>
-      <text:list-level-style-bullet text:level="8" text:bullet-char="●">
-        <style:list-level-properties text:space-before="9cm" text:min-label-width="0.6cm"/>
-        <style:text-properties fo:font-family="StarSymbol" style:use-window-font-color="true" fo:font-size="45%"/>
-      </text:list-level-style-bullet>
-      <text:list-level-style-bullet text:level="9" text:bullet-char="●">
-        <style:list-level-properties text:space-before="10.2cm" text:min-label-width="0.6cm"/>
-        <style:text-properties fo:font-family="StarSymbol" style:use-window-font-color="true" fo:font-size="45%"/>
-      </text:list-level-style-bullet>
-      <text:list-level-style-bullet text:level="10" text:bullet-char="●">
-        <style:list-level-properties text:space-before="11.4cm" text:min-label-width="0.6cm"/>
-        <style:text-properties fo:font-family="StarSymbol" style:use-window-font-color="true" fo:font-size="45%"/>
-      </text:list-level-style-bullet>
-    </text:list-style>
-    <text:list-style style:name="ML7">
-      <text:list-level-style-bullet text:level="1" text:bullet-char="">
-        <style:list-level-properties text:space-before="0.741cm" text:min-label-width="0.745cm"/>
-        <style:text-properties fo:font-family="Wingdings" style:font-pitch="variable" style:font-charset="x-symbol" fo:color="#3e3d2d" fo:font-size="55%"/>
-      </text:list-level-style-bullet>
-      <text:list-level-style-bullet text:level="2" text:bullet-char="">
-        <style:list-level-properties text:space-before="1.019cm" text:min-label-width="0.758cm"/>
-        <style:text-properties fo:font-family="'Wingdings 2'" style:font-family-generic="roman" style:font-pitch="variable" style:font-charset="x-symbol" fo:color="#3e3d2d" fo:font-size="80%"/>
-      </text:list-level-style-bullet>
-      <text:list-level-style-bullet text:level="3" text:bullet-char="●">
-        <style:list-level-properties text:space-before="2.8cm" text:min-label-width="0.8cm"/>
-        <style:text-properties fo:font-family="StarSymbol" style:use-window-font-color="true" fo:font-size="45%"/>
-      </text:list-level-style-bullet>
-      <text:list-level-style-bullet text:level="4" text:bullet-char="–">
-        <style:list-level-properties text:space-before="4.2cm" text:min-label-width="0.6cm"/>
-        <style:text-properties fo:font-family="StarSymbol" style:use-window-font-color="true" fo:font-size="75%"/>
-      </text:list-level-style-bullet>
-      <text:list-level-style-bullet text:level="5" text:bullet-char="●">
-        <style:list-level-properties text:space-before="5.4cm" text:min-label-width="0.6cm"/>
-        <style:text-properties fo:font-family="StarSymbol" style:use-window-font-color="true" fo:font-size="45%"/>
-      </text:list-level-style-bullet>
-      <text:list-level-style-bullet text:level="6" text:bullet-char="●">
-        <style:list-level-properties text:space-before="6.6cm" text:min-label-width="0.6cm"/>
-        <style:text-properties fo:font-family="StarSymbol" style:use-window-font-color="true" fo:font-size="45%"/>
-      </text:list-level-style-bullet>
-      <text:list-level-style-bullet text:level="7" text:bullet-char="●">
-        <style:list-level-properties text:space-before="7.8cm" text:min-label-width="0.6cm"/>
-        <style:text-properties fo:font-family="StarSymbol" style:use-window-font-color="true" fo:font-size="45%"/>
-      </text:list-level-style-bullet>
-      <text:list-level-style-bullet text:level="8" text:bullet-char="●">
-        <style:list-level-properties text:space-before="9cm" text:min-label-width="0.6cm"/>
-        <style:text-properties fo:font-family="StarSymbol" style:use-window-font-color="true" fo:font-size="45%"/>
-      </text:list-level-style-bullet>
-      <text:list-level-style-bullet text:level="9" text:bullet-char="●">
-        <style:list-level-properties text:space-before="10.2cm" text:min-label-width="0.6cm"/>
-        <style:text-properties fo:font-family="StarSymbol" style:use-window-font-color="true" fo:font-size="45%"/>
-      </text:list-level-style-bullet>
-      <text:list-level-style-bullet text:level="10" text:bullet-char="●">
-        <style:list-level-properties text:space-before="11.4cm" text:min-label-width="0.6cm"/>
-        <style:text-properties fo:font-family="StarSymbol" style:use-window-font-color="true" fo:font-size="45%"/>
-      </text:list-level-style-bullet>
-    </text:list-style>
-    <text:list-style style:name="ML8">
-      <text:list-level-style-bullet text:level="1" text:bullet-char="">
-        <style:list-level-properties text:space-before="0.741cm" text:min-label-width="0.745cm"/>
-        <style:text-properties fo:font-family="Wingdings" style:font-pitch="variable" style:font-charset="x-symbol" fo:color="#3e3d2d" fo:font-size="55%"/>
-      </text:list-level-style-bullet>
-      <text:list-level-style-bullet text:level="2" text:bullet-char="">
-        <style:list-level-properties text:space-before="1.019cm" text:min-label-width="0.758cm"/>
-        <style:text-properties fo:font-family="'Wingdings 2'" style:font-family-generic="roman" style:font-pitch="variable" style:font-charset="x-symbol" fo:color="#3e3d2d" fo:font-size="80%"/>
-      </text:list-level-style-bullet>
-      <text:list-level-style-bullet text:level="3" text:bullet-char="">
-        <style:list-level-properties text:space-before="2.033cm" text:min-label-width="0.507cm"/>
-        <style:text-properties fo:font-family="Wingdings" style:font-pitch="variable" style:font-charset="x-symbol" fo:color="#3e3d2d" fo:font-size="60%"/>
-      </text:list-level-style-bullet>
-      <text:list-level-style-bullet text:level="4" text:bullet-char="–">
-        <style:list-level-properties text:space-before="4.2cm" text:min-label-width="0.6cm"/>
-        <style:text-properties fo:font-family="StarSymbol" style:use-window-font-color="true" fo:font-size="75%"/>
-      </text:list-level-style-bullet>
-      <text:list-level-style-bullet text:level="5" text:bullet-char="●">
-        <style:list-level-properties text:space-before="5.4cm" text:min-label-width="0.6cm"/>
-        <style:text-properties fo:font-family="StarSymbol" style:use-window-font-color="true" fo:font-size="45%"/>
-      </text:list-level-style-bullet>
-      <text:list-level-style-bullet text:level="6" text:bullet-char="●">
-        <style:list-level-properties text:space-before="6.6cm" text:min-label-width="0.6cm"/>
-        <style:text-properties fo:font-family="StarSymbol" style:use-window-font-color="true" fo:font-size="45%"/>
-      </text:list-level-style-bullet>
-      <text:list-level-style-bullet text:level="7" text:bullet-char="●">
-        <style:list-level-properties text:space-before="7.8cm" text:min-label-width="0.6cm"/>
-        <style:text-properties fo:font-family="StarSymbol" style:use-window-font-color="true" fo:font-size="45%"/>
-      </text:list-level-style-bullet>
-      <text:list-level-style-bullet text:level="8" text:bullet-char="●">
-        <style:list-level-properties text:space-before="9cm" text:min-label-width="0.6cm"/>
-        <style:text-properties fo:font-family="StarSymbol" style:use-window-font-color="true" fo:font-size="45%"/>
-      </text:list-level-style-bullet>
-      <text:list-level-style-bullet text:level="9" text:bullet-char="●">
-        <style:list-level-properties text:space-before="10.2cm" text:min-label-width="0.6cm"/>
-        <style:text-properties fo:font-family="StarSymbol" style:use-window-font-color="true" fo:font-size="45%"/>
-      </text:list-level-style-bullet>
-      <text:list-level-style-bullet text:level="10" text:bullet-char="●">
-        <style:list-level-properties text:space-before="11.4cm" text:min-label-width="0.6cm"/>
-        <style:text-properties fo:font-family="StarSymbol" style:use-window-font-color="true" fo:font-size="45%"/>
-      </text:list-level-style-bullet>
-    </text:list-style>
-    <text:list-style style:name="ML9">
-      <text:list-level-style-bullet text:level="1" text:bullet-char="">
-        <style:list-level-properties text:space-before="0.741cm" text:min-label-width="0.745cm"/>
-        <style:text-properties fo:font-family="Wingdings" style:font-pitch="variable" style:font-charset="x-symbol" fo:color="#3e3d2d" fo:font-size="55%"/>
-      </text:list-level-style-bullet>
-      <text:list-level-style-bullet text:level="2" text:bullet-char="">
-        <style:list-level-properties text:space-before="1.019cm" text:min-label-width="0.758cm"/>
-        <style:text-properties fo:font-family="'Wingdings 2'" style:font-family-generic="roman" style:font-pitch="variable" style:font-charset="x-symbol" fo:color="#3e3d2d" fo:font-size="80%"/>
-      </text:list-level-style-bullet>
-      <text:list-level-style-bullet text:level="3" text:bullet-char="">
-        <style:list-level-properties text:space-before="2.033cm" text:min-label-width="0.507cm"/>
-        <style:text-properties fo:font-family="Wingdings" style:font-pitch="variable" style:font-charset="x-symbol" fo:color="#3e3d2d" fo:font-size="60%"/>
-      </text:list-level-style-bullet>
-      <text:list-level-style-bullet text:level="4" text:bullet-char="">
-        <style:list-level-properties text:space-before="2.791cm" text:min-label-width="0.507cm"/>
-        <style:text-properties fo:font-family="Wingdings" style:font-pitch="variable" style:font-charset="x-symbol" fo:color="#3e3d2d" fo:font-size="60%"/>
-      </text:list-level-style-bullet>
-      <text:list-level-style-bullet text:level="5" text:bullet-char="●">
-        <style:list-level-properties text:space-before="5.4cm" text:min-label-width="0.6cm"/>
-        <style:text-properties fo:font-family="StarSymbol" style:use-window-font-color="true" fo:font-size="45%"/>
-      </text:list-level-style-bullet>
-      <text:list-level-style-bullet text:level="6" text:bullet-char="●">
-        <style:list-level-properties text:space-before="6.6cm" text:min-label-width="0.6cm"/>
-        <style:text-properties fo:font-family="StarSymbol" style:use-window-font-color="true" fo:font-size="45%"/>
-      </text:list-level-style-bullet>
-      <text:list-level-style-bullet text:level="7" text:bullet-char="●">
-        <style:list-level-properties text:space-before="7.8cm" text:min-label-width="0.6cm"/>
-        <style:text-properties fo:font-family="StarSymbol" style:use-window-font-color="true" fo:font-size="45%"/>
-      </text:list-level-style-bullet>
-      <text:list-level-style-bullet text:level="8" text:bullet-char="●">
-        <style:list-level-properties text:space-before="9cm" text:min-label-width="0.6cm"/>
-        <style:text-properties fo:font-family="StarSymbol" style:use-window-font-color="true" fo:font-size="45%"/>
-      </text:list-level-style-bullet>
-      <text:list-level-style-bullet text:level="9" text:bullet-char="●">
-        <style:list-level-properties text:space-before="10.2cm" text:min-label-width="0.6cm"/>
-        <style:text-properties fo:font-family="StarSymbol" style:use-window-font-color="true" fo:font-size="45%"/>
-      </text:list-level-style-bullet>
-      <text:list-level-style-bullet text:level="10" text:bullet-char="●">
-        <style:list-level-properties text:space-before="11.4cm" text:min-label-width="0.6cm"/>
-        <style:text-properties fo:font-family="StarSymbol" style:use-window-font-color="true" fo:font-size="45%"/>
-      </text:list-level-style-bullet>
-    </text:list-style>
-    <text:list-style style:name="ML10">
-      <text:list-level-style-bullet text:level="1" text:bullet-char="">
-        <style:list-level-properties text:space-before="0.741cm" text:min-label-width="0.745cm"/>
-        <style:text-properties fo:font-family="Wingdings" style:font-pitch="variable" style:font-charset="x-symbol" fo:color="#3e3d2d" fo:font-size="55%"/>
-      </text:list-level-style-bullet>
-      <text:list-level-style-bullet text:level="2" text:bullet-char="">
-        <style:list-level-properties text:space-before="1.019cm" text:min-label-width="0.758cm"/>
-        <style:text-properties fo:font-family="'Wingdings 2'" style:font-family-generic="roman" style:font-pitch="variable" style:font-charset="x-symbol" fo:color="#3e3d2d" fo:font-size="80%"/>
-      </text:list-level-style-bullet>
-      <text:list-level-style-bullet text:level="3" text:bullet-char="">
-        <style:list-level-properties text:space-before="2.033cm" text:min-label-width="0.507cm"/>
-        <style:text-properties fo:font-family="Wingdings" style:font-pitch="variable" style:font-charset="x-symbol" fo:color="#3e3d2d" fo:font-size="60%"/>
-      </text:list-level-style-bullet>
-      <text:list-level-style-bullet text:level="4" text:bullet-char="">
-        <style:list-level-properties text:space-before="2.791cm" text:min-label-width="0.507cm"/>
-        <style:text-properties fo:font-family="Wingdings" style:font-pitch="variable" style:font-charset="x-symbol" fo:color="#3e3d2d" fo:font-size="60%"/>
-      </text:list-level-style-bullet>
-      <text:list-level-style-bullet text:level="5" text:bullet-char="">
-        <style:list-level-properties text:space-before="3.554cm" text:min-label-width="0.507cm"/>
-        <style:text-properties fo:font-family="'Wingdings 2'" style:font-family-generic="roman" style:font-pitch="variable" style:font-charset="x-symbol" fo:color="#3e3d2d" fo:font-size="68%"/>
       </text:list-level-style-bullet>
       <text:list-level-style-bullet text:level="6" text:bullet-char="●">
         <style:list-level-properties text:space-before="6.6cm" text:min-label-width="0.6cm"/>
@@ -2802,28 +2443,36 @@
       <draw:frame draw:style-name="Mgr1" draw:text-style-name="MP2" draw:layer="backgroundobjects" svg:width="9.113cm" svg:height="1.484cm" svg:x="0cm" svg:y="0cm" presentation:class="header">
         <draw:text-box>
           <text:p text:style-name="MP1">
-            <presentation:header/>
+            <text:span text:style-name="MT1">
+              <presentation:header/>
+            </text:span>
           </text:p>
         </draw:text-box>
       </draw:frame>
       <draw:frame draw:style-name="Mgr1" draw:text-style-name="MP4" draw:layer="backgroundobjects" svg:width="9.113cm" svg:height="1.484cm" svg:x="11.886cm" svg:y="0cm" presentation:class="date-time">
         <draw:text-box>
           <text:p text:style-name="MP3">
-            <presentation:date-time/>
+            <text:span text:style-name="MT1">
+              <presentation:date-time/>
+            </text:span>
           </text:p>
         </draw:text-box>
       </draw:frame>
       <draw:frame draw:style-name="Mgr2" draw:text-style-name="MP2" draw:layer="backgroundobjects" svg:width="9.113cm" svg:height="1.484cm" svg:x="0cm" svg:y="28.215cm" presentation:class="footer">
         <draw:text-box>
           <text:p text:style-name="MP1">
-            <presentation:footer/>
+            <text:span text:style-name="MT1">
+              <presentation:footer/>
+            </text:span>
           </text:p>
         </draw:text-box>
       </draw:frame>
       <draw:frame draw:style-name="Mgr2" draw:text-style-name="MP4" draw:layer="backgroundobjects" svg:width="9.113cm" svg:height="1.484cm" svg:x="11.886cm" svg:y="28.215cm" presentation:class="page-number">
         <draw:text-box>
           <text:p text:style-name="MP3">
-            <text:page-number>&lt;número&gt;</text:page-number>
+            <text:span text:style-name="MT1">
+              <text:page-number>2</text:page-number>
+            </text:span>
           </text:p>
         </draw:text-box>
       </draw:frame>
@@ -2840,7 +2489,7 @@
       </draw:line>
       <draw:custom-shape draw:name="Retângulo 9" draw:style-name="Mgr6" draw:text-style-name="MP6" draw:layer="backgroundobjects" drawooo:display="none" svg:width="0.846cm" svg:height="19.049cm" svg:x="24.553cm" svg:y="0cm">
         <text:p/>
-        <draw:enhanced-geometry draw:mirror-horizontal="false" draw:mirror-vertical="false" draw:text-areas="0 0 ?f3 ?f2" svg:viewBox="0 0 0 0" draw:type="ooxml-rect" draw:enhanced-path="M 0 0 L ?f3 0 ?f3 ?f2 0 ?f2 Z N">
+        <draw:enhanced-geometry draw:mirror-horizontal="false" draw:mirror-vertical="false" svg:viewBox="0 0 0 0" draw:text-areas="0 0 ?f3 ?f2" draw:type="ooxml-rect" draw:enhanced-path="M 0 0 L ?f3 0 ?f3 ?f2 0 ?f2 Z N">
           <draw:equation draw:name="f0" draw:formula="logwidth/2"/>
           <draw:equation draw:name="f1" draw:formula="logheight/2"/>
           <draw:equation draw:name="f2" draw:formula="logheight"/>
@@ -2852,7 +2501,7 @@
       </draw:line>
       <draw:custom-shape draw:name="Elipse 11" draw:style-name="Mgr8" draw:text-style-name="MP7" draw:layer="backgroundobjects" drawooo:display="none" svg:width="1.525cm" svg:height="1.525cm" svg:x="22.657cm" svg:y="15.875cm">
         <text:p/>
-        <draw:enhanced-geometry draw:mirror-horizontal="false" draw:mirror-vertical="false" draw:text-areas="?f5 ?f8 ?f6 ?f9" svg:viewBox="0 0 0 0" draw:type="ooxml-ellipse" draw:enhanced-path="M 0 ?f7 Z N" drawooo:enhanced-path="M 0 ?f7 G ?f0 ?f2 ?f12 ?f13 ?f0 ?f2 ?f14 ?f15 ?f0 ?f2 ?f16 ?f17 ?f0 ?f2 ?f18 ?f19 Z N">
+        <draw:enhanced-geometry draw:mirror-horizontal="false" draw:mirror-vertical="false" svg:viewBox="0 0 0 0" draw:text-areas="?f5 ?f8 ?f6 ?f9" draw:type="ooxml-ellipse" draw:enhanced-path="M 0 ?f7 Z N" drawooo:enhanced-path="M 0 ?f7 G ?f0 ?f2 ?f12 ?f13 ?f0 ?f2 ?f14 ?f15 ?f0 ?f2 ?f16 ?f17 ?f0 ?f2 ?f18 ?f19 Z N">
           <draw:equation draw:name="f0" draw:formula="logwidth/2"/>
           <draw:equation draw:name="f1" draw:formula="?f0 *cos(pi*(2700000)/10800000)"/>
           <draw:equation draw:name="f2" draw:formula="logheight/2"/>
@@ -2883,7 +2532,7 @@
       </draw:frame>
       <draw:custom-shape draw:name="Retângulo 1" draw:style-name="Mgr10" draw:text-style-name="MP9" draw:layer="backgroundobjects" svg:width="1.692cm" svg:height="19.049cm" svg:x="1.058cm" svg:y="0cm">
         <text:p/>
-        <draw:enhanced-geometry draw:mirror-horizontal="false" draw:mirror-vertical="false" draw:text-areas="0 0 ?f3 ?f2" svg:viewBox="0 0 0 0" draw:type="ooxml-rect" draw:enhanced-path="M 0 0 L ?f3 0 ?f3 ?f2 0 ?f2 Z N">
+        <draw:enhanced-geometry draw:mirror-horizontal="false" draw:mirror-vertical="false" svg:viewBox="0 0 0 0" draw:text-areas="0 0 ?f3 ?f2" draw:type="ooxml-rect" draw:enhanced-path="M 0 0 L ?f3 0 ?f3 ?f2 0 ?f2 Z N">
           <draw:equation draw:name="f0" draw:formula="logwidth/2"/>
           <draw:equation draw:name="f1" draw:formula="logheight/2"/>
           <draw:equation draw:name="f2" draw:formula="logheight"/>
@@ -2892,7 +2541,7 @@
       </draw:custom-shape>
       <draw:custom-shape draw:name="Retângulo 2" draw:style-name="Mgr11" draw:text-style-name="MP10" draw:layer="backgroundobjects" svg:width="0.29cm" svg:height="19.049cm" svg:x="0.767cm" svg:y="0cm">
         <text:p/>
-        <draw:enhanced-geometry draw:mirror-horizontal="false" draw:mirror-vertical="false" draw:text-areas="0 0 ?f3 ?f2" svg:viewBox="0 0 0 0" draw:type="ooxml-rect" draw:enhanced-path="M 0 0 L ?f3 0 ?f3 ?f2 0 ?f2 Z N">
+        <draw:enhanced-geometry draw:mirror-horizontal="false" draw:mirror-vertical="false" svg:viewBox="0 0 0 0" draw:text-areas="0 0 ?f3 ?f2" draw:type="ooxml-rect" draw:enhanced-path="M 0 0 L ?f3 0 ?f3 ?f2 0 ?f2 Z N">
           <draw:equation draw:name="f0" draw:formula="logwidth/2"/>
           <draw:equation draw:name="f1" draw:formula="logheight/2"/>
           <draw:equation draw:name="f2" draw:formula="logheight"/>
@@ -2901,7 +2550,7 @@
       </draw:custom-shape>
       <draw:custom-shape draw:name="Retângulo 3" draw:style-name="Mgr12" draw:text-style-name="MP11" draw:layer="backgroundobjects" svg:width="0.506cm" svg:height="19.049cm" svg:x="2.752cm" svg:y="0cm">
         <text:p/>
-        <draw:enhanced-geometry draw:mirror-horizontal="false" draw:mirror-vertical="false" draw:text-areas="0 0 ?f3 ?f2" svg:viewBox="0 0 0 0" draw:type="ooxml-rect" draw:enhanced-path="M 0 0 L ?f3 0 ?f3 ?f2 0 ?f2 Z N">
+        <draw:enhanced-geometry draw:mirror-horizontal="false" draw:mirror-vertical="false" svg:viewBox="0 0 0 0" draw:text-areas="0 0 ?f3 ?f2" draw:type="ooxml-rect" draw:enhanced-path="M 0 0 L ?f3 0 ?f3 ?f2 0 ?f2 Z N">
           <draw:equation draw:name="f0" draw:formula="logwidth/2"/>
           <draw:equation draw:name="f1" draw:formula="logheight/2"/>
           <draw:equation draw:name="f2" draw:formula="logheight"/>
@@ -2910,7 +2559,7 @@
       </draw:custom-shape>
       <draw:custom-shape draw:name="Retângulo 4" draw:style-name="Mgr13" draw:text-style-name="MP12" draw:layer="backgroundobjects" svg:width="0.638cm" svg:height="19.049cm" svg:x="3.171cm" svg:y="0cm">
         <text:p/>
-        <draw:enhanced-geometry draw:mirror-horizontal="false" draw:mirror-vertical="false" draw:text-areas="0 0 ?f3 ?f2" svg:viewBox="0 0 0 0" draw:type="ooxml-rect" draw:enhanced-path="M 0 0 L ?f3 0 ?f3 ?f2 0 ?f2 Z N">
+        <draw:enhanced-geometry draw:mirror-horizontal="false" draw:mirror-vertical="false" svg:viewBox="0 0 0 0" draw:text-areas="0 0 ?f3 ?f2" draw:type="ooxml-rect" draw:enhanced-path="M 0 0 L ?f3 0 ?f3 ?f2 0 ?f2 Z N">
           <draw:equation draw:name="f0" draw:formula="logwidth/2"/>
           <draw:equation draw:name="f1" draw:formula="logheight/2"/>
           <draw:equation draw:name="f2" draw:formula="logheight"/>
@@ -2937,7 +2586,7 @@
       </draw:line>
       <draw:custom-shape draw:name="Retângulo 13" draw:style-name="Mgr18" draw:text-style-name="MP13" draw:layer="backgroundobjects" svg:width="0.211cm" svg:height="19.049cm" svg:x="3.387cm" svg:y="0cm">
         <text:p/>
-        <draw:enhanced-geometry draw:mirror-horizontal="false" draw:mirror-vertical="false" draw:text-areas="0 0 ?f3 ?f2" svg:viewBox="0 0 0 0" draw:type="ooxml-rect" draw:enhanced-path="M 0 0 L ?f3 0 ?f3 ?f2 0 ?f2 Z N">
+        <draw:enhanced-geometry draw:mirror-horizontal="false" draw:mirror-vertical="false" svg:viewBox="0 0 0 0" draw:text-areas="0 0 ?f3 ?f2" draw:type="ooxml-rect" draw:enhanced-path="M 0 0 L ?f3 0 ?f3 ?f2 0 ?f2 Z N">
           <draw:equation draw:name="f0" draw:formula="logwidth/2"/>
           <draw:equation draw:name="f1" draw:formula="logheight/2"/>
           <draw:equation draw:name="f2" draw:formula="logheight"/>
@@ -2946,7 +2595,7 @@
       </draw:custom-shape>
       <draw:custom-shape draw:name="Elipse 14" draw:style-name="Mgr8" draw:text-style-name="MP7" draw:layer="backgroundobjects" svg:width="3.597cm" svg:height="3.597cm" svg:x="1.693cm" svg:y="9.525cm">
         <text:p/>
-        <draw:enhanced-geometry draw:mirror-horizontal="false" draw:mirror-vertical="false" draw:text-areas="?f5 ?f8 ?f6 ?f9" svg:viewBox="0 0 0 0" draw:type="ooxml-ellipse" draw:enhanced-path="M 0 ?f7 Z N" drawooo:enhanced-path="M 0 ?f7 G ?f0 ?f2 ?f12 ?f13 ?f0 ?f2 ?f14 ?f15 ?f0 ?f2 ?f16 ?f17 ?f0 ?f2 ?f18 ?f19 Z N">
+        <draw:enhanced-geometry draw:mirror-horizontal="false" draw:mirror-vertical="false" svg:viewBox="0 0 0 0" draw:text-areas="?f5 ?f8 ?f6 ?f9" draw:type="ooxml-ellipse" draw:enhanced-path="M 0 ?f7 Z N" drawooo:enhanced-path="M 0 ?f7 G ?f0 ?f2 ?f12 ?f13 ?f0 ?f2 ?f14 ?f15 ?f0 ?f2 ?f16 ?f17 ?f0 ?f2 ?f18 ?f19 Z N">
           <draw:equation draw:name="f0" draw:formula="logwidth/2"/>
           <draw:equation draw:name="f1" draw:formula="?f0 *cos(pi*(2700000)/10800000)"/>
           <draw:equation draw:name="f2" draw:formula="logheight/2"/>
@@ -2971,7 +2620,7 @@
       </draw:custom-shape>
       <draw:custom-shape draw:name="Elipse 15" draw:style-name="Mgr19" draw:text-style-name="MP7" draw:layer="backgroundobjects" svg:width="1.781cm" svg:height="1.781cm" svg:x="3.638cm" svg:y="13.52cm">
         <text:p/>
-        <draw:enhanced-geometry draw:mirror-horizontal="false" draw:mirror-vertical="false" draw:text-areas="?f5 ?f8 ?f6 ?f9" svg:viewBox="0 0 0 0" draw:type="ooxml-ellipse" draw:enhanced-path="M 0 ?f7 Z N" drawooo:enhanced-path="M 0 ?f7 G ?f0 ?f2 ?f12 ?f13 ?f0 ?f2 ?f14 ?f15 ?f0 ?f2 ?f16 ?f17 ?f0 ?f2 ?f18 ?f19 Z N">
+        <draw:enhanced-geometry draw:mirror-horizontal="false" draw:mirror-vertical="false" svg:viewBox="0 0 0 0" draw:text-areas="?f5 ?f8 ?f6 ?f9" draw:type="ooxml-ellipse" draw:enhanced-path="M 0 ?f7 Z N" drawooo:enhanced-path="M 0 ?f7 G ?f0 ?f2 ?f12 ?f13 ?f0 ?f2 ?f14 ?f15 ?f0 ?f2 ?f16 ?f17 ?f0 ?f2 ?f18 ?f19 Z N">
           <draw:equation draw:name="f0" draw:formula="logwidth/2"/>
           <draw:equation draw:name="f1" draw:formula="?f0 *cos(pi*(2700000)/10800000)"/>
           <draw:equation draw:name="f2" draw:formula="logheight/2"/>
@@ -2996,7 +2645,7 @@
       </draw:custom-shape>
       <draw:custom-shape draw:name="Elipse 16" draw:style-name="Mgr20" draw:text-style-name="MP7" draw:layer="backgroundobjects" svg:width="0.383cm" svg:height="0.378cm" svg:x="3.029cm" svg:y="15.28cm">
         <text:p/>
-        <draw:enhanced-geometry draw:mirror-horizontal="false" draw:mirror-vertical="false" draw:text-areas="?f5 ?f8 ?f6 ?f9" svg:viewBox="0 0 0 0" draw:type="ooxml-ellipse" draw:enhanced-path="M 0 ?f7 Z N" drawooo:enhanced-path="M 0 ?f7 G ?f0 ?f2 ?f12 ?f13 ?f0 ?f2 ?f14 ?f15 ?f0 ?f2 ?f16 ?f17 ?f0 ?f2 ?f18 ?f19 Z N">
+        <draw:enhanced-geometry draw:mirror-horizontal="false" draw:mirror-vertical="false" svg:viewBox="0 0 0 0" draw:text-areas="?f5 ?f8 ?f6 ?f9" draw:type="ooxml-ellipse" draw:enhanced-path="M 0 ?f7 Z N" drawooo:enhanced-path="M 0 ?f7 G ?f0 ?f2 ?f12 ?f13 ?f0 ?f2 ?f14 ?f15 ?f0 ?f2 ?f16 ?f17 ?f0 ?f2 ?f18 ?f19 Z N">
           <draw:equation draw:name="f0" draw:formula="logwidth/2"/>
           <draw:equation draw:name="f1" draw:formula="?f0 *cos(pi*(2700000)/10800000)"/>
           <draw:equation draw:name="f2" draw:formula="logheight/2"/>
@@ -3021,7 +2670,7 @@
       </draw:custom-shape>
       <draw:custom-shape draw:name="Elipse 17" draw:style-name="Mgr20" draw:text-style-name="MP7" draw:layer="backgroundobjects" svg:width="0.762cm" svg:height="0.762cm" svg:x="4.621cm" svg:y="16.078cm">
         <text:p/>
-        <draw:enhanced-geometry draw:mirror-horizontal="false" draw:mirror-vertical="false" draw:text-areas="?f5 ?f8 ?f6 ?f9" svg:viewBox="0 0 0 0" draw:type="ooxml-ellipse" draw:enhanced-path="M 0 ?f7 Z N" drawooo:enhanced-path="M 0 ?f7 G ?f0 ?f2 ?f12 ?f13 ?f0 ?f2 ?f14 ?f15 ?f0 ?f2 ?f16 ?f17 ?f0 ?f2 ?f18 ?f19 Z N">
+        <draw:enhanced-geometry draw:mirror-horizontal="false" draw:mirror-vertical="false" svg:viewBox="0 0 0 0" draw:text-areas="?f5 ?f8 ?f6 ?f9" draw:type="ooxml-ellipse" draw:enhanced-path="M 0 ?f7 Z N" drawooo:enhanced-path="M 0 ?f7 G ?f0 ?f2 ?f12 ?f13 ?f0 ?f2 ?f14 ?f15 ?f0 ?f2 ?f16 ?f17 ?f0 ?f2 ?f18 ?f19 Z N">
           <draw:equation draw:name="f0" draw:formula="logwidth/2"/>
           <draw:equation draw:name="f1" draw:formula="?f0 *cos(pi*(2700000)/10800000)"/>
           <draw:equation draw:name="f2" draw:formula="logheight/2"/>
@@ -3046,7 +2695,7 @@
       </draw:custom-shape>
       <draw:custom-shape draw:name="Elipse 18" draw:style-name="Mgr19" draw:text-style-name="MP7" draw:layer="backgroundobjects" svg:width="1.013cm" svg:height="1.013cm" svg:x="5.292cm" svg:y="12.488cm">
         <text:p/>
-        <draw:enhanced-geometry draw:mirror-horizontal="false" draw:mirror-vertical="false" draw:text-areas="?f5 ?f8 ?f6 ?f9" svg:viewBox="0 0 0 0" draw:type="ooxml-ellipse" draw:enhanced-path="M 0 ?f7 Z N" drawooo:enhanced-path="M 0 ?f7 G ?f0 ?f2 ?f12 ?f13 ?f0 ?f2 ?f14 ?f15 ?f0 ?f2 ?f16 ?f17 ?f0 ?f2 ?f18 ?f19 Z N">
+        <draw:enhanced-geometry draw:mirror-horizontal="false" draw:mirror-vertical="false" svg:viewBox="0 0 0 0" draw:text-areas="?f5 ?f8 ?f6 ?f9" draw:type="ooxml-ellipse" draw:enhanced-path="M 0 ?f7 Z N" drawooo:enhanced-path="M 0 ?f7 G ?f0 ?f2 ?f12 ?f13 ?f0 ?f2 ?f14 ?f15 ?f0 ?f2 ?f16 ?f17 ?f0 ?f2 ?f18 ?f19 Z N">
           <draw:equation draw:name="f0" draw:formula="logwidth/2"/>
           <draw:equation draw:name="f1" draw:formula="?f0 *cos(pi*(2700000)/10800000)"/>
           <draw:equation draw:name="f2" draw:formula="logheight/2"/>
@@ -3078,14 +2727,14 @@
       <draw:frame draw:name="Título 7" presentation:style-name="Mpr1" draw:text-style-name="MP15" draw:layer="backgroundobjects" svg:width="17.144cm" svg:height="5.261cm" svg:x="6.35cm" svg:y="7.896cm" presentation:class="title" presentation:user-transformed="true">
         <draw:text-box>
           <text:p text:style-name="MP14">
-            <text:span text:style-name="MT1">Clique para editar o título mestre</text:span>
+            <text:span text:style-name="MT2">Clique para editar o título mestre</text:span>
           </text:p>
         </draw:text-box>
       </draw:frame>
       <draw:frame draw:name="Espaço Reservado para Data 27" presentation:style-name="Mpr2" draw:text-style-name="MP17" draw:layer="backgroundobjects" svg:width="6.349cm" svg:height="1.057cm" draw:transform="rotate (-1.5707963267949) translate (25.272cm 0.617cm)" presentation:class="date-time" presentation:user-transformed="true">
         <draw:text-box>
           <text:p text:style-name="MP16">
-            <text:span text:style-name="MT2">
+            <text:span text:style-name="MT3">
               <presentation:date-time/>
             </text:span>
           </text:p>
@@ -3094,14 +2743,16 @@
       <draw:frame draw:name="Espaço Reservado para Rodapé 16" presentation:style-name="Mpr2" draw:text-style-name="MP17" draw:layer="backgroundobjects" svg:width="10.159cm" svg:height="1.066cm" draw:transform="rotate (-1.5707963267949) translate (25.272cm 7.069cm)" presentation:class="footer" presentation:user-transformed="true">
         <draw:text-box>
           <text:p text:style-name="MP18">
-            <presentation:footer/>
+            <text:span text:style-name="MT1">
+              <presentation:footer/>
+            </text:span>
           </text:p>
         </draw:text-box>
       </draw:frame>
       <draw:frame draw:name="Espaço Reservado para Número de Slide 28" presentation:style-name="Mpr3" draw:text-style-name="MP20" draw:layer="backgroundobjects" svg:width="1.692cm" svg:height="1.437cm" svg:x="3.682cm" svg:y="13.692cm" presentation:class="page-number" presentation:user-transformed="true">
         <draw:text-box>
           <text:p text:style-name="MP19">
-            <text:span text:style-name="MT3">
+            <text:span text:style-name="MT4">
               <text:page-number>&lt;número&gt;</text:page-number>
             </text:span>
           </text:p>
@@ -3118,28 +2769,36 @@
         <draw:frame presentation:style-name="Mpr4" draw:text-style-name="MP2" draw:layer="backgroundobjects" svg:width="9.113cm" svg:height="1.484cm" svg:x="0cm" svg:y="0cm" presentation:class="header">
           <draw:text-box>
             <text:p text:style-name="MP1">
-              <presentation:header/>
+              <text:span text:style-name="MT1">
+                <presentation:header/>
+              </text:span>
             </text:p>
           </draw:text-box>
         </draw:frame>
         <draw:frame presentation:style-name="Mpr4" draw:text-style-name="MP4" draw:layer="backgroundobjects" svg:width="9.113cm" svg:height="1.484cm" svg:x="11.886cm" svg:y="0cm" presentation:class="date-time">
           <draw:text-box>
             <text:p text:style-name="MP3">
-              <presentation:date-time/>
+              <text:span text:style-name="MT1">
+                <presentation:date-time/>
+              </text:span>
             </text:p>
           </draw:text-box>
         </draw:frame>
         <draw:frame presentation:style-name="Mpr5" draw:text-style-name="MP2" draw:layer="backgroundobjects" svg:width="9.113cm" svg:height="1.484cm" svg:x="0cm" svg:y="28.215cm" presentation:class="footer">
           <draw:text-box>
             <text:p text:style-name="MP1">
-              <presentation:footer/>
+              <text:span text:style-name="MT1">
+                <presentation:footer/>
+              </text:span>
             </text:p>
           </draw:text-box>
         </draw:frame>
         <draw:frame presentation:style-name="Mpr5" draw:text-style-name="MP4" draw:layer="backgroundobjects" svg:width="9.113cm" svg:height="1.484cm" svg:x="11.886cm" svg:y="28.215cm" presentation:class="page-number">
           <draw:text-box>
             <text:p text:style-name="MP3">
-              <text:page-number>&lt;número&gt;</text:page-number>
+              <text:span text:style-name="MT1">
+                <text:page-number>&lt;número&gt;</text:page-number>
+              </text:span>
             </text:p>
           </draw:text-box>
         </draw:frame>
@@ -3157,7 +2816,7 @@
       </draw:line>
       <draw:custom-shape draw:name="Retângulo 9" draw:style-name="Mgr6" draw:text-style-name="MP6" draw:layer="backgroundobjects" svg:width="0.846cm" svg:height="19.049cm" svg:x="24.553cm" svg:y="0cm">
         <text:p/>
-        <draw:enhanced-geometry draw:mirror-horizontal="false" draw:mirror-vertical="false" draw:text-areas="0 0 ?f3 ?f2" svg:viewBox="0 0 0 0" draw:type="ooxml-rect" draw:enhanced-path="M 0 0 L ?f3 0 ?f3 ?f2 0 ?f2 Z N">
+        <draw:enhanced-geometry draw:mirror-horizontal="false" draw:mirror-vertical="false" svg:viewBox="0 0 0 0" draw:text-areas="0 0 ?f3 ?f2" draw:type="ooxml-rect" draw:enhanced-path="M 0 0 L ?f3 0 ?f3 ?f2 0 ?f2 Z N">
           <draw:equation draw:name="f0" draw:formula="logwidth/2"/>
           <draw:equation draw:name="f1" draw:formula="logheight/2"/>
           <draw:equation draw:name="f2" draw:formula="logheight"/>
@@ -3169,7 +2828,7 @@
       </draw:line>
       <draw:custom-shape draw:name="Elipse 11" draw:style-name="Mgr8" draw:text-style-name="MP7" draw:layer="backgroundobjects" svg:width="1.525cm" svg:height="1.525cm" svg:x="22.657cm" svg:y="15.875cm">
         <text:p/>
-        <draw:enhanced-geometry draw:mirror-horizontal="false" draw:mirror-vertical="false" draw:text-areas="?f5 ?f8 ?f6 ?f9" svg:viewBox="0 0 0 0" draw:type="ooxml-ellipse" draw:enhanced-path="M 0 ?f7 Z N" drawooo:enhanced-path="M 0 ?f7 G ?f0 ?f2 ?f12 ?f13 ?f0 ?f2 ?f14 ?f15 ?f0 ?f2 ?f16 ?f17 ?f0 ?f2 ?f18 ?f19 Z N">
+        <draw:enhanced-geometry draw:mirror-horizontal="false" draw:mirror-vertical="false" svg:viewBox="0 0 0 0" draw:text-areas="?f5 ?f8 ?f6 ?f9" draw:type="ooxml-ellipse" draw:enhanced-path="M 0 ?f7 Z N" drawooo:enhanced-path="M 0 ?f7 G ?f0 ?f2 ?f12 ?f13 ?f0 ?f2 ?f14 ?f15 ?f0 ?f2 ?f16 ?f17 ?f0 ?f2 ?f18 ?f19 Z N">
           <draw:equation draw:name="f0" draw:formula="logwidth/2"/>
           <draw:equation draw:name="f1" draw:formula="?f0 *cos(pi*(2700000)/10800000)"/>
           <draw:equation draw:name="f2" draw:formula="logheight/2"/>
@@ -3200,70 +2859,30 @@
       </draw:frame>
       <draw:frame draw:name="Espaço Reservado para Conteúdo 7" presentation:style-name="Mpr6" draw:text-style-name="MP25" draw:layer="backgroundobjects" svg:width="20.742cm" svg:height="9.88cm" svg:x="1.27cm" svg:y="4.445cm" presentation:class="outline" presentation:user-transformed="true">
         <draw:text-box>
-          <text:list text:style-name="ML6">
+          <text:list text:style-name="ML3">
             <text:list-item>
               <text:p text:style-name="MP21">
-                <text:span text:style-name="MT4">Clique para editar o texto mestre</text:span>
+                <text:span text:style-name="MT5">Clique para editar o texto mestre</text:span>
               </text:p>
-            </text:list-item>
-          </text:list>
-          <text:list text:style-name="ML7">
-            <text:list-item>
               <text:list>
                 <text:list-item>
                   <text:p text:style-name="MP22">
-                    <text:span text:style-name="MT5">Segundo nível</text:span>
+                    <text:span text:style-name="MT6">Segundo nível</text:span>
                   </text:p>
-                </text:list-item>
-              </text:list>
-            </text:list-item>
-          </text:list>
-          <text:list text:style-name="ML8">
-            <text:list-item>
-              <text:list>
-                <text:list-item>
                   <text:list>
                     <text:list-item>
                       <text:p text:style-name="MP23">
-                        <text:span text:style-name="MT6">Terceiro nível</text:span>
+                        <text:span text:style-name="MT7">Terceiro nível</text:span>
                       </text:p>
-                    </text:list-item>
-                  </text:list>
-                </text:list-item>
-              </text:list>
-            </text:list-item>
-          </text:list>
-          <text:list text:style-name="ML9">
-            <text:list-item>
-              <text:list>
-                <text:list-item>
-                  <text:list>
-                    <text:list-item>
                       <text:list>
                         <text:list-item>
                           <text:p text:style-name="MP23">
-                            <text:span text:style-name="MT6">Quarto nível</text:span>
+                            <text:span text:style-name="MT7">Quarto nível</text:span>
                           </text:p>
-                        </text:list-item>
-                      </text:list>
-                    </text:list-item>
-                  </text:list>
-                </text:list-item>
-              </text:list>
-            </text:list-item>
-          </text:list>
-          <text:list text:style-name="ML10">
-            <text:list-item>
-              <text:list>
-                <text:list-item>
-                  <text:list>
-                    <text:list-item>
-                      <text:list>
-                        <text:list-item>
                           <text:list>
                             <text:list-item>
                               <text:p text:style-name="MP24">
-                                <text:span text:style-name="MT7">Quinto nível</text:span>
+                                <text:span text:style-name="MT8">Quinto nível</text:span>
                               </text:p>
                             </text:list-item>
                           </text:list>
@@ -3288,28 +2907,36 @@
         <draw:frame presentation:style-name="Mpr7" draw:text-style-name="MP2" draw:layer="backgroundobjects" svg:width="8.266cm" svg:height="1.269cm" svg:x="0cm" svg:y="0cm" presentation:class="header">
           <draw:text-box>
             <text:p text:style-name="MP1">
-              <presentation:header/>
+              <text:span text:style-name="MT1">
+                <presentation:header/>
+              </text:span>
             </text:p>
           </draw:text-box>
         </draw:frame>
         <draw:frame presentation:style-name="Mpr7" draw:text-style-name="MP4" draw:layer="backgroundobjects" svg:width="8.266cm" svg:height="1.269cm" svg:x="10.783cm" svg:y="0cm" presentation:class="date-time">
           <draw:text-box>
             <text:p text:style-name="MP3">
-              <presentation:date-time/>
+              <text:span text:style-name="MT1">
+                <presentation:date-time/>
+              </text:span>
             </text:p>
           </draw:text-box>
         </draw:frame>
         <draw:frame presentation:style-name="Mpr8" draw:text-style-name="MP2" draw:layer="backgroundobjects" svg:width="8.266cm" svg:height="1.269cm" svg:x="0cm" svg:y="24.13cm" presentation:class="footer">
           <draw:text-box>
             <text:p text:style-name="MP1">
-              <presentation:footer/>
+              <text:span text:style-name="MT1">
+                <presentation:footer/>
+              </text:span>
             </text:p>
           </draw:text-box>
         </draw:frame>
         <draw:frame presentation:style-name="Mpr8" draw:text-style-name="MP4" draw:layer="backgroundobjects" svg:width="8.266cm" svg:height="1.269cm" svg:x="10.783cm" svg:y="24.13cm" presentation:class="page-number">
           <draw:text-box>
             <text:p text:style-name="MP3">
-              <text:page-number>&lt;número&gt;</text:page-number>
+              <text:span text:style-name="MT1">
+                <text:page-number>&lt;número&gt;</text:page-number>
+              </text:span>
             </text:p>
           </draw:text-box>
         </draw:frame>
@@ -3327,7 +2954,7 @@
       </draw:line>
       <draw:custom-shape draw:name="Retângulo 9" draw:style-name="Mgr21" draw:text-style-name="MP6" draw:layer="backgroundobjects" svg:width="0.846cm" svg:height="19.049cm" svg:x="24.553cm" svg:y="0cm">
         <text:p/>
-        <draw:enhanced-geometry draw:mirror-horizontal="false" draw:mirror-vertical="false" draw:text-areas="0 0 ?f3 ?f2" svg:viewBox="0 0 0 0" draw:type="ooxml-rect" draw:enhanced-path="M 0 0 L ?f3 0 ?f3 ?f2 0 ?f2 Z N">
+        <draw:enhanced-geometry draw:mirror-horizontal="false" draw:mirror-vertical="false" svg:viewBox="0 0 0 0" draw:text-areas="0 0 ?f3 ?f2" draw:type="ooxml-rect" draw:enhanced-path="M 0 0 L ?f3 0 ?f3 ?f2 0 ?f2 Z N">
           <draw:equation draw:name="f0" draw:formula="logwidth/2"/>
           <draw:equation draw:name="f1" draw:formula="logheight/2"/>
           <draw:equation draw:name="f2" draw:formula="logheight"/>
@@ -3339,7 +2966,7 @@
       </draw:line>
       <draw:custom-shape draw:name="Elipse 11" draw:style-name="Mgr22" draw:text-style-name="MP7" draw:layer="backgroundobjects" svg:width="1.525cm" svg:height="1.525cm" svg:x="22.657cm" svg:y="15.875cm">
         <text:p/>
-        <draw:enhanced-geometry draw:mirror-horizontal="false" draw:mirror-vertical="false" draw:text-areas="?f5 ?f8 ?f6 ?f9" svg:viewBox="0 0 0 0" draw:type="ooxml-ellipse" draw:enhanced-path="M 0 ?f7 Z N" drawooo:enhanced-path="M 0 ?f7 G ?f0 ?f2 ?f12 ?f13 ?f0 ?f2 ?f14 ?f15 ?f0 ?f2 ?f16 ?f17 ?f0 ?f2 ?f18 ?f19 Z N">
+        <draw:enhanced-geometry draw:mirror-horizontal="false" draw:mirror-vertical="false" svg:viewBox="0 0 0 0" draw:text-areas="?f5 ?f8 ?f6 ?f9" draw:type="ooxml-ellipse" draw:enhanced-path="M 0 ?f7 Z N" drawooo:enhanced-path="M 0 ?f7 G ?f0 ?f2 ?f12 ?f13 ?f0 ?f2 ?f14 ?f15 ?f0 ?f2 ?f16 ?f17 ?f0 ?f2 ?f18 ?f19 Z N">
           <draw:equation draw:name="f0" draw:formula="logwidth/2"/>
           <draw:equation draw:name="f1" draw:formula="?f0 *cos(pi*(2700000)/10800000)"/>
           <draw:equation draw:name="f2" draw:formula="logheight/2"/>
@@ -3370,70 +2997,30 @@
       </draw:frame>
       <draw:frame draw:name="Espaço Reservado para Conteúdo 7" presentation:style-name="Mpr9" draw:text-style-name="MP25" draw:layer="backgroundobjects" svg:width="20.742cm" svg:height="9.88cm" svg:x="1.27cm" svg:y="4.445cm" presentation:class="outline" presentation:user-transformed="true">
         <draw:text-box>
-          <text:list text:style-name="ML6">
+          <text:list text:style-name="ML3">
             <text:list-item>
               <text:p text:style-name="MP21">
-                <text:span text:style-name="MT4">Clique para editar o texto mestre</text:span>
+                <text:span text:style-name="MT5">Clique para editar o texto mestre</text:span>
               </text:p>
-            </text:list-item>
-          </text:list>
-          <text:list text:style-name="ML7">
-            <text:list-item>
               <text:list>
                 <text:list-item>
                   <text:p text:style-name="MP22">
-                    <text:span text:style-name="MT5">Segundo nível</text:span>
+                    <text:span text:style-name="MT6">Segundo nível</text:span>
                   </text:p>
-                </text:list-item>
-              </text:list>
-            </text:list-item>
-          </text:list>
-          <text:list text:style-name="ML8">
-            <text:list-item>
-              <text:list>
-                <text:list-item>
                   <text:list>
                     <text:list-item>
                       <text:p text:style-name="MP23">
-                        <text:span text:style-name="MT6">Terceiro nível</text:span>
+                        <text:span text:style-name="MT7">Terceiro nível</text:span>
                       </text:p>
-                    </text:list-item>
-                  </text:list>
-                </text:list-item>
-              </text:list>
-            </text:list-item>
-          </text:list>
-          <text:list text:style-name="ML9">
-            <text:list-item>
-              <text:list>
-                <text:list-item>
-                  <text:list>
-                    <text:list-item>
                       <text:list>
                         <text:list-item>
                           <text:p text:style-name="MP23">
-                            <text:span text:style-name="MT6">Quarto nível</text:span>
+                            <text:span text:style-name="MT7">Quarto nível</text:span>
                           </text:p>
-                        </text:list-item>
-                      </text:list>
-                    </text:list-item>
-                  </text:list>
-                </text:list-item>
-              </text:list>
-            </text:list-item>
-          </text:list>
-          <text:list text:style-name="ML10">
-            <text:list-item>
-              <text:list>
-                <text:list-item>
-                  <text:list>
-                    <text:list-item>
-                      <text:list>
-                        <text:list-item>
                           <text:list>
                             <text:list-item>
                               <text:p text:style-name="MP24">
-                                <text:span text:style-name="MT7">Quinto nível</text:span>
+                                <text:span text:style-name="MT8">Quinto nível</text:span>
                               </text:p>
                             </text:list-item>
                           </text:list>
@@ -3458,28 +3045,36 @@
         <draw:frame presentation:style-name="Mpr10" draw:text-style-name="MP2" draw:layer="backgroundobjects" svg:width="8.266cm" svg:height="1.269cm" svg:x="0cm" svg:y="0cm" presentation:class="header">
           <draw:text-box>
             <text:p text:style-name="MP1">
-              <presentation:header/>
+              <text:span text:style-name="MT1">
+                <presentation:header/>
+              </text:span>
             </text:p>
           </draw:text-box>
         </draw:frame>
         <draw:frame presentation:style-name="Mpr10" draw:text-style-name="MP4" draw:layer="backgroundobjects" svg:width="8.266cm" svg:height="1.269cm" svg:x="10.783cm" svg:y="0cm" presentation:class="date-time">
           <draw:text-box>
             <text:p text:style-name="MP3">
-              <presentation:date-time/>
+              <text:span text:style-name="MT1">
+                <presentation:date-time/>
+              </text:span>
             </text:p>
           </draw:text-box>
         </draw:frame>
         <draw:frame presentation:style-name="Mpr11" draw:text-style-name="MP2" draw:layer="backgroundobjects" svg:width="8.266cm" svg:height="1.269cm" svg:x="0cm" svg:y="24.13cm" presentation:class="footer">
           <draw:text-box>
             <text:p text:style-name="MP1">
-              <presentation:footer/>
+              <text:span text:style-name="MT1">
+                <presentation:footer/>
+              </text:span>
             </text:p>
           </draw:text-box>
         </draw:frame>
         <draw:frame presentation:style-name="Mpr11" draw:text-style-name="MP4" draw:layer="backgroundobjects" svg:width="8.266cm" svg:height="1.269cm" svg:x="10.783cm" svg:y="24.13cm" presentation:class="page-number">
           <draw:text-box>
             <text:p text:style-name="MP3">
-              <text:page-number>&lt;número&gt;</text:page-number>
+              <text:span text:style-name="MT1">
+                <text:page-number>&lt;número&gt;</text:page-number>
+              </text:span>
             </text:p>
           </draw:text-box>
         </draw:frame>

</xml_diff>